<commit_message>
Add responsive web design
</commit_message>
<xml_diff>
--- a/presentations/chapter-4/Practical Web Dev.pptx
+++ b/presentations/chapter-4/Practical Web Dev.pptx
@@ -12,9 +12,9 @@
     <p:sldId id="409" r:id="rId3"/>
     <p:sldId id="410" r:id="rId4"/>
     <p:sldId id="411" r:id="rId5"/>
-    <p:sldId id="414" r:id="rId6"/>
-    <p:sldId id="412" r:id="rId7"/>
-    <p:sldId id="413" r:id="rId8"/>
+    <p:sldId id="412" r:id="rId6"/>
+    <p:sldId id="413" r:id="rId7"/>
+    <p:sldId id="414" r:id="rId8"/>
   </p:sldIdLst>
   <p:sldSz cx="12192000" cy="6858000"/>
   <p:notesSz cx="6858000" cy="9144000"/>
@@ -125,9 +125,9 @@
             <p14:sldId id="409"/>
             <p14:sldId id="410"/>
             <p14:sldId id="411"/>
-            <p14:sldId id="414"/>
             <p14:sldId id="412"/>
             <p14:sldId id="413"/>
+            <p14:sldId id="414"/>
           </p14:sldIdLst>
         </p14:section>
       </p14:sectionLst>
@@ -232,7 +232,7 @@
           <a:p>
             <a:fld id="{B53C1D94-E0DD-4250-8C1B-3D8C3DA9B2B6}" type="datetimeFigureOut">
               <a:rPr lang="he-IL" smtClean="0"/>
-              <a:t>כ"ז/סיון/תשע"ט</a:t>
+              <a:t>י"ח/תמוז/תשע"ט</a:t>
             </a:fld>
             <a:endParaRPr lang="he-IL"/>
           </a:p>
@@ -2482,7 +2482,7 @@
     </p:spTree>
     <p:extLst>
       <p:ext uri="{BB962C8B-B14F-4D97-AF65-F5344CB8AC3E}">
-        <p14:creationId xmlns:p14="http://schemas.microsoft.com/office/powerpoint/2010/main" val="2012891520"/>
+        <p14:creationId xmlns:p14="http://schemas.microsoft.com/office/powerpoint/2010/main" val="2261091062"/>
       </p:ext>
     </p:extLst>
   </p:cSld>
@@ -2591,7 +2591,7 @@
     </p:spTree>
     <p:extLst>
       <p:ext uri="{BB962C8B-B14F-4D97-AF65-F5344CB8AC3E}">
-        <p14:creationId xmlns:p14="http://schemas.microsoft.com/office/powerpoint/2010/main" val="2261091062"/>
+        <p14:creationId xmlns:p14="http://schemas.microsoft.com/office/powerpoint/2010/main" val="994558375"/>
       </p:ext>
     </p:extLst>
   </p:cSld>
@@ -2662,6 +2662,37 @@
               <a:tabLst/>
               <a:defRPr/>
             </a:pPr>
+            <a:r>
+              <a:rPr lang="en-US" sz="1200" kern="1200" dirty="0">
+                <a:solidFill>
+                  <a:schemeClr val="tx1"/>
+                </a:solidFill>
+                <a:effectLst/>
+                <a:latin typeface="+mn-lt"/>
+                <a:ea typeface="+mn-ea"/>
+                <a:cs typeface="+mn-cs"/>
+              </a:rPr>
+              <a:t>What is CSS encapsulation</a:t>
+            </a:r>
+          </a:p>
+          <a:p>
+            <a:pPr marL="0" marR="0" lvl="0" indent="0" algn="l" defTabSz="914400" rtl="0" eaLnBrk="1" fontAlgn="auto" latinLnBrk="0" hangingPunct="1">
+              <a:lnSpc>
+                <a:spcPct val="100000"/>
+              </a:lnSpc>
+              <a:spcBef>
+                <a:spcPts val="0"/>
+              </a:spcBef>
+              <a:spcAft>
+                <a:spcPts val="0"/>
+              </a:spcAft>
+              <a:buClrTx/>
+              <a:buSzTx/>
+              <a:buFontTx/>
+              <a:buNone/>
+              <a:tabLst/>
+              <a:defRPr/>
+            </a:pPr>
             <a:endParaRPr lang="en-US" sz="1200" kern="1200" dirty="0">
               <a:solidFill>
                 <a:schemeClr val="tx1"/>
@@ -2672,6 +2703,1042 @@
               <a:cs typeface="+mn-cs"/>
             </a:endParaRPr>
           </a:p>
+          <a:p>
+            <a:pPr marL="0" marR="0" lvl="0" indent="0" algn="l" defTabSz="914400" rtl="0" eaLnBrk="1" fontAlgn="auto" latinLnBrk="0" hangingPunct="1">
+              <a:lnSpc>
+                <a:spcPct val="100000"/>
+              </a:lnSpc>
+              <a:spcBef>
+                <a:spcPts val="0"/>
+              </a:spcBef>
+              <a:spcAft>
+                <a:spcPts val="0"/>
+              </a:spcAft>
+              <a:buClrTx/>
+              <a:buSzTx/>
+              <a:buFontTx/>
+              <a:buNone/>
+              <a:tabLst/>
+              <a:defRPr/>
+            </a:pPr>
+            <a:r>
+              <a:rPr lang="en-US" sz="1200" kern="1200" dirty="0">
+                <a:solidFill>
+                  <a:schemeClr val="tx1"/>
+                </a:solidFill>
+                <a:effectLst/>
+                <a:latin typeface="+mn-lt"/>
+                <a:ea typeface="+mn-ea"/>
+                <a:cs typeface="+mn-cs"/>
+              </a:rPr>
+              <a:t>In CSS we have the following issues:</a:t>
+            </a:r>
+          </a:p>
+          <a:p>
+            <a:pPr marL="0" marR="0" lvl="0" indent="0" algn="l" defTabSz="914400" rtl="0" eaLnBrk="1" fontAlgn="auto" latinLnBrk="0" hangingPunct="1">
+              <a:lnSpc>
+                <a:spcPct val="100000"/>
+              </a:lnSpc>
+              <a:spcBef>
+                <a:spcPts val="0"/>
+              </a:spcBef>
+              <a:spcAft>
+                <a:spcPts val="0"/>
+              </a:spcAft>
+              <a:buClrTx/>
+              <a:buSzTx/>
+              <a:buFontTx/>
+              <a:buNone/>
+              <a:tabLst/>
+              <a:defRPr/>
+            </a:pPr>
+            <a:r>
+              <a:rPr lang="en-US" sz="1200" kern="1200" dirty="0">
+                <a:solidFill>
+                  <a:schemeClr val="tx1"/>
+                </a:solidFill>
+                <a:effectLst/>
+                <a:latin typeface="+mn-lt"/>
+                <a:ea typeface="+mn-ea"/>
+                <a:cs typeface="+mn-cs"/>
+              </a:rPr>
+              <a:t>CSS is a global scope – when we defined a class it might apply to any element in the DOM, this might cause applying styles to undesired element.</a:t>
+            </a:r>
+          </a:p>
+          <a:p>
+            <a:pPr marL="0" marR="0" lvl="0" indent="0" algn="l" defTabSz="914400" rtl="0" eaLnBrk="1" fontAlgn="auto" latinLnBrk="0" hangingPunct="1">
+              <a:lnSpc>
+                <a:spcPct val="100000"/>
+              </a:lnSpc>
+              <a:spcBef>
+                <a:spcPts val="0"/>
+              </a:spcBef>
+              <a:spcAft>
+                <a:spcPts val="0"/>
+              </a:spcAft>
+              <a:buClrTx/>
+              <a:buSzTx/>
+              <a:buFontTx/>
+              <a:buNone/>
+              <a:tabLst/>
+              <a:defRPr/>
+            </a:pPr>
+            <a:r>
+              <a:rPr lang="en-US" sz="1200" kern="1200" dirty="0">
+                <a:solidFill>
+                  <a:schemeClr val="tx1"/>
+                </a:solidFill>
+                <a:effectLst/>
+                <a:latin typeface="+mn-lt"/>
+                <a:ea typeface="+mn-ea"/>
+                <a:cs typeface="+mn-cs"/>
+              </a:rPr>
+              <a:t>Specificity War, Inheritance issues – CSS become so complex so we need to start calculating style specificity level  (id is 100, class is 10, tag is 1 etc.) to override existing/inherit style</a:t>
+            </a:r>
+          </a:p>
+          <a:p>
+            <a:pPr marL="0" marR="0" lvl="0" indent="0" algn="l" defTabSz="914400" rtl="0" eaLnBrk="1" fontAlgn="auto" latinLnBrk="0" hangingPunct="1">
+              <a:lnSpc>
+                <a:spcPct val="100000"/>
+              </a:lnSpc>
+              <a:spcBef>
+                <a:spcPts val="0"/>
+              </a:spcBef>
+              <a:spcAft>
+                <a:spcPts val="0"/>
+              </a:spcAft>
+              <a:buClrTx/>
+              <a:buSzTx/>
+              <a:buFontTx/>
+              <a:buNone/>
+              <a:tabLst/>
+              <a:defRPr/>
+            </a:pPr>
+            <a:r>
+              <a:rPr lang="en-US" sz="1200" kern="1200" dirty="0">
+                <a:solidFill>
+                  <a:schemeClr val="tx1"/>
+                </a:solidFill>
+                <a:effectLst/>
+                <a:latin typeface="+mn-lt"/>
+                <a:ea typeface="+mn-ea"/>
+                <a:cs typeface="+mn-cs"/>
+              </a:rPr>
+              <a:t>Name clashing – will but same class name like our third party (everyone wants to call button as button class)</a:t>
+            </a:r>
+          </a:p>
+          <a:p>
+            <a:pPr marL="0" marR="0" lvl="0" indent="0" algn="l" defTabSz="914400" rtl="0" eaLnBrk="1" fontAlgn="auto" latinLnBrk="0" hangingPunct="1">
+              <a:lnSpc>
+                <a:spcPct val="100000"/>
+              </a:lnSpc>
+              <a:spcBef>
+                <a:spcPts val="0"/>
+              </a:spcBef>
+              <a:spcAft>
+                <a:spcPts val="0"/>
+              </a:spcAft>
+              <a:buClrTx/>
+              <a:buSzTx/>
+              <a:buFontTx/>
+              <a:buNone/>
+              <a:tabLst/>
+              <a:defRPr/>
+            </a:pPr>
+            <a:endParaRPr lang="en-US" sz="1200" kern="1200" dirty="0">
+              <a:solidFill>
+                <a:schemeClr val="tx1"/>
+              </a:solidFill>
+              <a:effectLst/>
+              <a:latin typeface="+mn-lt"/>
+              <a:ea typeface="+mn-ea"/>
+              <a:cs typeface="+mn-cs"/>
+            </a:endParaRPr>
+          </a:p>
+          <a:p>
+            <a:pPr marL="0" marR="0" lvl="0" indent="0" algn="l" defTabSz="914400" rtl="0" eaLnBrk="1" fontAlgn="auto" latinLnBrk="0" hangingPunct="1">
+              <a:lnSpc>
+                <a:spcPct val="100000"/>
+              </a:lnSpc>
+              <a:spcBef>
+                <a:spcPts val="0"/>
+              </a:spcBef>
+              <a:spcAft>
+                <a:spcPts val="0"/>
+              </a:spcAft>
+              <a:buClrTx/>
+              <a:buSzTx/>
+              <a:buFontTx/>
+              <a:buNone/>
+              <a:tabLst/>
+              <a:defRPr/>
+            </a:pPr>
+            <a:r>
+              <a:rPr lang="en-US" sz="1200" kern="1200" dirty="0">
+                <a:solidFill>
+                  <a:schemeClr val="tx1"/>
+                </a:solidFill>
+                <a:effectLst/>
+                <a:latin typeface="+mn-lt"/>
+                <a:ea typeface="+mn-ea"/>
+                <a:cs typeface="+mn-cs"/>
+              </a:rPr>
+              <a:t>The first solution is to create best practices to our project:</a:t>
+            </a:r>
+          </a:p>
+          <a:p>
+            <a:pPr marL="171450" marR="0" lvl="0" indent="-171450" algn="l" defTabSz="914400" rtl="0" eaLnBrk="1" fontAlgn="auto" latinLnBrk="0" hangingPunct="1">
+              <a:lnSpc>
+                <a:spcPct val="100000"/>
+              </a:lnSpc>
+              <a:spcBef>
+                <a:spcPts val="0"/>
+              </a:spcBef>
+              <a:spcAft>
+                <a:spcPts val="0"/>
+              </a:spcAft>
+              <a:buClrTx/>
+              <a:buSzTx/>
+              <a:buFontTx/>
+              <a:buChar char="-"/>
+              <a:tabLst/>
+              <a:defRPr/>
+            </a:pPr>
+            <a:r>
+              <a:rPr lang="en-US" sz="1200" kern="1200" dirty="0">
+                <a:solidFill>
+                  <a:schemeClr val="tx1"/>
+                </a:solidFill>
+                <a:effectLst/>
+                <a:latin typeface="+mn-lt"/>
+                <a:ea typeface="+mn-ea"/>
+                <a:cs typeface="+mn-cs"/>
+              </a:rPr>
+              <a:t>No more ID's in selectors - solve Specificity War</a:t>
+            </a:r>
+          </a:p>
+          <a:p>
+            <a:pPr marL="171450" marR="0" lvl="0" indent="-171450" algn="l" defTabSz="914400" rtl="0" eaLnBrk="1" fontAlgn="auto" latinLnBrk="0" hangingPunct="1">
+              <a:lnSpc>
+                <a:spcPct val="100000"/>
+              </a:lnSpc>
+              <a:spcBef>
+                <a:spcPts val="0"/>
+              </a:spcBef>
+              <a:spcAft>
+                <a:spcPts val="0"/>
+              </a:spcAft>
+              <a:buClrTx/>
+              <a:buSzTx/>
+              <a:buFontTx/>
+              <a:buChar char="-"/>
+              <a:tabLst/>
+              <a:defRPr/>
+            </a:pPr>
+            <a:r>
+              <a:rPr lang="en-US" sz="1200" kern="1200" dirty="0">
+                <a:solidFill>
+                  <a:schemeClr val="tx1"/>
+                </a:solidFill>
+                <a:effectLst/>
+                <a:latin typeface="+mn-lt"/>
+                <a:ea typeface="+mn-ea"/>
+                <a:cs typeface="+mn-cs"/>
+              </a:rPr>
+              <a:t>No "brute-force" values (as that z-index) – solve override issues</a:t>
+            </a:r>
+          </a:p>
+          <a:p>
+            <a:pPr marL="171450" marR="0" lvl="0" indent="-171450" algn="l" defTabSz="914400" rtl="0" eaLnBrk="1" fontAlgn="auto" latinLnBrk="0" hangingPunct="1">
+              <a:lnSpc>
+                <a:spcPct val="100000"/>
+              </a:lnSpc>
+              <a:spcBef>
+                <a:spcPts val="0"/>
+              </a:spcBef>
+              <a:spcAft>
+                <a:spcPts val="0"/>
+              </a:spcAft>
+              <a:buClrTx/>
+              <a:buSzTx/>
+              <a:buFontTx/>
+              <a:buChar char="-"/>
+              <a:tabLst/>
+              <a:defRPr/>
+            </a:pPr>
+            <a:r>
+              <a:rPr lang="en-US" sz="1200" kern="1200" dirty="0">
+                <a:solidFill>
+                  <a:schemeClr val="tx1"/>
+                </a:solidFill>
+                <a:effectLst/>
+                <a:latin typeface="+mn-lt"/>
+                <a:ea typeface="+mn-ea"/>
+                <a:cs typeface="+mn-cs"/>
+              </a:rPr>
+              <a:t>No more !important or exotic CSS properties – don’t ever use important only for rare cases</a:t>
+            </a:r>
+          </a:p>
+          <a:p>
+            <a:pPr marL="171450" marR="0" lvl="0" indent="-171450" algn="l" defTabSz="914400" rtl="0" eaLnBrk="1" fontAlgn="auto" latinLnBrk="0" hangingPunct="1">
+              <a:lnSpc>
+                <a:spcPct val="100000"/>
+              </a:lnSpc>
+              <a:spcBef>
+                <a:spcPts val="0"/>
+              </a:spcBef>
+              <a:spcAft>
+                <a:spcPts val="0"/>
+              </a:spcAft>
+              <a:buClrTx/>
+              <a:buSzTx/>
+              <a:buFontTx/>
+              <a:buChar char="-"/>
+              <a:tabLst/>
+              <a:defRPr/>
+            </a:pPr>
+            <a:r>
+              <a:rPr lang="en-US" sz="1200" kern="1200" dirty="0">
+                <a:solidFill>
+                  <a:schemeClr val="tx1"/>
+                </a:solidFill>
+                <a:effectLst/>
+                <a:latin typeface="+mn-lt"/>
+                <a:ea typeface="+mn-ea"/>
+                <a:cs typeface="+mn-cs"/>
+              </a:rPr>
+              <a:t>No strict bindings between CSS and the DOM structure – don’t describe the DOM in CSS (selector using html tag), why? Because structure might be changed &amp; less readable when looking at it (class with descripted name will explain us more about this element)</a:t>
+            </a:r>
+          </a:p>
+          <a:p>
+            <a:pPr marL="171450" marR="0" lvl="0" indent="-171450" algn="l" defTabSz="914400" rtl="0" eaLnBrk="1" fontAlgn="auto" latinLnBrk="0" hangingPunct="1">
+              <a:lnSpc>
+                <a:spcPct val="100000"/>
+              </a:lnSpc>
+              <a:spcBef>
+                <a:spcPts val="0"/>
+              </a:spcBef>
+              <a:spcAft>
+                <a:spcPts val="0"/>
+              </a:spcAft>
+              <a:buClrTx/>
+              <a:buSzTx/>
+              <a:buFontTx/>
+              <a:buChar char="-"/>
+              <a:tabLst/>
+              <a:defRPr/>
+            </a:pPr>
+            <a:r>
+              <a:rPr lang="en-US" sz="1200" kern="1200" dirty="0">
+                <a:solidFill>
+                  <a:schemeClr val="tx1"/>
+                </a:solidFill>
+                <a:effectLst/>
+                <a:latin typeface="+mn-lt"/>
+                <a:ea typeface="+mn-ea"/>
+                <a:cs typeface="+mn-cs"/>
+              </a:rPr>
+              <a:t>Keep the </a:t>
+            </a:r>
+            <a:r>
+              <a:rPr lang="en-US" sz="1200" kern="1200" dirty="0" err="1">
+                <a:solidFill>
+                  <a:schemeClr val="tx1"/>
+                </a:solidFill>
+                <a:effectLst/>
+                <a:latin typeface="+mn-lt"/>
+                <a:ea typeface="+mn-ea"/>
+                <a:cs typeface="+mn-cs"/>
+              </a:rPr>
+              <a:t>specifity</a:t>
+            </a:r>
+            <a:r>
+              <a:rPr lang="en-US" sz="1200" kern="1200" dirty="0">
+                <a:solidFill>
+                  <a:schemeClr val="tx1"/>
+                </a:solidFill>
+                <a:effectLst/>
+                <a:latin typeface="+mn-lt"/>
+                <a:ea typeface="+mn-ea"/>
+                <a:cs typeface="+mn-cs"/>
+              </a:rPr>
+              <a:t> as low as possible, ideally 0.1.0 – to prevent overrides issues</a:t>
+            </a:r>
+          </a:p>
+          <a:p>
+            <a:pPr marL="171450" marR="0" lvl="0" indent="-171450" algn="l" defTabSz="914400" rtl="0" eaLnBrk="1" fontAlgn="auto" latinLnBrk="0" hangingPunct="1">
+              <a:lnSpc>
+                <a:spcPct val="100000"/>
+              </a:lnSpc>
+              <a:spcBef>
+                <a:spcPts val="0"/>
+              </a:spcBef>
+              <a:spcAft>
+                <a:spcPts val="0"/>
+              </a:spcAft>
+              <a:buClrTx/>
+              <a:buSzTx/>
+              <a:buFontTx/>
+              <a:buChar char="-"/>
+              <a:tabLst/>
+              <a:defRPr/>
+            </a:pPr>
+            <a:r>
+              <a:rPr lang="en-US" sz="1200" kern="1200" dirty="0">
+                <a:solidFill>
+                  <a:schemeClr val="tx1"/>
+                </a:solidFill>
+                <a:effectLst/>
+                <a:latin typeface="+mn-lt"/>
+                <a:ea typeface="+mn-ea"/>
+                <a:cs typeface="+mn-cs"/>
+              </a:rPr>
+              <a:t>Use namespaces for your classes. – like project prefix to solve side effect</a:t>
+            </a:r>
+          </a:p>
+          <a:p>
+            <a:pPr marL="0" marR="0" lvl="0" indent="0" algn="l" defTabSz="914400" rtl="0" eaLnBrk="1" fontAlgn="auto" latinLnBrk="0" hangingPunct="1">
+              <a:lnSpc>
+                <a:spcPct val="100000"/>
+              </a:lnSpc>
+              <a:spcBef>
+                <a:spcPts val="0"/>
+              </a:spcBef>
+              <a:spcAft>
+                <a:spcPts val="0"/>
+              </a:spcAft>
+              <a:buClrTx/>
+              <a:buSzTx/>
+              <a:buFontTx/>
+              <a:buNone/>
+              <a:tabLst/>
+              <a:defRPr/>
+            </a:pPr>
+            <a:endParaRPr lang="en-US" sz="1200" kern="1200" dirty="0">
+              <a:solidFill>
+                <a:schemeClr val="tx1"/>
+              </a:solidFill>
+              <a:effectLst/>
+              <a:latin typeface="+mn-lt"/>
+              <a:ea typeface="+mn-ea"/>
+              <a:cs typeface="+mn-cs"/>
+            </a:endParaRPr>
+          </a:p>
+          <a:p>
+            <a:pPr marL="0" marR="0" lvl="0" indent="0" algn="l" defTabSz="914400" rtl="0" eaLnBrk="1" fontAlgn="auto" latinLnBrk="0" hangingPunct="1">
+              <a:lnSpc>
+                <a:spcPct val="100000"/>
+              </a:lnSpc>
+              <a:spcBef>
+                <a:spcPts val="0"/>
+              </a:spcBef>
+              <a:spcAft>
+                <a:spcPts val="0"/>
+              </a:spcAft>
+              <a:buClrTx/>
+              <a:buSzTx/>
+              <a:buFontTx/>
+              <a:buNone/>
+              <a:tabLst/>
+              <a:defRPr/>
+            </a:pPr>
+            <a:r>
+              <a:rPr lang="en-US" sz="1200" kern="1200" dirty="0">
+                <a:solidFill>
+                  <a:schemeClr val="tx1"/>
+                </a:solidFill>
+                <a:effectLst/>
+                <a:latin typeface="+mn-lt"/>
+                <a:ea typeface="+mn-ea"/>
+                <a:cs typeface="+mn-cs"/>
+              </a:rPr>
+              <a:t>To solve this issue, The idea is to create a private scope for styles so all styles create in a component will apply only to this component and will not affect outside elements.</a:t>
+            </a:r>
+          </a:p>
+          <a:p>
+            <a:pPr marL="0" marR="0" lvl="0" indent="0" algn="l" defTabSz="914400" rtl="0" eaLnBrk="1" fontAlgn="auto" latinLnBrk="0" hangingPunct="1">
+              <a:lnSpc>
+                <a:spcPct val="100000"/>
+              </a:lnSpc>
+              <a:spcBef>
+                <a:spcPts val="0"/>
+              </a:spcBef>
+              <a:spcAft>
+                <a:spcPts val="0"/>
+              </a:spcAft>
+              <a:buClrTx/>
+              <a:buSzTx/>
+              <a:buFontTx/>
+              <a:buNone/>
+              <a:tabLst/>
+              <a:defRPr/>
+            </a:pPr>
+            <a:r>
+              <a:rPr lang="en-US" sz="1200" kern="1200" dirty="0">
+                <a:solidFill>
+                  <a:schemeClr val="tx1"/>
+                </a:solidFill>
+                <a:effectLst/>
+                <a:latin typeface="+mn-lt"/>
+                <a:ea typeface="+mn-ea"/>
+                <a:cs typeface="+mn-cs"/>
+              </a:rPr>
+              <a:t>This strategy will solve us a lot if side effect like one style effecting other element.</a:t>
+            </a:r>
+          </a:p>
+          <a:p>
+            <a:pPr marL="0" marR="0" lvl="0" indent="0" algn="l" defTabSz="914400" rtl="0" eaLnBrk="1" fontAlgn="auto" latinLnBrk="0" hangingPunct="1">
+              <a:lnSpc>
+                <a:spcPct val="100000"/>
+              </a:lnSpc>
+              <a:spcBef>
+                <a:spcPts val="0"/>
+              </a:spcBef>
+              <a:spcAft>
+                <a:spcPts val="0"/>
+              </a:spcAft>
+              <a:buClrTx/>
+              <a:buSzTx/>
+              <a:buFontTx/>
+              <a:buNone/>
+              <a:tabLst/>
+              <a:defRPr/>
+            </a:pPr>
+            <a:endParaRPr lang="en-US" sz="1200" kern="1200" dirty="0">
+              <a:solidFill>
+                <a:schemeClr val="tx1"/>
+              </a:solidFill>
+              <a:effectLst/>
+              <a:latin typeface="+mn-lt"/>
+              <a:ea typeface="+mn-ea"/>
+              <a:cs typeface="+mn-cs"/>
+            </a:endParaRPr>
+          </a:p>
+          <a:p>
+            <a:pPr marL="0" marR="0" lvl="0" indent="0" algn="l" defTabSz="914400" rtl="0" eaLnBrk="1" fontAlgn="auto" latinLnBrk="0" hangingPunct="1">
+              <a:lnSpc>
+                <a:spcPct val="100000"/>
+              </a:lnSpc>
+              <a:spcBef>
+                <a:spcPts val="0"/>
+              </a:spcBef>
+              <a:spcAft>
+                <a:spcPts val="0"/>
+              </a:spcAft>
+              <a:buClrTx/>
+              <a:buSzTx/>
+              <a:buFontTx/>
+              <a:buNone/>
+              <a:tabLst/>
+              <a:defRPr/>
+            </a:pPr>
+            <a:r>
+              <a:rPr lang="en-US" sz="1200" kern="1200" dirty="0">
+                <a:solidFill>
+                  <a:schemeClr val="tx1"/>
+                </a:solidFill>
+                <a:effectLst/>
+                <a:latin typeface="+mn-lt"/>
+                <a:ea typeface="+mn-ea"/>
+                <a:cs typeface="+mn-cs"/>
+              </a:rPr>
+              <a:t>Let see an example using it (by creating the scope by yourself):</a:t>
+            </a:r>
+          </a:p>
+          <a:p>
+            <a:pPr marL="0" marR="0" lvl="0" indent="0" algn="l" defTabSz="914400" rtl="0" eaLnBrk="1" fontAlgn="auto" latinLnBrk="0" hangingPunct="1">
+              <a:lnSpc>
+                <a:spcPct val="100000"/>
+              </a:lnSpc>
+              <a:spcBef>
+                <a:spcPts val="0"/>
+              </a:spcBef>
+              <a:spcAft>
+                <a:spcPts val="0"/>
+              </a:spcAft>
+              <a:buClrTx/>
+              <a:buSzTx/>
+              <a:buFontTx/>
+              <a:buNone/>
+              <a:tabLst/>
+              <a:defRPr/>
+            </a:pPr>
+            <a:r>
+              <a:rPr lang="en-US" sz="1200" kern="1200" dirty="0">
+                <a:solidFill>
+                  <a:schemeClr val="tx1"/>
+                </a:solidFill>
+                <a:effectLst/>
+                <a:latin typeface="+mn-lt"/>
+                <a:ea typeface="+mn-ea"/>
+                <a:cs typeface="+mn-cs"/>
+              </a:rPr>
+              <a:t>Scoping the style – here we can see an example how we can create a scope with BEM, in this example the prefix is </a:t>
+            </a:r>
+            <a:r>
+              <a:rPr lang="en-US" sz="1200" b="0" i="0" kern="1200" dirty="0">
+                <a:solidFill>
+                  <a:schemeClr val="tx1"/>
+                </a:solidFill>
+                <a:effectLst/>
+                <a:latin typeface="+mn-lt"/>
+                <a:ea typeface="+mn-ea"/>
+                <a:cs typeface="+mn-cs"/>
+              </a:rPr>
+              <a:t>content-card.</a:t>
+            </a:r>
+            <a:endParaRPr lang="en-US" sz="1200" kern="1200" dirty="0">
+              <a:solidFill>
+                <a:schemeClr val="tx1"/>
+              </a:solidFill>
+              <a:effectLst/>
+              <a:latin typeface="+mn-lt"/>
+              <a:ea typeface="+mn-ea"/>
+              <a:cs typeface="+mn-cs"/>
+            </a:endParaRPr>
+          </a:p>
+          <a:p>
+            <a:pPr marL="0" marR="0" lvl="0" indent="0" algn="l" defTabSz="914400" rtl="0" eaLnBrk="1" fontAlgn="auto" latinLnBrk="0" hangingPunct="1">
+              <a:lnSpc>
+                <a:spcPct val="100000"/>
+              </a:lnSpc>
+              <a:spcBef>
+                <a:spcPts val="0"/>
+              </a:spcBef>
+              <a:spcAft>
+                <a:spcPts val="0"/>
+              </a:spcAft>
+              <a:buClrTx/>
+              <a:buSzTx/>
+              <a:buFontTx/>
+              <a:buNone/>
+              <a:tabLst/>
+              <a:defRPr/>
+            </a:pPr>
+            <a:endParaRPr lang="en-US" sz="1200" kern="1200" dirty="0">
+              <a:solidFill>
+                <a:schemeClr val="tx1"/>
+              </a:solidFill>
+              <a:effectLst/>
+              <a:latin typeface="+mn-lt"/>
+              <a:ea typeface="+mn-ea"/>
+              <a:cs typeface="+mn-cs"/>
+            </a:endParaRPr>
+          </a:p>
+          <a:p>
+            <a:pPr marL="0" marR="0" lvl="0" indent="0" algn="l" defTabSz="914400" rtl="0" eaLnBrk="1" fontAlgn="auto" latinLnBrk="0" hangingPunct="1">
+              <a:lnSpc>
+                <a:spcPct val="100000"/>
+              </a:lnSpc>
+              <a:spcBef>
+                <a:spcPts val="0"/>
+              </a:spcBef>
+              <a:spcAft>
+                <a:spcPts val="0"/>
+              </a:spcAft>
+              <a:buClrTx/>
+              <a:buSzTx/>
+              <a:buFontTx/>
+              <a:buNone/>
+              <a:tabLst/>
+              <a:defRPr/>
+            </a:pPr>
+            <a:r>
+              <a:rPr lang="en-US" sz="1200" kern="1200" dirty="0">
+                <a:solidFill>
+                  <a:schemeClr val="tx1"/>
+                </a:solidFill>
+                <a:effectLst/>
+                <a:latin typeface="+mn-lt"/>
+                <a:ea typeface="+mn-ea"/>
+                <a:cs typeface="+mn-cs"/>
+              </a:rPr>
+              <a:t>Second option is </a:t>
+            </a:r>
+            <a:r>
+              <a:rPr lang="en-US" sz="1200" b="0" i="0" kern="1200" dirty="0">
+                <a:solidFill>
+                  <a:schemeClr val="tx1"/>
+                </a:solidFill>
+                <a:effectLst/>
+                <a:latin typeface="+mn-lt"/>
+                <a:ea typeface="+mn-ea"/>
+                <a:cs typeface="+mn-cs"/>
+              </a:rPr>
+              <a:t>Emulated the scope </a:t>
+            </a:r>
+            <a:r>
+              <a:rPr lang="en-US" sz="1200" b="0" i="0" kern="1200" dirty="0" err="1">
+                <a:solidFill>
+                  <a:schemeClr val="tx1"/>
+                </a:solidFill>
+                <a:effectLst/>
+                <a:latin typeface="+mn-lt"/>
+                <a:ea typeface="+mn-ea"/>
+                <a:cs typeface="+mn-cs"/>
+              </a:rPr>
+              <a:t>dynamicly</a:t>
+            </a:r>
+            <a:r>
+              <a:rPr lang="en-US" sz="1200" b="0" i="0" kern="1200" dirty="0">
+                <a:solidFill>
+                  <a:schemeClr val="tx1"/>
+                </a:solidFill>
+                <a:effectLst/>
+                <a:latin typeface="+mn-lt"/>
+                <a:ea typeface="+mn-ea"/>
+                <a:cs typeface="+mn-cs"/>
+              </a:rPr>
+              <a:t> like angular is doing (each framework hove is own name and technic but all solving the same issue in different generate way)</a:t>
+            </a:r>
+          </a:p>
+          <a:p>
+            <a:pPr marL="0" marR="0" lvl="0" indent="0" algn="l" defTabSz="914400" rtl="0" eaLnBrk="1" fontAlgn="auto" latinLnBrk="0" hangingPunct="1">
+              <a:lnSpc>
+                <a:spcPct val="100000"/>
+              </a:lnSpc>
+              <a:spcBef>
+                <a:spcPts val="0"/>
+              </a:spcBef>
+              <a:spcAft>
+                <a:spcPts val="0"/>
+              </a:spcAft>
+              <a:buClrTx/>
+              <a:buSzTx/>
+              <a:buFontTx/>
+              <a:buNone/>
+              <a:tabLst/>
+              <a:defRPr/>
+            </a:pPr>
+            <a:endParaRPr lang="en-US" sz="1200" b="0" i="0" kern="1200" dirty="0">
+              <a:solidFill>
+                <a:schemeClr val="tx1"/>
+              </a:solidFill>
+              <a:effectLst/>
+              <a:latin typeface="+mn-lt"/>
+              <a:ea typeface="+mn-ea"/>
+              <a:cs typeface="+mn-cs"/>
+            </a:endParaRPr>
+          </a:p>
+          <a:p>
+            <a:pPr marL="0" marR="0" lvl="0" indent="0" algn="l" defTabSz="914400" rtl="0" eaLnBrk="1" fontAlgn="auto" latinLnBrk="0" hangingPunct="1">
+              <a:lnSpc>
+                <a:spcPct val="100000"/>
+              </a:lnSpc>
+              <a:spcBef>
+                <a:spcPts val="0"/>
+              </a:spcBef>
+              <a:spcAft>
+                <a:spcPts val="0"/>
+              </a:spcAft>
+              <a:buClrTx/>
+              <a:buSzTx/>
+              <a:buFontTx/>
+              <a:buNone/>
+              <a:tabLst/>
+              <a:defRPr/>
+            </a:pPr>
+            <a:r>
+              <a:rPr lang="en-US" sz="1200" b="0" i="0" kern="1200" dirty="0">
+                <a:solidFill>
+                  <a:schemeClr val="tx1"/>
+                </a:solidFill>
+                <a:effectLst/>
+                <a:latin typeface="+mn-lt"/>
+                <a:ea typeface="+mn-ea"/>
+                <a:cs typeface="+mn-cs"/>
+              </a:rPr>
+              <a:t>Third option is to use shadow DOM - Shadow DOM is API providing a way to attach a hidden separated DOM (we Can put styles, JS etc.) to an element. You can think of shadow DOM as a </a:t>
+            </a:r>
+            <a:r>
+              <a:rPr lang="en-US" sz="1200" b="1" i="0" kern="1200" dirty="0">
+                <a:solidFill>
+                  <a:schemeClr val="tx1"/>
+                </a:solidFill>
+                <a:effectLst/>
+                <a:latin typeface="+mn-lt"/>
+                <a:ea typeface="+mn-ea"/>
+                <a:cs typeface="+mn-cs"/>
+              </a:rPr>
+              <a:t>scoped subtree</a:t>
+            </a:r>
+            <a:r>
+              <a:rPr lang="en-US" sz="1200" b="0" i="0" kern="1200" dirty="0">
+                <a:solidFill>
+                  <a:schemeClr val="tx1"/>
+                </a:solidFill>
+                <a:effectLst/>
+                <a:latin typeface="+mn-lt"/>
+                <a:ea typeface="+mn-ea"/>
+                <a:cs typeface="+mn-cs"/>
+              </a:rPr>
+              <a:t> inside your element.</a:t>
+            </a:r>
+          </a:p>
+          <a:p>
+            <a:pPr marL="0" marR="0" lvl="0" indent="0" algn="l" defTabSz="914400" rtl="0" eaLnBrk="1" fontAlgn="auto" latinLnBrk="0" hangingPunct="1">
+              <a:lnSpc>
+                <a:spcPct val="100000"/>
+              </a:lnSpc>
+              <a:spcBef>
+                <a:spcPts val="0"/>
+              </a:spcBef>
+              <a:spcAft>
+                <a:spcPts val="0"/>
+              </a:spcAft>
+              <a:buClrTx/>
+              <a:buSzTx/>
+              <a:buFontTx/>
+              <a:buNone/>
+              <a:tabLst/>
+              <a:defRPr/>
+            </a:pPr>
+            <a:r>
+              <a:rPr lang="en-US" sz="1200" b="0" i="0" kern="1200" dirty="0">
+                <a:solidFill>
+                  <a:schemeClr val="tx1"/>
+                </a:solidFill>
+                <a:effectLst/>
+                <a:latin typeface="+mn-lt"/>
+                <a:ea typeface="+mn-ea"/>
+                <a:cs typeface="+mn-cs"/>
+              </a:rPr>
+              <a:t>All the styles will be leaving only in this component</a:t>
+            </a:r>
+            <a:endParaRPr lang="en-US" sz="1200" kern="1200" dirty="0">
+              <a:solidFill>
+                <a:schemeClr val="tx1"/>
+              </a:solidFill>
+              <a:effectLst/>
+              <a:latin typeface="+mn-lt"/>
+              <a:ea typeface="+mn-ea"/>
+              <a:cs typeface="+mn-cs"/>
+            </a:endParaRPr>
+          </a:p>
+          <a:p>
+            <a:pPr marL="0" marR="0" lvl="0" indent="0" algn="l" defTabSz="914400" rtl="0" eaLnBrk="1" fontAlgn="auto" latinLnBrk="0" hangingPunct="1">
+              <a:lnSpc>
+                <a:spcPct val="100000"/>
+              </a:lnSpc>
+              <a:spcBef>
+                <a:spcPts val="0"/>
+              </a:spcBef>
+              <a:spcAft>
+                <a:spcPts val="0"/>
+              </a:spcAft>
+              <a:buClrTx/>
+              <a:buSzTx/>
+              <a:buFontTx/>
+              <a:buNone/>
+              <a:tabLst/>
+              <a:defRPr/>
+            </a:pPr>
+            <a:endParaRPr lang="en-US" sz="1200" kern="1200" dirty="0">
+              <a:solidFill>
+                <a:schemeClr val="tx1"/>
+              </a:solidFill>
+              <a:effectLst/>
+              <a:latin typeface="+mn-lt"/>
+              <a:ea typeface="+mn-ea"/>
+              <a:cs typeface="+mn-cs"/>
+            </a:endParaRPr>
+          </a:p>
+          <a:p>
+            <a:pPr marL="0" marR="0" lvl="0" indent="0" algn="l" defTabSz="914400" rtl="0" eaLnBrk="1" fontAlgn="auto" latinLnBrk="0" hangingPunct="1">
+              <a:lnSpc>
+                <a:spcPct val="100000"/>
+              </a:lnSpc>
+              <a:spcBef>
+                <a:spcPts val="0"/>
+              </a:spcBef>
+              <a:spcAft>
+                <a:spcPts val="0"/>
+              </a:spcAft>
+              <a:buClrTx/>
+              <a:buSzTx/>
+              <a:buFontTx/>
+              <a:buNone/>
+              <a:tabLst/>
+              <a:defRPr/>
+            </a:pPr>
+            <a:endParaRPr lang="en-US" sz="1200" kern="1200" dirty="0">
+              <a:solidFill>
+                <a:schemeClr val="tx1"/>
+              </a:solidFill>
+              <a:effectLst/>
+              <a:latin typeface="+mn-lt"/>
+              <a:ea typeface="+mn-ea"/>
+              <a:cs typeface="+mn-cs"/>
+            </a:endParaRPr>
+          </a:p>
+          <a:p>
+            <a:pPr marL="0" marR="0" lvl="0" indent="0" algn="l" defTabSz="914400" rtl="0" eaLnBrk="1" fontAlgn="auto" latinLnBrk="0" hangingPunct="1">
+              <a:lnSpc>
+                <a:spcPct val="100000"/>
+              </a:lnSpc>
+              <a:spcBef>
+                <a:spcPts val="0"/>
+              </a:spcBef>
+              <a:spcAft>
+                <a:spcPts val="0"/>
+              </a:spcAft>
+              <a:buClrTx/>
+              <a:buSzTx/>
+              <a:buFontTx/>
+              <a:buNone/>
+              <a:tabLst/>
+              <a:defRPr/>
+            </a:pPr>
+            <a:endParaRPr lang="en-US" sz="1200" kern="1200" dirty="0">
+              <a:solidFill>
+                <a:schemeClr val="tx1"/>
+              </a:solidFill>
+              <a:effectLst/>
+              <a:latin typeface="+mn-lt"/>
+              <a:ea typeface="+mn-ea"/>
+              <a:cs typeface="+mn-cs"/>
+            </a:endParaRPr>
+          </a:p>
+          <a:p>
+            <a:pPr marL="0" marR="0" lvl="0" indent="0" algn="l" defTabSz="914400" rtl="0" eaLnBrk="1" fontAlgn="auto" latinLnBrk="0" hangingPunct="1">
+              <a:lnSpc>
+                <a:spcPct val="100000"/>
+              </a:lnSpc>
+              <a:spcBef>
+                <a:spcPts val="0"/>
+              </a:spcBef>
+              <a:spcAft>
+                <a:spcPts val="0"/>
+              </a:spcAft>
+              <a:buClrTx/>
+              <a:buSzTx/>
+              <a:buFontTx/>
+              <a:buNone/>
+              <a:tabLst/>
+              <a:defRPr/>
+            </a:pPr>
+            <a:endParaRPr lang="en-US" sz="1200" kern="1200" dirty="0">
+              <a:solidFill>
+                <a:schemeClr val="tx1"/>
+              </a:solidFill>
+              <a:effectLst/>
+              <a:latin typeface="+mn-lt"/>
+              <a:ea typeface="+mn-ea"/>
+              <a:cs typeface="+mn-cs"/>
+            </a:endParaRPr>
+          </a:p>
+          <a:p>
+            <a:pPr marL="171450" marR="0" lvl="0" indent="-171450" algn="l" defTabSz="914400" rtl="0" eaLnBrk="1" fontAlgn="auto" latinLnBrk="0" hangingPunct="1">
+              <a:lnSpc>
+                <a:spcPct val="100000"/>
+              </a:lnSpc>
+              <a:spcBef>
+                <a:spcPts val="0"/>
+              </a:spcBef>
+              <a:spcAft>
+                <a:spcPts val="0"/>
+              </a:spcAft>
+              <a:buClrTx/>
+              <a:buSzTx/>
+              <a:buFontTx/>
+              <a:buChar char="-"/>
+              <a:tabLst/>
+              <a:defRPr/>
+            </a:pPr>
+            <a:r>
+              <a:rPr lang="en-US" dirty="0">
+                <a:hlinkClick r:id="rId3"/>
+              </a:rPr>
+              <a:t>https://dev.to/maxart2501/css-for-an-encapsulated-web-7fo</a:t>
+            </a:r>
+            <a:endParaRPr lang="en-US" dirty="0"/>
+          </a:p>
+          <a:p>
+            <a:pPr marL="171450" marR="0" lvl="0" indent="-171450" algn="l" defTabSz="914400" rtl="0" eaLnBrk="1" fontAlgn="auto" latinLnBrk="0" hangingPunct="1">
+              <a:lnSpc>
+                <a:spcPct val="100000"/>
+              </a:lnSpc>
+              <a:spcBef>
+                <a:spcPts val="0"/>
+              </a:spcBef>
+              <a:spcAft>
+                <a:spcPts val="0"/>
+              </a:spcAft>
+              <a:buClrTx/>
+              <a:buSzTx/>
+              <a:buFontTx/>
+              <a:buChar char="-"/>
+              <a:tabLst/>
+              <a:defRPr/>
+            </a:pPr>
+            <a:r>
+              <a:rPr lang="en-US" dirty="0">
+                <a:hlinkClick r:id="rId4"/>
+              </a:rPr>
+              <a:t>https://medium.com/@hammadtariq65/style-encapsulation-in-reactjs-ba4e3212a9f</a:t>
+            </a:r>
+            <a:endParaRPr lang="en-US" dirty="0"/>
+          </a:p>
+          <a:p>
+            <a:pPr marL="171450" marR="0" lvl="0" indent="-171450" algn="l" defTabSz="914400" rtl="0" eaLnBrk="1" fontAlgn="auto" latinLnBrk="0" hangingPunct="1">
+              <a:lnSpc>
+                <a:spcPct val="100000"/>
+              </a:lnSpc>
+              <a:spcBef>
+                <a:spcPts val="0"/>
+              </a:spcBef>
+              <a:spcAft>
+                <a:spcPts val="0"/>
+              </a:spcAft>
+              <a:buClrTx/>
+              <a:buSzTx/>
+              <a:buFontTx/>
+              <a:buChar char="-"/>
+              <a:tabLst/>
+              <a:defRPr/>
+            </a:pPr>
+            <a:r>
+              <a:rPr lang="en-US" dirty="0">
+                <a:hlinkClick r:id="rId5"/>
+              </a:rPr>
+              <a:t>https://developers.google.com/web/fundamentals/web-components/shadowdom</a:t>
+            </a:r>
+            <a:endParaRPr lang="en-US" dirty="0"/>
+          </a:p>
+          <a:p>
+            <a:pPr marL="171450" marR="0" lvl="0" indent="-171450" algn="l" defTabSz="914400" rtl="0" eaLnBrk="1" fontAlgn="auto" latinLnBrk="0" hangingPunct="1">
+              <a:lnSpc>
+                <a:spcPct val="100000"/>
+              </a:lnSpc>
+              <a:spcBef>
+                <a:spcPts val="0"/>
+              </a:spcBef>
+              <a:spcAft>
+                <a:spcPts val="0"/>
+              </a:spcAft>
+              <a:buClrTx/>
+              <a:buSzTx/>
+              <a:buFontTx/>
+              <a:buChar char="-"/>
+              <a:tabLst/>
+              <a:defRPr/>
+            </a:pPr>
+            <a:r>
+              <a:rPr lang="en-US" dirty="0">
+                <a:hlinkClick r:id="rId6"/>
+              </a:rPr>
+              <a:t>https://blog.logrocket.com/understanding-shadow-dom-v1-fa9b81ebe3ac/</a:t>
+            </a:r>
+            <a:endParaRPr lang="en-US" sz="1200" kern="1200" dirty="0">
+              <a:solidFill>
+                <a:schemeClr val="tx1"/>
+              </a:solidFill>
+              <a:effectLst/>
+              <a:latin typeface="+mn-lt"/>
+              <a:ea typeface="+mn-ea"/>
+              <a:cs typeface="+mn-cs"/>
+            </a:endParaRPr>
+          </a:p>
         </p:txBody>
       </p:sp>
       <p:sp>
@@ -2700,7 +3767,7 @@
     </p:spTree>
     <p:extLst>
       <p:ext uri="{BB962C8B-B14F-4D97-AF65-F5344CB8AC3E}">
-        <p14:creationId xmlns:p14="http://schemas.microsoft.com/office/powerpoint/2010/main" val="994558375"/>
+        <p14:creationId xmlns:p14="http://schemas.microsoft.com/office/powerpoint/2010/main" val="2012891520"/>
       </p:ext>
     </p:extLst>
   </p:cSld>
@@ -2839,7 +3906,7 @@
           <a:p>
             <a:fld id="{F472E424-CC75-4448-A1B5-6FCA6BFEE599}" type="datetimeFigureOut">
               <a:rPr lang="he-IL" smtClean="0"/>
-              <a:t>כ"ז/סיון/תשע"ט</a:t>
+              <a:t>י"ח/תמוז/תשע"ט</a:t>
             </a:fld>
             <a:endParaRPr lang="he-IL"/>
           </a:p>
@@ -3007,7 +4074,7 @@
           <a:p>
             <a:fld id="{F472E424-CC75-4448-A1B5-6FCA6BFEE599}" type="datetimeFigureOut">
               <a:rPr lang="he-IL" smtClean="0"/>
-              <a:t>כ"ז/סיון/תשע"ט</a:t>
+              <a:t>י"ח/תמוז/תשע"ט</a:t>
             </a:fld>
             <a:endParaRPr lang="he-IL"/>
           </a:p>
@@ -3185,7 +4252,7 @@
           <a:p>
             <a:fld id="{F472E424-CC75-4448-A1B5-6FCA6BFEE599}" type="datetimeFigureOut">
               <a:rPr lang="he-IL" smtClean="0"/>
-              <a:t>כ"ז/סיון/תשע"ט</a:t>
+              <a:t>י"ח/תמוז/תשע"ט</a:t>
             </a:fld>
             <a:endParaRPr lang="he-IL"/>
           </a:p>
@@ -3353,7 +4420,7 @@
           <a:p>
             <a:fld id="{F472E424-CC75-4448-A1B5-6FCA6BFEE599}" type="datetimeFigureOut">
               <a:rPr lang="he-IL" smtClean="0"/>
-              <a:t>כ"ז/סיון/תשע"ט</a:t>
+              <a:t>י"ח/תמוז/תשע"ט</a:t>
             </a:fld>
             <a:endParaRPr lang="he-IL"/>
           </a:p>
@@ -3598,7 +4665,7 @@
           <a:p>
             <a:fld id="{F472E424-CC75-4448-A1B5-6FCA6BFEE599}" type="datetimeFigureOut">
               <a:rPr lang="he-IL" smtClean="0"/>
-              <a:t>כ"ז/סיון/תשע"ט</a:t>
+              <a:t>י"ח/תמוז/תשע"ט</a:t>
             </a:fld>
             <a:endParaRPr lang="he-IL"/>
           </a:p>
@@ -3827,7 +4894,7 @@
           <a:p>
             <a:fld id="{F472E424-CC75-4448-A1B5-6FCA6BFEE599}" type="datetimeFigureOut">
               <a:rPr lang="he-IL" smtClean="0"/>
-              <a:t>כ"ז/סיון/תשע"ט</a:t>
+              <a:t>י"ח/תמוז/תשע"ט</a:t>
             </a:fld>
             <a:endParaRPr lang="he-IL"/>
           </a:p>
@@ -4191,7 +5258,7 @@
           <a:p>
             <a:fld id="{F472E424-CC75-4448-A1B5-6FCA6BFEE599}" type="datetimeFigureOut">
               <a:rPr lang="he-IL" smtClean="0"/>
-              <a:t>כ"ז/סיון/תשע"ט</a:t>
+              <a:t>י"ח/תמוז/תשע"ט</a:t>
             </a:fld>
             <a:endParaRPr lang="he-IL"/>
           </a:p>
@@ -4308,7 +5375,7 @@
           <a:p>
             <a:fld id="{F472E424-CC75-4448-A1B5-6FCA6BFEE599}" type="datetimeFigureOut">
               <a:rPr lang="he-IL" smtClean="0"/>
-              <a:t>כ"ז/סיון/תשע"ט</a:t>
+              <a:t>י"ח/תמוז/תשע"ט</a:t>
             </a:fld>
             <a:endParaRPr lang="he-IL"/>
           </a:p>
@@ -4403,7 +5470,7 @@
           <a:p>
             <a:fld id="{F472E424-CC75-4448-A1B5-6FCA6BFEE599}" type="datetimeFigureOut">
               <a:rPr lang="he-IL" smtClean="0"/>
-              <a:t>כ"ז/סיון/תשע"ט</a:t>
+              <a:t>י"ח/תמוז/תשע"ט</a:t>
             </a:fld>
             <a:endParaRPr lang="he-IL"/>
           </a:p>
@@ -4678,7 +5745,7 @@
           <a:p>
             <a:fld id="{F472E424-CC75-4448-A1B5-6FCA6BFEE599}" type="datetimeFigureOut">
               <a:rPr lang="he-IL" smtClean="0"/>
-              <a:t>כ"ז/סיון/תשע"ט</a:t>
+              <a:t>י"ח/תמוז/תשע"ט</a:t>
             </a:fld>
             <a:endParaRPr lang="he-IL"/>
           </a:p>
@@ -4930,7 +5997,7 @@
           <a:p>
             <a:fld id="{F472E424-CC75-4448-A1B5-6FCA6BFEE599}" type="datetimeFigureOut">
               <a:rPr lang="he-IL" smtClean="0"/>
-              <a:t>כ"ז/סיון/תשע"ט</a:t>
+              <a:t>י"ח/תמוז/תשע"ט</a:t>
             </a:fld>
             <a:endParaRPr lang="he-IL"/>
           </a:p>
@@ -5141,7 +6208,7 @@
           <a:p>
             <a:fld id="{F472E424-CC75-4448-A1B5-6FCA6BFEE599}" type="datetimeFigureOut">
               <a:rPr lang="he-IL" smtClean="0"/>
-              <a:t>כ"ז/סיון/תשע"ט</a:t>
+              <a:t>י"ח/תמוז/תשע"ט</a:t>
             </a:fld>
             <a:endParaRPr lang="he-IL"/>
           </a:p>
@@ -6096,9 +7163,7 @@
             <a:avLst/>
           </a:prstGeom>
           <a:solidFill>
-            <a:schemeClr val="accent1">
-              <a:lumMod val="75000"/>
-            </a:schemeClr>
+            <a:schemeClr val="accent2"/>
           </a:solidFill>
           <a:ln>
             <a:noFill/>
@@ -6160,7 +7225,7 @@
                   <a:schemeClr val="bg1"/>
                 </a:solidFill>
               </a:rPr>
-              <a:t>CSS Encapsulation</a:t>
+              <a:t>Single Source of Truth</a:t>
             </a:r>
             <a:endParaRPr lang="en-US" altLang="en-US" sz="6000" b="1" dirty="0">
               <a:solidFill>
@@ -6174,7 +7239,7 @@
     </p:spTree>
     <p:extLst>
       <p:ext uri="{BB962C8B-B14F-4D97-AF65-F5344CB8AC3E}">
-        <p14:creationId xmlns:p14="http://schemas.microsoft.com/office/powerpoint/2010/main" val="3716987637"/>
+        <p14:creationId xmlns:p14="http://schemas.microsoft.com/office/powerpoint/2010/main" val="1739163135"/>
       </p:ext>
     </p:extLst>
   </p:cSld>
@@ -6228,9 +7293,7 @@
             <a:avLst/>
           </a:prstGeom>
           <a:solidFill>
-            <a:schemeClr val="accent1">
-              <a:lumMod val="75000"/>
-            </a:schemeClr>
+            <a:schemeClr val="accent2"/>
           </a:solidFill>
           <a:ln>
             <a:noFill/>
@@ -6292,7 +7355,7 @@
                   <a:schemeClr val="bg1"/>
                 </a:solidFill>
               </a:rPr>
-              <a:t>Single Source of Truth</a:t>
+              <a:t>State Management</a:t>
             </a:r>
             <a:endParaRPr lang="en-US" altLang="en-US" sz="6000" b="1" dirty="0">
               <a:solidFill>
@@ -6306,7 +7369,7 @@
     </p:spTree>
     <p:extLst>
       <p:ext uri="{BB962C8B-B14F-4D97-AF65-F5344CB8AC3E}">
-        <p14:creationId xmlns:p14="http://schemas.microsoft.com/office/powerpoint/2010/main" val="1739163135"/>
+        <p14:creationId xmlns:p14="http://schemas.microsoft.com/office/powerpoint/2010/main" val="1725664935"/>
       </p:ext>
     </p:extLst>
   </p:cSld>
@@ -6424,15 +7487,7 @@
                   <a:schemeClr val="bg1"/>
                 </a:solidFill>
               </a:rPr>
-              <a:t>State </a:t>
-            </a:r>
-            <a:r>
-              <a:rPr lang="en-US" sz="6000" dirty="0" err="1">
-                <a:solidFill>
-                  <a:schemeClr val="bg1"/>
-                </a:solidFill>
-              </a:rPr>
-              <a:t>Managment</a:t>
+              <a:t>CSS Encapsulation</a:t>
             </a:r>
             <a:endParaRPr lang="en-US" altLang="en-US" sz="6000" b="1" dirty="0">
               <a:solidFill>
@@ -6446,7 +7501,7 @@
     </p:spTree>
     <p:extLst>
       <p:ext uri="{BB962C8B-B14F-4D97-AF65-F5344CB8AC3E}">
-        <p14:creationId xmlns:p14="http://schemas.microsoft.com/office/powerpoint/2010/main" val="1725664935"/>
+        <p14:creationId xmlns:p14="http://schemas.microsoft.com/office/powerpoint/2010/main" val="3716987637"/>
       </p:ext>
     </p:extLst>
   </p:cSld>

</xml_diff>

<commit_message>
cat layout - break to components
</commit_message>
<xml_diff>
--- a/presentations/chapter-4/Practical Web Dev.pptx
+++ b/presentations/chapter-4/Practical Web Dev.pptx
@@ -2608,8 +2608,29 @@
                 <a:ea typeface="+mn-ea"/>
                 <a:cs typeface="+mn-cs"/>
               </a:rPr>
-              <a:t>Show cats images and what will be a component over there.</a:t>
-            </a:r>
+              <a:t>Ask them how they will break it </a:t>
+            </a:r>
+            <a:r>
+              <a:rPr lang="en-US" sz="1200" kern="1200">
+                <a:solidFill>
+                  <a:schemeClr val="tx1"/>
+                </a:solidFill>
+                <a:effectLst/>
+                <a:latin typeface="+mn-lt"/>
+                <a:ea typeface="+mn-ea"/>
+                <a:cs typeface="+mn-cs"/>
+              </a:rPr>
+              <a:t>to components</a:t>
+            </a:r>
+            <a:endParaRPr lang="en-US" sz="1200" kern="1200" dirty="0">
+              <a:solidFill>
+                <a:schemeClr val="tx1"/>
+              </a:solidFill>
+              <a:effectLst/>
+              <a:latin typeface="+mn-lt"/>
+              <a:ea typeface="+mn-ea"/>
+              <a:cs typeface="+mn-cs"/>
+            </a:endParaRPr>
           </a:p>
           <a:p>
             <a:pPr marL="0" marR="0" lvl="0" indent="0" algn="l" defTabSz="914400" rtl="0" eaLnBrk="1" fontAlgn="auto" latinLnBrk="0" hangingPunct="1">
@@ -7704,7 +7725,9 @@
             <a:avLst/>
           </a:prstGeom>
           <a:solidFill>
-            <a:schemeClr val="accent2"/>
+            <a:schemeClr val="accent1">
+              <a:lumMod val="75000"/>
+            </a:schemeClr>
           </a:solidFill>
           <a:ln>
             <a:noFill/>
@@ -7766,7 +7789,7 @@
                   <a:schemeClr val="bg1"/>
                 </a:solidFill>
               </a:rPr>
-              <a:t>Cat Image Example</a:t>
+              <a:t>Break Cat Layout</a:t>
             </a:r>
             <a:endParaRPr lang="en-US" altLang="en-US" sz="6000" b="1" dirty="0">
               <a:solidFill>

</xml_diff>

<commit_message>
Add state-management & single source of truth
</commit_message>
<xml_diff>
--- a/presentations/chapter-4/Practical Web Dev.pptx
+++ b/presentations/chapter-4/Practical Web Dev.pptx
@@ -5,7 +5,7 @@
     <p:sldMasterId id="2147483648" r:id="rId1"/>
   </p:sldMasterIdLst>
   <p:notesMasterIdLst>
-    <p:notesMasterId r:id="rId12"/>
+    <p:notesMasterId r:id="rId11"/>
   </p:notesMasterIdLst>
   <p:sldIdLst>
     <p:sldId id="408" r:id="rId2"/>
@@ -13,11 +13,10 @@
     <p:sldId id="410" r:id="rId4"/>
     <p:sldId id="411" r:id="rId5"/>
     <p:sldId id="412" r:id="rId6"/>
-    <p:sldId id="415" r:id="rId7"/>
-    <p:sldId id="413" r:id="rId8"/>
-    <p:sldId id="414" r:id="rId9"/>
-    <p:sldId id="416" r:id="rId10"/>
-    <p:sldId id="417" r:id="rId11"/>
+    <p:sldId id="413" r:id="rId7"/>
+    <p:sldId id="414" r:id="rId8"/>
+    <p:sldId id="416" r:id="rId9"/>
+    <p:sldId id="417" r:id="rId10"/>
   </p:sldIdLst>
   <p:sldSz cx="12192000" cy="6858000"/>
   <p:notesSz cx="6858000" cy="9144000"/>
@@ -129,7 +128,6 @@
             <p14:sldId id="410"/>
             <p14:sldId id="411"/>
             <p14:sldId id="412"/>
-            <p14:sldId id="415"/>
             <p14:sldId id="413"/>
             <p14:sldId id="414"/>
             <p14:sldId id="416"/>
@@ -606,182 +604,6 @@
 </p:notes>
 </file>
 
-<file path=ppt/notesSlides/notesSlide10.xml><?xml version="1.0" encoding="utf-8"?>
-<p:notes xmlns:a="http://schemas.openxmlformats.org/drawingml/2006/main" xmlns:r="http://schemas.openxmlformats.org/officeDocument/2006/relationships" xmlns:p="http://schemas.openxmlformats.org/presentationml/2006/main">
-  <p:cSld>
-    <p:spTree>
-      <p:nvGrpSpPr>
-        <p:cNvPr id="1" name=""/>
-        <p:cNvGrpSpPr/>
-        <p:nvPr/>
-      </p:nvGrpSpPr>
-      <p:grpSpPr>
-        <a:xfrm>
-          <a:off x="0" y="0"/>
-          <a:ext cx="0" cy="0"/>
-          <a:chOff x="0" y="0"/>
-          <a:chExt cx="0" cy="0"/>
-        </a:xfrm>
-      </p:grpSpPr>
-      <p:sp>
-        <p:nvSpPr>
-          <p:cNvPr id="2" name="Slide Image Placeholder 1"/>
-          <p:cNvSpPr>
-            <a:spLocks noGrp="1" noRot="1" noChangeAspect="1"/>
-          </p:cNvSpPr>
-          <p:nvPr>
-            <p:ph type="sldImg"/>
-          </p:nvPr>
-        </p:nvSpPr>
-        <p:spPr/>
-      </p:sp>
-      <p:sp>
-        <p:nvSpPr>
-          <p:cNvPr id="3" name="Notes Placeholder 2"/>
-          <p:cNvSpPr>
-            <a:spLocks noGrp="1"/>
-          </p:cNvSpPr>
-          <p:nvPr>
-            <p:ph type="body" idx="1"/>
-          </p:nvPr>
-        </p:nvSpPr>
-        <p:spPr/>
-        <p:txBody>
-          <a:bodyPr/>
-          <a:lstStyle/>
-          <a:p>
-            <a:pPr marL="0" marR="0" lvl="0" indent="0" algn="l" defTabSz="914400" rtl="0" eaLnBrk="1" fontAlgn="auto" latinLnBrk="0" hangingPunct="1">
-              <a:lnSpc>
-                <a:spcPct val="100000"/>
-              </a:lnSpc>
-              <a:spcBef>
-                <a:spcPts val="0"/>
-              </a:spcBef>
-              <a:spcAft>
-                <a:spcPts val="0"/>
-              </a:spcAft>
-              <a:buClrTx/>
-              <a:buSzTx/>
-              <a:buFontTx/>
-              <a:buNone/>
-              <a:tabLst/>
-              <a:defRPr/>
-            </a:pPr>
-            <a:r>
-              <a:rPr lang="en-US" sz="1200" dirty="0">
-                <a:solidFill>
-                  <a:schemeClr val="bg1"/>
-                </a:solidFill>
-              </a:rPr>
-              <a:t>Change empty card to real card with data and UI</a:t>
-            </a:r>
-          </a:p>
-          <a:p>
-            <a:pPr marL="0" marR="0" lvl="0" indent="0" algn="l" defTabSz="914400" rtl="0" eaLnBrk="1" fontAlgn="auto" latinLnBrk="0" hangingPunct="1">
-              <a:lnSpc>
-                <a:spcPct val="100000"/>
-              </a:lnSpc>
-              <a:spcBef>
-                <a:spcPts val="0"/>
-              </a:spcBef>
-              <a:spcAft>
-                <a:spcPts val="0"/>
-              </a:spcAft>
-              <a:buClrTx/>
-              <a:buSzTx/>
-              <a:buFontTx/>
-              <a:buNone/>
-              <a:tabLst/>
-              <a:defRPr/>
-            </a:pPr>
-            <a:endParaRPr lang="en-US" sz="1200" kern="1200" dirty="0">
-              <a:solidFill>
-                <a:schemeClr val="bg1"/>
-              </a:solidFill>
-              <a:effectLst/>
-              <a:latin typeface="+mn-lt"/>
-              <a:ea typeface="+mn-ea"/>
-              <a:cs typeface="+mn-cs"/>
-            </a:endParaRPr>
-          </a:p>
-          <a:p>
-            <a:pPr marL="0" marR="0" lvl="0" indent="0" algn="l" defTabSz="914400" rtl="0" eaLnBrk="1" fontAlgn="auto" latinLnBrk="0" hangingPunct="1">
-              <a:lnSpc>
-                <a:spcPct val="100000"/>
-              </a:lnSpc>
-              <a:spcBef>
-                <a:spcPts val="0"/>
-              </a:spcBef>
-              <a:spcAft>
-                <a:spcPts val="0"/>
-              </a:spcAft>
-              <a:buClrTx/>
-              <a:buSzTx/>
-              <a:buFontTx/>
-              <a:buNone/>
-              <a:tabLst/>
-              <a:defRPr/>
-            </a:pPr>
-            <a:r>
-              <a:rPr lang="en-US" sz="1200" kern="1200">
-                <a:solidFill>
-                  <a:schemeClr val="bg1"/>
-                </a:solidFill>
-                <a:effectLst/>
-                <a:latin typeface="+mn-lt"/>
-                <a:ea typeface="+mn-ea"/>
-                <a:cs typeface="+mn-cs"/>
-              </a:rPr>
-              <a:t>After that connect the hooks for click events</a:t>
-            </a:r>
-            <a:endParaRPr lang="en-US" sz="1200" kern="1200" dirty="0">
-              <a:solidFill>
-                <a:schemeClr val="tx1"/>
-              </a:solidFill>
-              <a:effectLst/>
-              <a:latin typeface="+mn-lt"/>
-              <a:ea typeface="+mn-ea"/>
-              <a:cs typeface="+mn-cs"/>
-            </a:endParaRPr>
-          </a:p>
-        </p:txBody>
-      </p:sp>
-      <p:sp>
-        <p:nvSpPr>
-          <p:cNvPr id="4" name="Slide Number Placeholder 3"/>
-          <p:cNvSpPr>
-            <a:spLocks noGrp="1"/>
-          </p:cNvSpPr>
-          <p:nvPr>
-            <p:ph type="sldNum" sz="quarter" idx="10"/>
-          </p:nvPr>
-        </p:nvSpPr>
-        <p:spPr/>
-        <p:txBody>
-          <a:bodyPr/>
-          <a:lstStyle/>
-          <a:p>
-            <a:fld id="{595D0871-5AD0-4670-BDA8-FBE649F625DD}" type="slidenum">
-              <a:rPr lang="he-IL" smtClean="0"/>
-              <a:t>10</a:t>
-            </a:fld>
-            <a:endParaRPr lang="he-IL"/>
-          </a:p>
-        </p:txBody>
-      </p:sp>
-    </p:spTree>
-    <p:extLst>
-      <p:ext uri="{BB962C8B-B14F-4D97-AF65-F5344CB8AC3E}">
-        <p14:creationId xmlns:p14="http://schemas.microsoft.com/office/powerpoint/2010/main" val="705909408"/>
-      </p:ext>
-    </p:extLst>
-  </p:cSld>
-  <p:clrMapOvr>
-    <a:masterClrMapping/>
-  </p:clrMapOvr>
-</p:notes>
-</file>
-
 <file path=ppt/notesSlides/notesSlide2.xml><?xml version="1.0" encoding="utf-8"?>
 <p:notes xmlns:a="http://schemas.openxmlformats.org/drawingml/2006/main" xmlns:r="http://schemas.openxmlformats.org/officeDocument/2006/relationships" xmlns:p="http://schemas.openxmlformats.org/presentationml/2006/main">
   <p:cSld>
@@ -2759,6 +2581,161 @@
               <a:tabLst/>
               <a:defRPr/>
             </a:pPr>
+            <a:r>
+              <a:rPr lang="en-US" sz="1200" kern="1200" dirty="0">
+                <a:solidFill>
+                  <a:schemeClr val="tx1"/>
+                </a:solidFill>
+                <a:effectLst/>
+                <a:latin typeface="+mn-lt"/>
+                <a:ea typeface="+mn-ea"/>
+                <a:cs typeface="+mn-cs"/>
+              </a:rPr>
+              <a:t>What is state management?</a:t>
+            </a:r>
+          </a:p>
+          <a:p>
+            <a:pPr marL="0" marR="0" lvl="0" indent="0" algn="l" defTabSz="914400" rtl="0" eaLnBrk="1" fontAlgn="auto" latinLnBrk="0" hangingPunct="1">
+              <a:lnSpc>
+                <a:spcPct val="100000"/>
+              </a:lnSpc>
+              <a:spcBef>
+                <a:spcPts val="0"/>
+              </a:spcBef>
+              <a:spcAft>
+                <a:spcPts val="0"/>
+              </a:spcAft>
+              <a:buClrTx/>
+              <a:buSzTx/>
+              <a:buFontTx/>
+              <a:buNone/>
+              <a:tabLst/>
+              <a:defRPr/>
+            </a:pPr>
+            <a:r>
+              <a:rPr lang="en-US" sz="1200" kern="1200" dirty="0">
+                <a:solidFill>
+                  <a:schemeClr val="tx1"/>
+                </a:solidFill>
+                <a:effectLst/>
+                <a:latin typeface="+mn-lt"/>
+                <a:ea typeface="+mn-ea"/>
+                <a:cs typeface="+mn-cs"/>
+              </a:rPr>
+              <a:t>State management is how we share/manage our data across application.</a:t>
+            </a:r>
+          </a:p>
+          <a:p>
+            <a:pPr marL="0" marR="0" lvl="0" indent="0" algn="l" defTabSz="914400" rtl="0" eaLnBrk="1" fontAlgn="auto" latinLnBrk="0" hangingPunct="1">
+              <a:lnSpc>
+                <a:spcPct val="100000"/>
+              </a:lnSpc>
+              <a:spcBef>
+                <a:spcPts val="0"/>
+              </a:spcBef>
+              <a:spcAft>
+                <a:spcPts val="0"/>
+              </a:spcAft>
+              <a:buClrTx/>
+              <a:buSzTx/>
+              <a:buFontTx/>
+              <a:buNone/>
+              <a:tabLst/>
+              <a:defRPr/>
+            </a:pPr>
+            <a:r>
+              <a:rPr lang="en-US" sz="1200" kern="1200" dirty="0">
+                <a:solidFill>
+                  <a:schemeClr val="tx1"/>
+                </a:solidFill>
+                <a:effectLst/>
+                <a:latin typeface="+mn-lt"/>
+                <a:ea typeface="+mn-ea"/>
+                <a:cs typeface="+mn-cs"/>
+              </a:rPr>
+              <a:t>A lot of time we want to share data with different or unrelated pieces of our application</a:t>
+            </a:r>
+          </a:p>
+          <a:p>
+            <a:pPr marL="0" marR="0" lvl="0" indent="0" algn="l" defTabSz="914400" rtl="0" eaLnBrk="1" fontAlgn="auto" latinLnBrk="0" hangingPunct="1">
+              <a:lnSpc>
+                <a:spcPct val="100000"/>
+              </a:lnSpc>
+              <a:spcBef>
+                <a:spcPts val="0"/>
+              </a:spcBef>
+              <a:spcAft>
+                <a:spcPts val="0"/>
+              </a:spcAft>
+              <a:buClrTx/>
+              <a:buSzTx/>
+              <a:buFontTx/>
+              <a:buNone/>
+              <a:tabLst/>
+              <a:defRPr/>
+            </a:pPr>
+            <a:r>
+              <a:rPr lang="en-US" sz="1200" kern="1200" dirty="0">
+                <a:solidFill>
+                  <a:schemeClr val="tx1"/>
+                </a:solidFill>
+                <a:effectLst/>
+                <a:latin typeface="+mn-lt"/>
+                <a:ea typeface="+mn-ea"/>
+                <a:cs typeface="+mn-cs"/>
+              </a:rPr>
+              <a:t>Like if we are fetching user information we will need it in different places of our application,</a:t>
+            </a:r>
+          </a:p>
+          <a:p>
+            <a:pPr marL="0" marR="0" lvl="0" indent="0" algn="l" defTabSz="914400" rtl="0" eaLnBrk="1" fontAlgn="auto" latinLnBrk="0" hangingPunct="1">
+              <a:lnSpc>
+                <a:spcPct val="100000"/>
+              </a:lnSpc>
+              <a:spcBef>
+                <a:spcPts val="0"/>
+              </a:spcBef>
+              <a:spcAft>
+                <a:spcPts val="0"/>
+              </a:spcAft>
+              <a:buClrTx/>
+              <a:buSzTx/>
+              <a:buFontTx/>
+              <a:buNone/>
+              <a:tabLst/>
+              <a:defRPr/>
+            </a:pPr>
+            <a:r>
+              <a:rPr lang="en-US" sz="1200" kern="1200" dirty="0">
+                <a:solidFill>
+                  <a:schemeClr val="tx1"/>
+                </a:solidFill>
+                <a:effectLst/>
+                <a:latin typeface="+mn-lt"/>
+                <a:ea typeface="+mn-ea"/>
+                <a:cs typeface="+mn-cs"/>
+              </a:rPr>
+              <a:t>We might need it for our header, for preventing navigation to restricted routes, etc.</a:t>
+            </a:r>
+          </a:p>
+          <a:p>
+            <a:pPr marL="0" marR="0" lvl="0" indent="0" algn="l" defTabSz="914400" rtl="0" eaLnBrk="1" fontAlgn="auto" latinLnBrk="0" hangingPunct="1">
+              <a:lnSpc>
+                <a:spcPct val="100000"/>
+              </a:lnSpc>
+              <a:spcBef>
+                <a:spcPts val="0"/>
+              </a:spcBef>
+              <a:spcAft>
+                <a:spcPts val="0"/>
+              </a:spcAft>
+              <a:buClrTx/>
+              <a:buSzTx/>
+              <a:buFontTx/>
+              <a:buNone/>
+              <a:tabLst/>
+              <a:defRPr/>
+            </a:pPr>
             <a:endParaRPr lang="en-US" sz="1200" kern="1200" dirty="0">
               <a:solidFill>
                 <a:schemeClr val="tx1"/>
@@ -2769,6 +2746,600 @@
               <a:cs typeface="+mn-cs"/>
             </a:endParaRPr>
           </a:p>
+          <a:p>
+            <a:pPr marL="0" marR="0" lvl="0" indent="0" algn="l" defTabSz="914400" rtl="0" eaLnBrk="1" fontAlgn="auto" latinLnBrk="0" hangingPunct="1">
+              <a:lnSpc>
+                <a:spcPct val="100000"/>
+              </a:lnSpc>
+              <a:spcBef>
+                <a:spcPts val="0"/>
+              </a:spcBef>
+              <a:spcAft>
+                <a:spcPts val="0"/>
+              </a:spcAft>
+              <a:buClrTx/>
+              <a:buSzTx/>
+              <a:buFontTx/>
+              <a:buNone/>
+              <a:tabLst/>
+              <a:defRPr/>
+            </a:pPr>
+            <a:r>
+              <a:rPr lang="en-US" sz="1200" kern="1200" dirty="0">
+                <a:solidFill>
+                  <a:schemeClr val="tx1"/>
+                </a:solidFill>
+                <a:effectLst/>
+                <a:latin typeface="+mn-lt"/>
+                <a:ea typeface="+mn-ea"/>
+                <a:cs typeface="+mn-cs"/>
+              </a:rPr>
+              <a:t>So how do we handle shared data?</a:t>
+            </a:r>
+          </a:p>
+          <a:p>
+            <a:pPr marL="0" marR="0" lvl="0" indent="0" algn="l" defTabSz="914400" rtl="0" eaLnBrk="1" fontAlgn="auto" latinLnBrk="0" hangingPunct="1">
+              <a:lnSpc>
+                <a:spcPct val="100000"/>
+              </a:lnSpc>
+              <a:spcBef>
+                <a:spcPts val="0"/>
+              </a:spcBef>
+              <a:spcAft>
+                <a:spcPts val="0"/>
+              </a:spcAft>
+              <a:buClrTx/>
+              <a:buSzTx/>
+              <a:buFontTx/>
+              <a:buNone/>
+              <a:tabLst/>
+              <a:defRPr/>
+            </a:pPr>
+            <a:r>
+              <a:rPr lang="en-US" sz="1200" kern="1200" dirty="0">
+                <a:solidFill>
+                  <a:schemeClr val="tx1"/>
+                </a:solidFill>
+                <a:effectLst/>
+                <a:latin typeface="+mn-lt"/>
+                <a:ea typeface="+mn-ea"/>
+                <a:cs typeface="+mn-cs"/>
+              </a:rPr>
+              <a:t>For that we have state management</a:t>
+            </a:r>
+          </a:p>
+          <a:p>
+            <a:pPr marL="0" marR="0" lvl="0" indent="0" algn="l" defTabSz="914400" rtl="0" eaLnBrk="1" fontAlgn="auto" latinLnBrk="0" hangingPunct="1">
+              <a:lnSpc>
+                <a:spcPct val="100000"/>
+              </a:lnSpc>
+              <a:spcBef>
+                <a:spcPts val="0"/>
+              </a:spcBef>
+              <a:spcAft>
+                <a:spcPts val="0"/>
+              </a:spcAft>
+              <a:buClrTx/>
+              <a:buSzTx/>
+              <a:buFontTx/>
+              <a:buNone/>
+              <a:tabLst/>
+              <a:defRPr/>
+            </a:pPr>
+            <a:r>
+              <a:rPr lang="en-US" sz="1200" b="0" i="0" kern="1200" dirty="0">
+                <a:solidFill>
+                  <a:schemeClr val="tx1"/>
+                </a:solidFill>
+                <a:effectLst/>
+                <a:latin typeface="+mn-lt"/>
+                <a:ea typeface="+mn-ea"/>
+                <a:cs typeface="+mn-cs"/>
+              </a:rPr>
+              <a:t>generally use what is known as a </a:t>
+            </a:r>
+            <a:r>
+              <a:rPr lang="en-US" sz="1200" b="1" i="0" kern="1200" dirty="0">
+                <a:solidFill>
+                  <a:schemeClr val="tx1"/>
+                </a:solidFill>
+                <a:effectLst/>
+                <a:latin typeface="+mn-lt"/>
+                <a:ea typeface="+mn-ea"/>
+                <a:cs typeface="+mn-cs"/>
+              </a:rPr>
+              <a:t>store pattern </a:t>
+            </a:r>
+            <a:r>
+              <a:rPr lang="en-US" sz="1200" b="0" i="0" kern="1200" dirty="0">
+                <a:solidFill>
+                  <a:schemeClr val="tx1"/>
+                </a:solidFill>
+                <a:effectLst/>
+                <a:latin typeface="+mn-lt"/>
+                <a:ea typeface="+mn-ea"/>
+                <a:cs typeface="+mn-cs"/>
+              </a:rPr>
+              <a:t>where all actions that mutate or change the store’s state are put inside a single Store class.</a:t>
+            </a:r>
+          </a:p>
+          <a:p>
+            <a:pPr marL="0" marR="0" lvl="0" indent="0" algn="l" defTabSz="914400" rtl="0" eaLnBrk="1" fontAlgn="auto" latinLnBrk="0" hangingPunct="1">
+              <a:lnSpc>
+                <a:spcPct val="100000"/>
+              </a:lnSpc>
+              <a:spcBef>
+                <a:spcPts val="0"/>
+              </a:spcBef>
+              <a:spcAft>
+                <a:spcPts val="0"/>
+              </a:spcAft>
+              <a:buClrTx/>
+              <a:buSzTx/>
+              <a:buFontTx/>
+              <a:buNone/>
+              <a:tabLst/>
+              <a:defRPr/>
+            </a:pPr>
+            <a:r>
+              <a:rPr lang="en-US" sz="1200" b="0" i="0" kern="1200" dirty="0">
+                <a:solidFill>
+                  <a:schemeClr val="tx1"/>
+                </a:solidFill>
+                <a:effectLst/>
+                <a:latin typeface="+mn-lt"/>
+                <a:ea typeface="+mn-ea"/>
+                <a:cs typeface="+mn-cs"/>
+              </a:rPr>
+              <a:t>For our major frameworks/views we have </a:t>
+            </a:r>
+            <a:r>
+              <a:rPr lang="en-US" sz="1200" b="0" i="0" kern="1200" dirty="0" err="1">
+                <a:solidFill>
+                  <a:schemeClr val="tx1"/>
+                </a:solidFill>
+                <a:effectLst/>
+                <a:latin typeface="+mn-lt"/>
+                <a:ea typeface="+mn-ea"/>
+                <a:cs typeface="+mn-cs"/>
+              </a:rPr>
+              <a:t>Vuex</a:t>
+            </a:r>
+            <a:r>
+              <a:rPr lang="en-US" sz="1200" b="0" i="0" kern="1200" dirty="0">
+                <a:solidFill>
+                  <a:schemeClr val="tx1"/>
+                </a:solidFill>
+                <a:effectLst/>
+                <a:latin typeface="+mn-lt"/>
+                <a:ea typeface="+mn-ea"/>
+                <a:cs typeface="+mn-cs"/>
+              </a:rPr>
+              <a:t>, Redux, and </a:t>
+            </a:r>
+            <a:r>
+              <a:rPr lang="en-US" sz="1200" b="0" i="0" kern="1200" dirty="0" err="1">
+                <a:solidFill>
+                  <a:schemeClr val="tx1"/>
+                </a:solidFill>
+                <a:effectLst/>
+                <a:latin typeface="+mn-lt"/>
+                <a:ea typeface="+mn-ea"/>
+                <a:cs typeface="+mn-cs"/>
+              </a:rPr>
+              <a:t>NgRx</a:t>
+            </a:r>
+            <a:r>
+              <a:rPr lang="en-US" sz="1200" b="0" i="0" kern="1200" dirty="0">
+                <a:solidFill>
+                  <a:schemeClr val="tx1"/>
+                </a:solidFill>
+                <a:effectLst/>
+                <a:latin typeface="+mn-lt"/>
+                <a:ea typeface="+mn-ea"/>
+                <a:cs typeface="+mn-cs"/>
+              </a:rPr>
+              <a:t>,</a:t>
+            </a:r>
+          </a:p>
+          <a:p>
+            <a:pPr marL="0" marR="0" lvl="0" indent="0" algn="l" defTabSz="914400" rtl="0" eaLnBrk="1" fontAlgn="auto" latinLnBrk="0" hangingPunct="1">
+              <a:lnSpc>
+                <a:spcPct val="100000"/>
+              </a:lnSpc>
+              <a:spcBef>
+                <a:spcPts val="0"/>
+              </a:spcBef>
+              <a:spcAft>
+                <a:spcPts val="0"/>
+              </a:spcAft>
+              <a:buClrTx/>
+              <a:buSzTx/>
+              <a:buFontTx/>
+              <a:buNone/>
+              <a:tabLst/>
+              <a:defRPr/>
+            </a:pPr>
+            <a:r>
+              <a:rPr lang="en-US" sz="1200" b="0" i="0" kern="1200" dirty="0">
+                <a:solidFill>
+                  <a:schemeClr val="tx1"/>
+                </a:solidFill>
+                <a:effectLst/>
+                <a:latin typeface="+mn-lt"/>
+                <a:ea typeface="+mn-ea"/>
+                <a:cs typeface="+mn-cs"/>
+              </a:rPr>
+              <a:t>Let’s talk about Redux, it’s 3 principles which basically common to all state management:</a:t>
+            </a:r>
+          </a:p>
+          <a:p>
+            <a:pPr marL="228600" indent="-228600" algn="l" rtl="0">
+              <a:buAutoNum type="arabicParenR"/>
+            </a:pPr>
+            <a:r>
+              <a:rPr lang="en-US" sz="1200" b="1" dirty="0"/>
+              <a:t>Single source of truth - </a:t>
+            </a:r>
+            <a:r>
+              <a:rPr lang="en-US" sz="1200" dirty="0"/>
+              <a:t>The </a:t>
+            </a:r>
+            <a:r>
+              <a:rPr lang="en-US" sz="1200" dirty="0">
+                <a:hlinkClick r:id="rId3"/>
+              </a:rPr>
+              <a:t>state</a:t>
+            </a:r>
+            <a:r>
+              <a:rPr lang="en-US" sz="1200" dirty="0"/>
+              <a:t> of your whole application is stored in an object tree within a single </a:t>
+            </a:r>
+            <a:r>
+              <a:rPr lang="en-US" sz="1200" dirty="0">
+                <a:hlinkClick r:id="rId4"/>
+              </a:rPr>
+              <a:t>store</a:t>
+            </a:r>
+            <a:r>
+              <a:rPr lang="en-US" sz="1200" dirty="0"/>
+              <a:t>.</a:t>
+            </a:r>
+          </a:p>
+          <a:p>
+            <a:pPr marL="228600" indent="-228600" algn="l" rtl="0">
+              <a:buAutoNum type="arabicParenR"/>
+            </a:pPr>
+            <a:r>
+              <a:rPr lang="en-US" sz="1200" b="1" dirty="0"/>
+              <a:t> State is read-only</a:t>
+            </a:r>
+            <a:r>
+              <a:rPr lang="en-US" sz="1200" dirty="0"/>
+              <a:t> - we are changing via action  (The only way to change the state is to emit an </a:t>
+            </a:r>
+            <a:r>
+              <a:rPr lang="en-US" sz="1200" dirty="0">
+                <a:hlinkClick r:id="rId5"/>
+              </a:rPr>
+              <a:t>action</a:t>
+            </a:r>
+            <a:r>
+              <a:rPr lang="en-US" sz="1200" dirty="0"/>
+              <a:t>, an object describing what happened).</a:t>
+            </a:r>
+          </a:p>
+          <a:p>
+            <a:pPr marL="228600" indent="-228600" algn="l" rtl="0">
+              <a:buAutoNum type="arabicParenR"/>
+            </a:pPr>
+            <a:r>
+              <a:rPr lang="en-US" sz="1200" b="1" dirty="0"/>
+              <a:t> Changes are made with pure functions - </a:t>
+            </a:r>
+            <a:r>
+              <a:rPr lang="en-US" sz="1200" dirty="0"/>
+              <a:t>not changing the current state object, we will return a new state object. (</a:t>
+            </a:r>
+            <a:r>
+              <a:rPr lang="en-US" sz="1200" b="0" i="0" kern="1200" dirty="0">
+                <a:solidFill>
+                  <a:schemeClr val="tx1"/>
+                </a:solidFill>
+                <a:effectLst/>
+                <a:latin typeface="+mn-lt"/>
+                <a:ea typeface="+mn-ea"/>
+                <a:cs typeface="+mn-cs"/>
+              </a:rPr>
+              <a:t>Immutability</a:t>
+            </a:r>
+            <a:r>
+              <a:rPr lang="en-US" sz="1200" dirty="0"/>
+              <a:t>)</a:t>
+            </a:r>
+            <a:endParaRPr lang="en-US" sz="1400" dirty="0"/>
+          </a:p>
+          <a:p>
+            <a:pPr marL="0" marR="0" lvl="0" indent="0" algn="l" defTabSz="914400" rtl="0" eaLnBrk="1" fontAlgn="auto" latinLnBrk="0" hangingPunct="1">
+              <a:lnSpc>
+                <a:spcPct val="100000"/>
+              </a:lnSpc>
+              <a:spcBef>
+                <a:spcPts val="0"/>
+              </a:spcBef>
+              <a:spcAft>
+                <a:spcPts val="0"/>
+              </a:spcAft>
+              <a:buClrTx/>
+              <a:buSzTx/>
+              <a:buFontTx/>
+              <a:buNone/>
+              <a:tabLst/>
+              <a:defRPr/>
+            </a:pPr>
+            <a:endParaRPr lang="en-US" sz="1200" b="0" i="0" kern="1200" dirty="0">
+              <a:solidFill>
+                <a:schemeClr val="tx1"/>
+              </a:solidFill>
+              <a:effectLst/>
+              <a:latin typeface="+mn-lt"/>
+              <a:ea typeface="+mn-ea"/>
+              <a:cs typeface="+mn-cs"/>
+            </a:endParaRPr>
+          </a:p>
+          <a:p>
+            <a:pPr marL="0" marR="0" lvl="0" indent="0" algn="l" defTabSz="914400" rtl="0" eaLnBrk="1" fontAlgn="auto" latinLnBrk="0" hangingPunct="1">
+              <a:lnSpc>
+                <a:spcPct val="100000"/>
+              </a:lnSpc>
+              <a:spcBef>
+                <a:spcPts val="0"/>
+              </a:spcBef>
+              <a:spcAft>
+                <a:spcPts val="0"/>
+              </a:spcAft>
+              <a:buClrTx/>
+              <a:buSzTx/>
+              <a:buFontTx/>
+              <a:buNone/>
+              <a:tabLst/>
+              <a:defRPr/>
+            </a:pPr>
+            <a:endParaRPr lang="en-US" sz="1200" b="0" i="0" kern="1200" dirty="0">
+              <a:solidFill>
+                <a:schemeClr val="tx1"/>
+              </a:solidFill>
+              <a:effectLst/>
+              <a:latin typeface="+mn-lt"/>
+              <a:ea typeface="+mn-ea"/>
+              <a:cs typeface="+mn-cs"/>
+            </a:endParaRPr>
+          </a:p>
+          <a:p>
+            <a:pPr marL="0" marR="0" lvl="0" indent="0" algn="l" defTabSz="914400" rtl="0" eaLnBrk="1" fontAlgn="auto" latinLnBrk="0" hangingPunct="1">
+              <a:lnSpc>
+                <a:spcPct val="100000"/>
+              </a:lnSpc>
+              <a:spcBef>
+                <a:spcPts val="0"/>
+              </a:spcBef>
+              <a:spcAft>
+                <a:spcPts val="0"/>
+              </a:spcAft>
+              <a:buClrTx/>
+              <a:buSzTx/>
+              <a:buFontTx/>
+              <a:buNone/>
+              <a:tabLst/>
+              <a:defRPr/>
+            </a:pPr>
+            <a:r>
+              <a:rPr lang="en-US" sz="1200" b="0" i="0" kern="1200" dirty="0">
+                <a:solidFill>
+                  <a:schemeClr val="tx1"/>
+                </a:solidFill>
+                <a:effectLst/>
+                <a:latin typeface="+mn-lt"/>
+                <a:ea typeface="+mn-ea"/>
+                <a:cs typeface="+mn-cs"/>
+              </a:rPr>
+              <a:t>When coding, if you follow thus principle it will reduce your bugs, especially if you keep </a:t>
+            </a:r>
+            <a:r>
+              <a:rPr lang="en-US" sz="1200" b="1" dirty="0"/>
+              <a:t>Single source of truth  </a:t>
+            </a:r>
+            <a:r>
+              <a:rPr lang="en-US" sz="1200" b="0" dirty="0"/>
+              <a:t>&amp;</a:t>
+            </a:r>
+            <a:r>
+              <a:rPr lang="en-US" sz="1200" b="1" dirty="0"/>
+              <a:t> </a:t>
+            </a:r>
+            <a:r>
+              <a:rPr lang="en-US" sz="1200" b="1" i="0" kern="1200" dirty="0">
+                <a:solidFill>
+                  <a:schemeClr val="tx1"/>
+                </a:solidFill>
+                <a:effectLst/>
+                <a:latin typeface="+mn-lt"/>
+                <a:ea typeface="+mn-ea"/>
+                <a:cs typeface="+mn-cs"/>
+              </a:rPr>
+              <a:t>Immutability</a:t>
+            </a:r>
+          </a:p>
+          <a:p>
+            <a:pPr marL="0" marR="0" lvl="0" indent="0" algn="l" defTabSz="914400" rtl="0" eaLnBrk="1" fontAlgn="auto" latinLnBrk="0" hangingPunct="1">
+              <a:lnSpc>
+                <a:spcPct val="100000"/>
+              </a:lnSpc>
+              <a:spcBef>
+                <a:spcPts val="0"/>
+              </a:spcBef>
+              <a:spcAft>
+                <a:spcPts val="0"/>
+              </a:spcAft>
+              <a:buClrTx/>
+              <a:buSzTx/>
+              <a:buFontTx/>
+              <a:buNone/>
+              <a:tabLst/>
+              <a:defRPr/>
+            </a:pPr>
+            <a:endParaRPr lang="en-US" sz="1200" kern="1200" dirty="0">
+              <a:solidFill>
+                <a:schemeClr val="tx1"/>
+              </a:solidFill>
+              <a:effectLst/>
+              <a:latin typeface="+mn-lt"/>
+              <a:ea typeface="+mn-ea"/>
+              <a:cs typeface="+mn-cs"/>
+            </a:endParaRPr>
+          </a:p>
+          <a:p>
+            <a:pPr marL="171450" marR="0" lvl="0" indent="-171450" algn="l" defTabSz="914400" rtl="0" eaLnBrk="1" fontAlgn="auto" latinLnBrk="0" hangingPunct="1">
+              <a:lnSpc>
+                <a:spcPct val="100000"/>
+              </a:lnSpc>
+              <a:spcBef>
+                <a:spcPts val="0"/>
+              </a:spcBef>
+              <a:spcAft>
+                <a:spcPts val="0"/>
+              </a:spcAft>
+              <a:buClrTx/>
+              <a:buSzTx/>
+              <a:buFontTx/>
+              <a:buChar char="-"/>
+              <a:tabLst/>
+              <a:defRPr/>
+            </a:pPr>
+            <a:r>
+              <a:rPr lang="en-US" dirty="0">
+                <a:hlinkClick r:id="rId6"/>
+              </a:rPr>
+              <a:t>https://blog.logrocket.com/state-management-pattern-in-javascript-sharing-data-across-components-f4420581f535/</a:t>
+            </a:r>
+            <a:endParaRPr lang="en-US" dirty="0"/>
+          </a:p>
+          <a:p>
+            <a:pPr marL="171450" marR="0" lvl="0" indent="-171450" algn="l" defTabSz="914400" rtl="0" eaLnBrk="1" fontAlgn="auto" latinLnBrk="0" hangingPunct="1">
+              <a:lnSpc>
+                <a:spcPct val="100000"/>
+              </a:lnSpc>
+              <a:spcBef>
+                <a:spcPts val="0"/>
+              </a:spcBef>
+              <a:spcAft>
+                <a:spcPts val="0"/>
+              </a:spcAft>
+              <a:buClrTx/>
+              <a:buSzTx/>
+              <a:buFontTx/>
+              <a:buChar char="-"/>
+              <a:tabLst/>
+              <a:defRPr/>
+            </a:pPr>
+            <a:r>
+              <a:rPr lang="en-US" dirty="0">
+                <a:hlinkClick r:id="rId7"/>
+              </a:rPr>
+              <a:t>https://redux.js.org/introduction/three-principles</a:t>
+            </a:r>
+            <a:endParaRPr lang="en-US" dirty="0"/>
+          </a:p>
+          <a:p>
+            <a:pPr marL="171450" marR="0" lvl="0" indent="-171450" algn="l" defTabSz="914400" rtl="0" eaLnBrk="1" fontAlgn="auto" latinLnBrk="0" hangingPunct="1">
+              <a:lnSpc>
+                <a:spcPct val="100000"/>
+              </a:lnSpc>
+              <a:spcBef>
+                <a:spcPts val="0"/>
+              </a:spcBef>
+              <a:spcAft>
+                <a:spcPts val="0"/>
+              </a:spcAft>
+              <a:buClrTx/>
+              <a:buSzTx/>
+              <a:buFontTx/>
+              <a:buChar char="-"/>
+              <a:tabLst/>
+              <a:defRPr/>
+            </a:pPr>
+            <a:r>
+              <a:rPr lang="en-US" dirty="0">
+                <a:hlinkClick r:id="rId8"/>
+              </a:rPr>
+              <a:t>https://medium.com/javascript-scene/master-the-javascript-interview-what-is-functional-programming-7f218c68b3a0</a:t>
+            </a:r>
+            <a:endParaRPr lang="en-US" sz="1200" kern="1200" dirty="0">
+              <a:solidFill>
+                <a:schemeClr val="tx1"/>
+              </a:solidFill>
+              <a:effectLst/>
+              <a:latin typeface="+mn-lt"/>
+              <a:ea typeface="+mn-ea"/>
+              <a:cs typeface="+mn-cs"/>
+            </a:endParaRPr>
+          </a:p>
+          <a:p>
+            <a:pPr marL="171450" marR="0" lvl="0" indent="-171450" algn="l" defTabSz="914400" rtl="0" eaLnBrk="1" fontAlgn="auto" latinLnBrk="0" hangingPunct="1">
+              <a:lnSpc>
+                <a:spcPct val="100000"/>
+              </a:lnSpc>
+              <a:spcBef>
+                <a:spcPts val="0"/>
+              </a:spcBef>
+              <a:spcAft>
+                <a:spcPts val="0"/>
+              </a:spcAft>
+              <a:buClrTx/>
+              <a:buSzTx/>
+              <a:buFontTx/>
+              <a:buChar char="-"/>
+              <a:tabLst/>
+              <a:defRPr/>
+            </a:pPr>
+            <a:endParaRPr lang="en-US" sz="1200" kern="1200" dirty="0">
+              <a:solidFill>
+                <a:schemeClr val="tx1"/>
+              </a:solidFill>
+              <a:effectLst/>
+              <a:latin typeface="+mn-lt"/>
+              <a:ea typeface="+mn-ea"/>
+              <a:cs typeface="+mn-cs"/>
+            </a:endParaRPr>
+          </a:p>
+          <a:p>
+            <a:pPr marL="0" marR="0" lvl="0" indent="0" algn="l" defTabSz="914400" rtl="0" eaLnBrk="1" fontAlgn="auto" latinLnBrk="0" hangingPunct="1">
+              <a:lnSpc>
+                <a:spcPct val="100000"/>
+              </a:lnSpc>
+              <a:spcBef>
+                <a:spcPts val="0"/>
+              </a:spcBef>
+              <a:spcAft>
+                <a:spcPts val="0"/>
+              </a:spcAft>
+              <a:buClrTx/>
+              <a:buSzTx/>
+              <a:buFontTx/>
+              <a:buNone/>
+              <a:tabLst/>
+              <a:defRPr/>
+            </a:pPr>
+            <a:endParaRPr lang="en-US" sz="1200" kern="1200" dirty="0">
+              <a:solidFill>
+                <a:schemeClr val="tx1"/>
+              </a:solidFill>
+              <a:effectLst/>
+              <a:latin typeface="+mn-lt"/>
+              <a:ea typeface="+mn-ea"/>
+              <a:cs typeface="+mn-cs"/>
+            </a:endParaRPr>
+          </a:p>
         </p:txBody>
       </p:sp>
       <p:sp>
@@ -2797,7 +3368,7 @@
     </p:spTree>
     <p:extLst>
       <p:ext uri="{BB962C8B-B14F-4D97-AF65-F5344CB8AC3E}">
-        <p14:creationId xmlns:p14="http://schemas.microsoft.com/office/powerpoint/2010/main" val="2900355863"/>
+        <p14:creationId xmlns:p14="http://schemas.microsoft.com/office/powerpoint/2010/main" val="994558375"/>
       </p:ext>
     </p:extLst>
   </p:cSld>
@@ -2868,6 +3439,37 @@
               <a:tabLst/>
               <a:defRPr/>
             </a:pPr>
+            <a:r>
+              <a:rPr lang="en-US" sz="1200" kern="1200" dirty="0">
+                <a:solidFill>
+                  <a:schemeClr val="tx1"/>
+                </a:solidFill>
+                <a:effectLst/>
+                <a:latin typeface="+mn-lt"/>
+                <a:ea typeface="+mn-ea"/>
+                <a:cs typeface="+mn-cs"/>
+              </a:rPr>
+              <a:t>What is CSS encapsulation</a:t>
+            </a:r>
+          </a:p>
+          <a:p>
+            <a:pPr marL="0" marR="0" lvl="0" indent="0" algn="l" defTabSz="914400" rtl="0" eaLnBrk="1" fontAlgn="auto" latinLnBrk="0" hangingPunct="1">
+              <a:lnSpc>
+                <a:spcPct val="100000"/>
+              </a:lnSpc>
+              <a:spcBef>
+                <a:spcPts val="0"/>
+              </a:spcBef>
+              <a:spcAft>
+                <a:spcPts val="0"/>
+              </a:spcAft>
+              <a:buClrTx/>
+              <a:buSzTx/>
+              <a:buFontTx/>
+              <a:buNone/>
+              <a:tabLst/>
+              <a:defRPr/>
+            </a:pPr>
             <a:endParaRPr lang="en-US" sz="1200" kern="1200" dirty="0">
               <a:solidFill>
                 <a:schemeClr val="tx1"/>
@@ -2878,6 +3480,1042 @@
               <a:cs typeface="+mn-cs"/>
             </a:endParaRPr>
           </a:p>
+          <a:p>
+            <a:pPr marL="0" marR="0" lvl="0" indent="0" algn="l" defTabSz="914400" rtl="0" eaLnBrk="1" fontAlgn="auto" latinLnBrk="0" hangingPunct="1">
+              <a:lnSpc>
+                <a:spcPct val="100000"/>
+              </a:lnSpc>
+              <a:spcBef>
+                <a:spcPts val="0"/>
+              </a:spcBef>
+              <a:spcAft>
+                <a:spcPts val="0"/>
+              </a:spcAft>
+              <a:buClrTx/>
+              <a:buSzTx/>
+              <a:buFontTx/>
+              <a:buNone/>
+              <a:tabLst/>
+              <a:defRPr/>
+            </a:pPr>
+            <a:r>
+              <a:rPr lang="en-US" sz="1200" kern="1200" dirty="0">
+                <a:solidFill>
+                  <a:schemeClr val="tx1"/>
+                </a:solidFill>
+                <a:effectLst/>
+                <a:latin typeface="+mn-lt"/>
+                <a:ea typeface="+mn-ea"/>
+                <a:cs typeface="+mn-cs"/>
+              </a:rPr>
+              <a:t>In CSS we have the following issues:</a:t>
+            </a:r>
+          </a:p>
+          <a:p>
+            <a:pPr marL="0" marR="0" lvl="0" indent="0" algn="l" defTabSz="914400" rtl="0" eaLnBrk="1" fontAlgn="auto" latinLnBrk="0" hangingPunct="1">
+              <a:lnSpc>
+                <a:spcPct val="100000"/>
+              </a:lnSpc>
+              <a:spcBef>
+                <a:spcPts val="0"/>
+              </a:spcBef>
+              <a:spcAft>
+                <a:spcPts val="0"/>
+              </a:spcAft>
+              <a:buClrTx/>
+              <a:buSzTx/>
+              <a:buFontTx/>
+              <a:buNone/>
+              <a:tabLst/>
+              <a:defRPr/>
+            </a:pPr>
+            <a:r>
+              <a:rPr lang="en-US" sz="1200" kern="1200" dirty="0">
+                <a:solidFill>
+                  <a:schemeClr val="tx1"/>
+                </a:solidFill>
+                <a:effectLst/>
+                <a:latin typeface="+mn-lt"/>
+                <a:ea typeface="+mn-ea"/>
+                <a:cs typeface="+mn-cs"/>
+              </a:rPr>
+              <a:t>CSS is a global scope – when we defined a class it might apply to any element in the DOM, this might cause applying styles to undesired element.</a:t>
+            </a:r>
+          </a:p>
+          <a:p>
+            <a:pPr marL="0" marR="0" lvl="0" indent="0" algn="l" defTabSz="914400" rtl="0" eaLnBrk="1" fontAlgn="auto" latinLnBrk="0" hangingPunct="1">
+              <a:lnSpc>
+                <a:spcPct val="100000"/>
+              </a:lnSpc>
+              <a:spcBef>
+                <a:spcPts val="0"/>
+              </a:spcBef>
+              <a:spcAft>
+                <a:spcPts val="0"/>
+              </a:spcAft>
+              <a:buClrTx/>
+              <a:buSzTx/>
+              <a:buFontTx/>
+              <a:buNone/>
+              <a:tabLst/>
+              <a:defRPr/>
+            </a:pPr>
+            <a:r>
+              <a:rPr lang="en-US" sz="1200" kern="1200" dirty="0">
+                <a:solidFill>
+                  <a:schemeClr val="tx1"/>
+                </a:solidFill>
+                <a:effectLst/>
+                <a:latin typeface="+mn-lt"/>
+                <a:ea typeface="+mn-ea"/>
+                <a:cs typeface="+mn-cs"/>
+              </a:rPr>
+              <a:t>Specificity War, Inheritance issues – CSS become so complex so we need to start calculating style specificity level  (id is 100, class is 10, tag is 1 etc.) to override existing/inherit style</a:t>
+            </a:r>
+          </a:p>
+          <a:p>
+            <a:pPr marL="0" marR="0" lvl="0" indent="0" algn="l" defTabSz="914400" rtl="0" eaLnBrk="1" fontAlgn="auto" latinLnBrk="0" hangingPunct="1">
+              <a:lnSpc>
+                <a:spcPct val="100000"/>
+              </a:lnSpc>
+              <a:spcBef>
+                <a:spcPts val="0"/>
+              </a:spcBef>
+              <a:spcAft>
+                <a:spcPts val="0"/>
+              </a:spcAft>
+              <a:buClrTx/>
+              <a:buSzTx/>
+              <a:buFontTx/>
+              <a:buNone/>
+              <a:tabLst/>
+              <a:defRPr/>
+            </a:pPr>
+            <a:r>
+              <a:rPr lang="en-US" sz="1200" kern="1200" dirty="0">
+                <a:solidFill>
+                  <a:schemeClr val="tx1"/>
+                </a:solidFill>
+                <a:effectLst/>
+                <a:latin typeface="+mn-lt"/>
+                <a:ea typeface="+mn-ea"/>
+                <a:cs typeface="+mn-cs"/>
+              </a:rPr>
+              <a:t>Name clashing – will but same class name like our third party (everyone wants to call button as button class)</a:t>
+            </a:r>
+          </a:p>
+          <a:p>
+            <a:pPr marL="0" marR="0" lvl="0" indent="0" algn="l" defTabSz="914400" rtl="0" eaLnBrk="1" fontAlgn="auto" latinLnBrk="0" hangingPunct="1">
+              <a:lnSpc>
+                <a:spcPct val="100000"/>
+              </a:lnSpc>
+              <a:spcBef>
+                <a:spcPts val="0"/>
+              </a:spcBef>
+              <a:spcAft>
+                <a:spcPts val="0"/>
+              </a:spcAft>
+              <a:buClrTx/>
+              <a:buSzTx/>
+              <a:buFontTx/>
+              <a:buNone/>
+              <a:tabLst/>
+              <a:defRPr/>
+            </a:pPr>
+            <a:endParaRPr lang="en-US" sz="1200" kern="1200" dirty="0">
+              <a:solidFill>
+                <a:schemeClr val="tx1"/>
+              </a:solidFill>
+              <a:effectLst/>
+              <a:latin typeface="+mn-lt"/>
+              <a:ea typeface="+mn-ea"/>
+              <a:cs typeface="+mn-cs"/>
+            </a:endParaRPr>
+          </a:p>
+          <a:p>
+            <a:pPr marL="0" marR="0" lvl="0" indent="0" algn="l" defTabSz="914400" rtl="0" eaLnBrk="1" fontAlgn="auto" latinLnBrk="0" hangingPunct="1">
+              <a:lnSpc>
+                <a:spcPct val="100000"/>
+              </a:lnSpc>
+              <a:spcBef>
+                <a:spcPts val="0"/>
+              </a:spcBef>
+              <a:spcAft>
+                <a:spcPts val="0"/>
+              </a:spcAft>
+              <a:buClrTx/>
+              <a:buSzTx/>
+              <a:buFontTx/>
+              <a:buNone/>
+              <a:tabLst/>
+              <a:defRPr/>
+            </a:pPr>
+            <a:r>
+              <a:rPr lang="en-US" sz="1200" kern="1200" dirty="0">
+                <a:solidFill>
+                  <a:schemeClr val="tx1"/>
+                </a:solidFill>
+                <a:effectLst/>
+                <a:latin typeface="+mn-lt"/>
+                <a:ea typeface="+mn-ea"/>
+                <a:cs typeface="+mn-cs"/>
+              </a:rPr>
+              <a:t>The first solution is to create best practices to our project:</a:t>
+            </a:r>
+          </a:p>
+          <a:p>
+            <a:pPr marL="171450" marR="0" lvl="0" indent="-171450" algn="l" defTabSz="914400" rtl="0" eaLnBrk="1" fontAlgn="auto" latinLnBrk="0" hangingPunct="1">
+              <a:lnSpc>
+                <a:spcPct val="100000"/>
+              </a:lnSpc>
+              <a:spcBef>
+                <a:spcPts val="0"/>
+              </a:spcBef>
+              <a:spcAft>
+                <a:spcPts val="0"/>
+              </a:spcAft>
+              <a:buClrTx/>
+              <a:buSzTx/>
+              <a:buFontTx/>
+              <a:buChar char="-"/>
+              <a:tabLst/>
+              <a:defRPr/>
+            </a:pPr>
+            <a:r>
+              <a:rPr lang="en-US" sz="1200" kern="1200" dirty="0">
+                <a:solidFill>
+                  <a:schemeClr val="tx1"/>
+                </a:solidFill>
+                <a:effectLst/>
+                <a:latin typeface="+mn-lt"/>
+                <a:ea typeface="+mn-ea"/>
+                <a:cs typeface="+mn-cs"/>
+              </a:rPr>
+              <a:t>No more ID's in selectors - solve Specificity War</a:t>
+            </a:r>
+          </a:p>
+          <a:p>
+            <a:pPr marL="171450" marR="0" lvl="0" indent="-171450" algn="l" defTabSz="914400" rtl="0" eaLnBrk="1" fontAlgn="auto" latinLnBrk="0" hangingPunct="1">
+              <a:lnSpc>
+                <a:spcPct val="100000"/>
+              </a:lnSpc>
+              <a:spcBef>
+                <a:spcPts val="0"/>
+              </a:spcBef>
+              <a:spcAft>
+                <a:spcPts val="0"/>
+              </a:spcAft>
+              <a:buClrTx/>
+              <a:buSzTx/>
+              <a:buFontTx/>
+              <a:buChar char="-"/>
+              <a:tabLst/>
+              <a:defRPr/>
+            </a:pPr>
+            <a:r>
+              <a:rPr lang="en-US" sz="1200" kern="1200" dirty="0">
+                <a:solidFill>
+                  <a:schemeClr val="tx1"/>
+                </a:solidFill>
+                <a:effectLst/>
+                <a:latin typeface="+mn-lt"/>
+                <a:ea typeface="+mn-ea"/>
+                <a:cs typeface="+mn-cs"/>
+              </a:rPr>
+              <a:t>No "brute-force" values (as that z-index) – solve override issues</a:t>
+            </a:r>
+          </a:p>
+          <a:p>
+            <a:pPr marL="171450" marR="0" lvl="0" indent="-171450" algn="l" defTabSz="914400" rtl="0" eaLnBrk="1" fontAlgn="auto" latinLnBrk="0" hangingPunct="1">
+              <a:lnSpc>
+                <a:spcPct val="100000"/>
+              </a:lnSpc>
+              <a:spcBef>
+                <a:spcPts val="0"/>
+              </a:spcBef>
+              <a:spcAft>
+                <a:spcPts val="0"/>
+              </a:spcAft>
+              <a:buClrTx/>
+              <a:buSzTx/>
+              <a:buFontTx/>
+              <a:buChar char="-"/>
+              <a:tabLst/>
+              <a:defRPr/>
+            </a:pPr>
+            <a:r>
+              <a:rPr lang="en-US" sz="1200" kern="1200" dirty="0">
+                <a:solidFill>
+                  <a:schemeClr val="tx1"/>
+                </a:solidFill>
+                <a:effectLst/>
+                <a:latin typeface="+mn-lt"/>
+                <a:ea typeface="+mn-ea"/>
+                <a:cs typeface="+mn-cs"/>
+              </a:rPr>
+              <a:t>No more !important or exotic CSS properties – don’t ever use important only for rare cases</a:t>
+            </a:r>
+          </a:p>
+          <a:p>
+            <a:pPr marL="171450" marR="0" lvl="0" indent="-171450" algn="l" defTabSz="914400" rtl="0" eaLnBrk="1" fontAlgn="auto" latinLnBrk="0" hangingPunct="1">
+              <a:lnSpc>
+                <a:spcPct val="100000"/>
+              </a:lnSpc>
+              <a:spcBef>
+                <a:spcPts val="0"/>
+              </a:spcBef>
+              <a:spcAft>
+                <a:spcPts val="0"/>
+              </a:spcAft>
+              <a:buClrTx/>
+              <a:buSzTx/>
+              <a:buFontTx/>
+              <a:buChar char="-"/>
+              <a:tabLst/>
+              <a:defRPr/>
+            </a:pPr>
+            <a:r>
+              <a:rPr lang="en-US" sz="1200" kern="1200" dirty="0">
+                <a:solidFill>
+                  <a:schemeClr val="tx1"/>
+                </a:solidFill>
+                <a:effectLst/>
+                <a:latin typeface="+mn-lt"/>
+                <a:ea typeface="+mn-ea"/>
+                <a:cs typeface="+mn-cs"/>
+              </a:rPr>
+              <a:t>No strict bindings between CSS and the DOM structure – don’t describe the DOM in CSS (selector using html tag), why? Because structure might be changed &amp; less readable when looking at it (class with descripted name will explain us more about this element)</a:t>
+            </a:r>
+          </a:p>
+          <a:p>
+            <a:pPr marL="171450" marR="0" lvl="0" indent="-171450" algn="l" defTabSz="914400" rtl="0" eaLnBrk="1" fontAlgn="auto" latinLnBrk="0" hangingPunct="1">
+              <a:lnSpc>
+                <a:spcPct val="100000"/>
+              </a:lnSpc>
+              <a:spcBef>
+                <a:spcPts val="0"/>
+              </a:spcBef>
+              <a:spcAft>
+                <a:spcPts val="0"/>
+              </a:spcAft>
+              <a:buClrTx/>
+              <a:buSzTx/>
+              <a:buFontTx/>
+              <a:buChar char="-"/>
+              <a:tabLst/>
+              <a:defRPr/>
+            </a:pPr>
+            <a:r>
+              <a:rPr lang="en-US" sz="1200" kern="1200" dirty="0">
+                <a:solidFill>
+                  <a:schemeClr val="tx1"/>
+                </a:solidFill>
+                <a:effectLst/>
+                <a:latin typeface="+mn-lt"/>
+                <a:ea typeface="+mn-ea"/>
+                <a:cs typeface="+mn-cs"/>
+              </a:rPr>
+              <a:t>Keep the </a:t>
+            </a:r>
+            <a:r>
+              <a:rPr lang="en-US" sz="1200" kern="1200" dirty="0" err="1">
+                <a:solidFill>
+                  <a:schemeClr val="tx1"/>
+                </a:solidFill>
+                <a:effectLst/>
+                <a:latin typeface="+mn-lt"/>
+                <a:ea typeface="+mn-ea"/>
+                <a:cs typeface="+mn-cs"/>
+              </a:rPr>
+              <a:t>specifity</a:t>
+            </a:r>
+            <a:r>
+              <a:rPr lang="en-US" sz="1200" kern="1200" dirty="0">
+                <a:solidFill>
+                  <a:schemeClr val="tx1"/>
+                </a:solidFill>
+                <a:effectLst/>
+                <a:latin typeface="+mn-lt"/>
+                <a:ea typeface="+mn-ea"/>
+                <a:cs typeface="+mn-cs"/>
+              </a:rPr>
+              <a:t> as low as possible, ideally 0.1.0 – to prevent overrides issues</a:t>
+            </a:r>
+          </a:p>
+          <a:p>
+            <a:pPr marL="171450" marR="0" lvl="0" indent="-171450" algn="l" defTabSz="914400" rtl="0" eaLnBrk="1" fontAlgn="auto" latinLnBrk="0" hangingPunct="1">
+              <a:lnSpc>
+                <a:spcPct val="100000"/>
+              </a:lnSpc>
+              <a:spcBef>
+                <a:spcPts val="0"/>
+              </a:spcBef>
+              <a:spcAft>
+                <a:spcPts val="0"/>
+              </a:spcAft>
+              <a:buClrTx/>
+              <a:buSzTx/>
+              <a:buFontTx/>
+              <a:buChar char="-"/>
+              <a:tabLst/>
+              <a:defRPr/>
+            </a:pPr>
+            <a:r>
+              <a:rPr lang="en-US" sz="1200" kern="1200" dirty="0">
+                <a:solidFill>
+                  <a:schemeClr val="tx1"/>
+                </a:solidFill>
+                <a:effectLst/>
+                <a:latin typeface="+mn-lt"/>
+                <a:ea typeface="+mn-ea"/>
+                <a:cs typeface="+mn-cs"/>
+              </a:rPr>
+              <a:t>Use namespaces for your classes. – like project prefix to solve side effect</a:t>
+            </a:r>
+          </a:p>
+          <a:p>
+            <a:pPr marL="0" marR="0" lvl="0" indent="0" algn="l" defTabSz="914400" rtl="0" eaLnBrk="1" fontAlgn="auto" latinLnBrk="0" hangingPunct="1">
+              <a:lnSpc>
+                <a:spcPct val="100000"/>
+              </a:lnSpc>
+              <a:spcBef>
+                <a:spcPts val="0"/>
+              </a:spcBef>
+              <a:spcAft>
+                <a:spcPts val="0"/>
+              </a:spcAft>
+              <a:buClrTx/>
+              <a:buSzTx/>
+              <a:buFontTx/>
+              <a:buNone/>
+              <a:tabLst/>
+              <a:defRPr/>
+            </a:pPr>
+            <a:endParaRPr lang="en-US" sz="1200" kern="1200" dirty="0">
+              <a:solidFill>
+                <a:schemeClr val="tx1"/>
+              </a:solidFill>
+              <a:effectLst/>
+              <a:latin typeface="+mn-lt"/>
+              <a:ea typeface="+mn-ea"/>
+              <a:cs typeface="+mn-cs"/>
+            </a:endParaRPr>
+          </a:p>
+          <a:p>
+            <a:pPr marL="0" marR="0" lvl="0" indent="0" algn="l" defTabSz="914400" rtl="0" eaLnBrk="1" fontAlgn="auto" latinLnBrk="0" hangingPunct="1">
+              <a:lnSpc>
+                <a:spcPct val="100000"/>
+              </a:lnSpc>
+              <a:spcBef>
+                <a:spcPts val="0"/>
+              </a:spcBef>
+              <a:spcAft>
+                <a:spcPts val="0"/>
+              </a:spcAft>
+              <a:buClrTx/>
+              <a:buSzTx/>
+              <a:buFontTx/>
+              <a:buNone/>
+              <a:tabLst/>
+              <a:defRPr/>
+            </a:pPr>
+            <a:r>
+              <a:rPr lang="en-US" sz="1200" kern="1200" dirty="0">
+                <a:solidFill>
+                  <a:schemeClr val="tx1"/>
+                </a:solidFill>
+                <a:effectLst/>
+                <a:latin typeface="+mn-lt"/>
+                <a:ea typeface="+mn-ea"/>
+                <a:cs typeface="+mn-cs"/>
+              </a:rPr>
+              <a:t>To solve this issue, The idea is to create a private scope for styles so all styles create in a component will apply only to this component and will not affect outside elements.</a:t>
+            </a:r>
+          </a:p>
+          <a:p>
+            <a:pPr marL="0" marR="0" lvl="0" indent="0" algn="l" defTabSz="914400" rtl="0" eaLnBrk="1" fontAlgn="auto" latinLnBrk="0" hangingPunct="1">
+              <a:lnSpc>
+                <a:spcPct val="100000"/>
+              </a:lnSpc>
+              <a:spcBef>
+                <a:spcPts val="0"/>
+              </a:spcBef>
+              <a:spcAft>
+                <a:spcPts val="0"/>
+              </a:spcAft>
+              <a:buClrTx/>
+              <a:buSzTx/>
+              <a:buFontTx/>
+              <a:buNone/>
+              <a:tabLst/>
+              <a:defRPr/>
+            </a:pPr>
+            <a:r>
+              <a:rPr lang="en-US" sz="1200" kern="1200" dirty="0">
+                <a:solidFill>
+                  <a:schemeClr val="tx1"/>
+                </a:solidFill>
+                <a:effectLst/>
+                <a:latin typeface="+mn-lt"/>
+                <a:ea typeface="+mn-ea"/>
+                <a:cs typeface="+mn-cs"/>
+              </a:rPr>
+              <a:t>This strategy will solve us a lot if side effect like one style effecting other element.</a:t>
+            </a:r>
+          </a:p>
+          <a:p>
+            <a:pPr marL="0" marR="0" lvl="0" indent="0" algn="l" defTabSz="914400" rtl="0" eaLnBrk="1" fontAlgn="auto" latinLnBrk="0" hangingPunct="1">
+              <a:lnSpc>
+                <a:spcPct val="100000"/>
+              </a:lnSpc>
+              <a:spcBef>
+                <a:spcPts val="0"/>
+              </a:spcBef>
+              <a:spcAft>
+                <a:spcPts val="0"/>
+              </a:spcAft>
+              <a:buClrTx/>
+              <a:buSzTx/>
+              <a:buFontTx/>
+              <a:buNone/>
+              <a:tabLst/>
+              <a:defRPr/>
+            </a:pPr>
+            <a:endParaRPr lang="en-US" sz="1200" kern="1200" dirty="0">
+              <a:solidFill>
+                <a:schemeClr val="tx1"/>
+              </a:solidFill>
+              <a:effectLst/>
+              <a:latin typeface="+mn-lt"/>
+              <a:ea typeface="+mn-ea"/>
+              <a:cs typeface="+mn-cs"/>
+            </a:endParaRPr>
+          </a:p>
+          <a:p>
+            <a:pPr marL="0" marR="0" lvl="0" indent="0" algn="l" defTabSz="914400" rtl="0" eaLnBrk="1" fontAlgn="auto" latinLnBrk="0" hangingPunct="1">
+              <a:lnSpc>
+                <a:spcPct val="100000"/>
+              </a:lnSpc>
+              <a:spcBef>
+                <a:spcPts val="0"/>
+              </a:spcBef>
+              <a:spcAft>
+                <a:spcPts val="0"/>
+              </a:spcAft>
+              <a:buClrTx/>
+              <a:buSzTx/>
+              <a:buFontTx/>
+              <a:buNone/>
+              <a:tabLst/>
+              <a:defRPr/>
+            </a:pPr>
+            <a:r>
+              <a:rPr lang="en-US" sz="1200" kern="1200" dirty="0">
+                <a:solidFill>
+                  <a:schemeClr val="tx1"/>
+                </a:solidFill>
+                <a:effectLst/>
+                <a:latin typeface="+mn-lt"/>
+                <a:ea typeface="+mn-ea"/>
+                <a:cs typeface="+mn-cs"/>
+              </a:rPr>
+              <a:t>Let see an example using it (by creating the scope by yourself):</a:t>
+            </a:r>
+          </a:p>
+          <a:p>
+            <a:pPr marL="0" marR="0" lvl="0" indent="0" algn="l" defTabSz="914400" rtl="0" eaLnBrk="1" fontAlgn="auto" latinLnBrk="0" hangingPunct="1">
+              <a:lnSpc>
+                <a:spcPct val="100000"/>
+              </a:lnSpc>
+              <a:spcBef>
+                <a:spcPts val="0"/>
+              </a:spcBef>
+              <a:spcAft>
+                <a:spcPts val="0"/>
+              </a:spcAft>
+              <a:buClrTx/>
+              <a:buSzTx/>
+              <a:buFontTx/>
+              <a:buNone/>
+              <a:tabLst/>
+              <a:defRPr/>
+            </a:pPr>
+            <a:r>
+              <a:rPr lang="en-US" sz="1200" kern="1200" dirty="0">
+                <a:solidFill>
+                  <a:schemeClr val="tx1"/>
+                </a:solidFill>
+                <a:effectLst/>
+                <a:latin typeface="+mn-lt"/>
+                <a:ea typeface="+mn-ea"/>
+                <a:cs typeface="+mn-cs"/>
+              </a:rPr>
+              <a:t>Scoping the style – here we can see an example how we can create a scope with BEM, in this example the prefix is </a:t>
+            </a:r>
+            <a:r>
+              <a:rPr lang="en-US" sz="1200" b="0" i="0" kern="1200" dirty="0">
+                <a:solidFill>
+                  <a:schemeClr val="tx1"/>
+                </a:solidFill>
+                <a:effectLst/>
+                <a:latin typeface="+mn-lt"/>
+                <a:ea typeface="+mn-ea"/>
+                <a:cs typeface="+mn-cs"/>
+              </a:rPr>
+              <a:t>content-card.</a:t>
+            </a:r>
+            <a:endParaRPr lang="en-US" sz="1200" kern="1200" dirty="0">
+              <a:solidFill>
+                <a:schemeClr val="tx1"/>
+              </a:solidFill>
+              <a:effectLst/>
+              <a:latin typeface="+mn-lt"/>
+              <a:ea typeface="+mn-ea"/>
+              <a:cs typeface="+mn-cs"/>
+            </a:endParaRPr>
+          </a:p>
+          <a:p>
+            <a:pPr marL="0" marR="0" lvl="0" indent="0" algn="l" defTabSz="914400" rtl="0" eaLnBrk="1" fontAlgn="auto" latinLnBrk="0" hangingPunct="1">
+              <a:lnSpc>
+                <a:spcPct val="100000"/>
+              </a:lnSpc>
+              <a:spcBef>
+                <a:spcPts val="0"/>
+              </a:spcBef>
+              <a:spcAft>
+                <a:spcPts val="0"/>
+              </a:spcAft>
+              <a:buClrTx/>
+              <a:buSzTx/>
+              <a:buFontTx/>
+              <a:buNone/>
+              <a:tabLst/>
+              <a:defRPr/>
+            </a:pPr>
+            <a:endParaRPr lang="en-US" sz="1200" kern="1200" dirty="0">
+              <a:solidFill>
+                <a:schemeClr val="tx1"/>
+              </a:solidFill>
+              <a:effectLst/>
+              <a:latin typeface="+mn-lt"/>
+              <a:ea typeface="+mn-ea"/>
+              <a:cs typeface="+mn-cs"/>
+            </a:endParaRPr>
+          </a:p>
+          <a:p>
+            <a:pPr marL="0" marR="0" lvl="0" indent="0" algn="l" defTabSz="914400" rtl="0" eaLnBrk="1" fontAlgn="auto" latinLnBrk="0" hangingPunct="1">
+              <a:lnSpc>
+                <a:spcPct val="100000"/>
+              </a:lnSpc>
+              <a:spcBef>
+                <a:spcPts val="0"/>
+              </a:spcBef>
+              <a:spcAft>
+                <a:spcPts val="0"/>
+              </a:spcAft>
+              <a:buClrTx/>
+              <a:buSzTx/>
+              <a:buFontTx/>
+              <a:buNone/>
+              <a:tabLst/>
+              <a:defRPr/>
+            </a:pPr>
+            <a:r>
+              <a:rPr lang="en-US" sz="1200" kern="1200" dirty="0">
+                <a:solidFill>
+                  <a:schemeClr val="tx1"/>
+                </a:solidFill>
+                <a:effectLst/>
+                <a:latin typeface="+mn-lt"/>
+                <a:ea typeface="+mn-ea"/>
+                <a:cs typeface="+mn-cs"/>
+              </a:rPr>
+              <a:t>Second option is </a:t>
+            </a:r>
+            <a:r>
+              <a:rPr lang="en-US" sz="1200" b="0" i="0" kern="1200" dirty="0">
+                <a:solidFill>
+                  <a:schemeClr val="tx1"/>
+                </a:solidFill>
+                <a:effectLst/>
+                <a:latin typeface="+mn-lt"/>
+                <a:ea typeface="+mn-ea"/>
+                <a:cs typeface="+mn-cs"/>
+              </a:rPr>
+              <a:t>Emulated the scope </a:t>
+            </a:r>
+            <a:r>
+              <a:rPr lang="en-US" sz="1200" b="0" i="0" kern="1200" dirty="0" err="1">
+                <a:solidFill>
+                  <a:schemeClr val="tx1"/>
+                </a:solidFill>
+                <a:effectLst/>
+                <a:latin typeface="+mn-lt"/>
+                <a:ea typeface="+mn-ea"/>
+                <a:cs typeface="+mn-cs"/>
+              </a:rPr>
+              <a:t>dynamicly</a:t>
+            </a:r>
+            <a:r>
+              <a:rPr lang="en-US" sz="1200" b="0" i="0" kern="1200" dirty="0">
+                <a:solidFill>
+                  <a:schemeClr val="tx1"/>
+                </a:solidFill>
+                <a:effectLst/>
+                <a:latin typeface="+mn-lt"/>
+                <a:ea typeface="+mn-ea"/>
+                <a:cs typeface="+mn-cs"/>
+              </a:rPr>
+              <a:t> like angular is doing (each framework hove is own name and technic but all solving the same issue in different generate way)</a:t>
+            </a:r>
+          </a:p>
+          <a:p>
+            <a:pPr marL="0" marR="0" lvl="0" indent="0" algn="l" defTabSz="914400" rtl="0" eaLnBrk="1" fontAlgn="auto" latinLnBrk="0" hangingPunct="1">
+              <a:lnSpc>
+                <a:spcPct val="100000"/>
+              </a:lnSpc>
+              <a:spcBef>
+                <a:spcPts val="0"/>
+              </a:spcBef>
+              <a:spcAft>
+                <a:spcPts val="0"/>
+              </a:spcAft>
+              <a:buClrTx/>
+              <a:buSzTx/>
+              <a:buFontTx/>
+              <a:buNone/>
+              <a:tabLst/>
+              <a:defRPr/>
+            </a:pPr>
+            <a:endParaRPr lang="en-US" sz="1200" b="0" i="0" kern="1200" dirty="0">
+              <a:solidFill>
+                <a:schemeClr val="tx1"/>
+              </a:solidFill>
+              <a:effectLst/>
+              <a:latin typeface="+mn-lt"/>
+              <a:ea typeface="+mn-ea"/>
+              <a:cs typeface="+mn-cs"/>
+            </a:endParaRPr>
+          </a:p>
+          <a:p>
+            <a:pPr marL="0" marR="0" lvl="0" indent="0" algn="l" defTabSz="914400" rtl="0" eaLnBrk="1" fontAlgn="auto" latinLnBrk="0" hangingPunct="1">
+              <a:lnSpc>
+                <a:spcPct val="100000"/>
+              </a:lnSpc>
+              <a:spcBef>
+                <a:spcPts val="0"/>
+              </a:spcBef>
+              <a:spcAft>
+                <a:spcPts val="0"/>
+              </a:spcAft>
+              <a:buClrTx/>
+              <a:buSzTx/>
+              <a:buFontTx/>
+              <a:buNone/>
+              <a:tabLst/>
+              <a:defRPr/>
+            </a:pPr>
+            <a:r>
+              <a:rPr lang="en-US" sz="1200" b="0" i="0" kern="1200" dirty="0">
+                <a:solidFill>
+                  <a:schemeClr val="tx1"/>
+                </a:solidFill>
+                <a:effectLst/>
+                <a:latin typeface="+mn-lt"/>
+                <a:ea typeface="+mn-ea"/>
+                <a:cs typeface="+mn-cs"/>
+              </a:rPr>
+              <a:t>Third option is to use shadow DOM - Shadow DOM is API providing a way to attach a hidden separated DOM (we Can put styles, JS etc.) to an element. You can think of shadow DOM as a </a:t>
+            </a:r>
+            <a:r>
+              <a:rPr lang="en-US" sz="1200" b="1" i="0" kern="1200" dirty="0">
+                <a:solidFill>
+                  <a:schemeClr val="tx1"/>
+                </a:solidFill>
+                <a:effectLst/>
+                <a:latin typeface="+mn-lt"/>
+                <a:ea typeface="+mn-ea"/>
+                <a:cs typeface="+mn-cs"/>
+              </a:rPr>
+              <a:t>scoped subtree</a:t>
+            </a:r>
+            <a:r>
+              <a:rPr lang="en-US" sz="1200" b="0" i="0" kern="1200" dirty="0">
+                <a:solidFill>
+                  <a:schemeClr val="tx1"/>
+                </a:solidFill>
+                <a:effectLst/>
+                <a:latin typeface="+mn-lt"/>
+                <a:ea typeface="+mn-ea"/>
+                <a:cs typeface="+mn-cs"/>
+              </a:rPr>
+              <a:t> inside your element.</a:t>
+            </a:r>
+          </a:p>
+          <a:p>
+            <a:pPr marL="0" marR="0" lvl="0" indent="0" algn="l" defTabSz="914400" rtl="0" eaLnBrk="1" fontAlgn="auto" latinLnBrk="0" hangingPunct="1">
+              <a:lnSpc>
+                <a:spcPct val="100000"/>
+              </a:lnSpc>
+              <a:spcBef>
+                <a:spcPts val="0"/>
+              </a:spcBef>
+              <a:spcAft>
+                <a:spcPts val="0"/>
+              </a:spcAft>
+              <a:buClrTx/>
+              <a:buSzTx/>
+              <a:buFontTx/>
+              <a:buNone/>
+              <a:tabLst/>
+              <a:defRPr/>
+            </a:pPr>
+            <a:r>
+              <a:rPr lang="en-US" sz="1200" b="0" i="0" kern="1200" dirty="0">
+                <a:solidFill>
+                  <a:schemeClr val="tx1"/>
+                </a:solidFill>
+                <a:effectLst/>
+                <a:latin typeface="+mn-lt"/>
+                <a:ea typeface="+mn-ea"/>
+                <a:cs typeface="+mn-cs"/>
+              </a:rPr>
+              <a:t>All the styles will be leaving only in this component</a:t>
+            </a:r>
+            <a:endParaRPr lang="en-US" sz="1200" kern="1200" dirty="0">
+              <a:solidFill>
+                <a:schemeClr val="tx1"/>
+              </a:solidFill>
+              <a:effectLst/>
+              <a:latin typeface="+mn-lt"/>
+              <a:ea typeface="+mn-ea"/>
+              <a:cs typeface="+mn-cs"/>
+            </a:endParaRPr>
+          </a:p>
+          <a:p>
+            <a:pPr marL="0" marR="0" lvl="0" indent="0" algn="l" defTabSz="914400" rtl="0" eaLnBrk="1" fontAlgn="auto" latinLnBrk="0" hangingPunct="1">
+              <a:lnSpc>
+                <a:spcPct val="100000"/>
+              </a:lnSpc>
+              <a:spcBef>
+                <a:spcPts val="0"/>
+              </a:spcBef>
+              <a:spcAft>
+                <a:spcPts val="0"/>
+              </a:spcAft>
+              <a:buClrTx/>
+              <a:buSzTx/>
+              <a:buFontTx/>
+              <a:buNone/>
+              <a:tabLst/>
+              <a:defRPr/>
+            </a:pPr>
+            <a:endParaRPr lang="en-US" sz="1200" kern="1200" dirty="0">
+              <a:solidFill>
+                <a:schemeClr val="tx1"/>
+              </a:solidFill>
+              <a:effectLst/>
+              <a:latin typeface="+mn-lt"/>
+              <a:ea typeface="+mn-ea"/>
+              <a:cs typeface="+mn-cs"/>
+            </a:endParaRPr>
+          </a:p>
+          <a:p>
+            <a:pPr marL="0" marR="0" lvl="0" indent="0" algn="l" defTabSz="914400" rtl="0" eaLnBrk="1" fontAlgn="auto" latinLnBrk="0" hangingPunct="1">
+              <a:lnSpc>
+                <a:spcPct val="100000"/>
+              </a:lnSpc>
+              <a:spcBef>
+                <a:spcPts val="0"/>
+              </a:spcBef>
+              <a:spcAft>
+                <a:spcPts val="0"/>
+              </a:spcAft>
+              <a:buClrTx/>
+              <a:buSzTx/>
+              <a:buFontTx/>
+              <a:buNone/>
+              <a:tabLst/>
+              <a:defRPr/>
+            </a:pPr>
+            <a:endParaRPr lang="en-US" sz="1200" kern="1200" dirty="0">
+              <a:solidFill>
+                <a:schemeClr val="tx1"/>
+              </a:solidFill>
+              <a:effectLst/>
+              <a:latin typeface="+mn-lt"/>
+              <a:ea typeface="+mn-ea"/>
+              <a:cs typeface="+mn-cs"/>
+            </a:endParaRPr>
+          </a:p>
+          <a:p>
+            <a:pPr marL="0" marR="0" lvl="0" indent="0" algn="l" defTabSz="914400" rtl="0" eaLnBrk="1" fontAlgn="auto" latinLnBrk="0" hangingPunct="1">
+              <a:lnSpc>
+                <a:spcPct val="100000"/>
+              </a:lnSpc>
+              <a:spcBef>
+                <a:spcPts val="0"/>
+              </a:spcBef>
+              <a:spcAft>
+                <a:spcPts val="0"/>
+              </a:spcAft>
+              <a:buClrTx/>
+              <a:buSzTx/>
+              <a:buFontTx/>
+              <a:buNone/>
+              <a:tabLst/>
+              <a:defRPr/>
+            </a:pPr>
+            <a:endParaRPr lang="en-US" sz="1200" kern="1200" dirty="0">
+              <a:solidFill>
+                <a:schemeClr val="tx1"/>
+              </a:solidFill>
+              <a:effectLst/>
+              <a:latin typeface="+mn-lt"/>
+              <a:ea typeface="+mn-ea"/>
+              <a:cs typeface="+mn-cs"/>
+            </a:endParaRPr>
+          </a:p>
+          <a:p>
+            <a:pPr marL="0" marR="0" lvl="0" indent="0" algn="l" defTabSz="914400" rtl="0" eaLnBrk="1" fontAlgn="auto" latinLnBrk="0" hangingPunct="1">
+              <a:lnSpc>
+                <a:spcPct val="100000"/>
+              </a:lnSpc>
+              <a:spcBef>
+                <a:spcPts val="0"/>
+              </a:spcBef>
+              <a:spcAft>
+                <a:spcPts val="0"/>
+              </a:spcAft>
+              <a:buClrTx/>
+              <a:buSzTx/>
+              <a:buFontTx/>
+              <a:buNone/>
+              <a:tabLst/>
+              <a:defRPr/>
+            </a:pPr>
+            <a:endParaRPr lang="en-US" sz="1200" kern="1200" dirty="0">
+              <a:solidFill>
+                <a:schemeClr val="tx1"/>
+              </a:solidFill>
+              <a:effectLst/>
+              <a:latin typeface="+mn-lt"/>
+              <a:ea typeface="+mn-ea"/>
+              <a:cs typeface="+mn-cs"/>
+            </a:endParaRPr>
+          </a:p>
+          <a:p>
+            <a:pPr marL="171450" marR="0" lvl="0" indent="-171450" algn="l" defTabSz="914400" rtl="0" eaLnBrk="1" fontAlgn="auto" latinLnBrk="0" hangingPunct="1">
+              <a:lnSpc>
+                <a:spcPct val="100000"/>
+              </a:lnSpc>
+              <a:spcBef>
+                <a:spcPts val="0"/>
+              </a:spcBef>
+              <a:spcAft>
+                <a:spcPts val="0"/>
+              </a:spcAft>
+              <a:buClrTx/>
+              <a:buSzTx/>
+              <a:buFontTx/>
+              <a:buChar char="-"/>
+              <a:tabLst/>
+              <a:defRPr/>
+            </a:pPr>
+            <a:r>
+              <a:rPr lang="en-US" dirty="0">
+                <a:hlinkClick r:id="rId3"/>
+              </a:rPr>
+              <a:t>https://dev.to/maxart2501/css-for-an-encapsulated-web-7fo</a:t>
+            </a:r>
+            <a:endParaRPr lang="en-US" dirty="0"/>
+          </a:p>
+          <a:p>
+            <a:pPr marL="171450" marR="0" lvl="0" indent="-171450" algn="l" defTabSz="914400" rtl="0" eaLnBrk="1" fontAlgn="auto" latinLnBrk="0" hangingPunct="1">
+              <a:lnSpc>
+                <a:spcPct val="100000"/>
+              </a:lnSpc>
+              <a:spcBef>
+                <a:spcPts val="0"/>
+              </a:spcBef>
+              <a:spcAft>
+                <a:spcPts val="0"/>
+              </a:spcAft>
+              <a:buClrTx/>
+              <a:buSzTx/>
+              <a:buFontTx/>
+              <a:buChar char="-"/>
+              <a:tabLst/>
+              <a:defRPr/>
+            </a:pPr>
+            <a:r>
+              <a:rPr lang="en-US" dirty="0">
+                <a:hlinkClick r:id="rId4"/>
+              </a:rPr>
+              <a:t>https://medium.com/@hammadtariq65/style-encapsulation-in-reactjs-ba4e3212a9f</a:t>
+            </a:r>
+            <a:endParaRPr lang="en-US" dirty="0"/>
+          </a:p>
+          <a:p>
+            <a:pPr marL="171450" marR="0" lvl="0" indent="-171450" algn="l" defTabSz="914400" rtl="0" eaLnBrk="1" fontAlgn="auto" latinLnBrk="0" hangingPunct="1">
+              <a:lnSpc>
+                <a:spcPct val="100000"/>
+              </a:lnSpc>
+              <a:spcBef>
+                <a:spcPts val="0"/>
+              </a:spcBef>
+              <a:spcAft>
+                <a:spcPts val="0"/>
+              </a:spcAft>
+              <a:buClrTx/>
+              <a:buSzTx/>
+              <a:buFontTx/>
+              <a:buChar char="-"/>
+              <a:tabLst/>
+              <a:defRPr/>
+            </a:pPr>
+            <a:r>
+              <a:rPr lang="en-US" dirty="0">
+                <a:hlinkClick r:id="rId5"/>
+              </a:rPr>
+              <a:t>https://developers.google.com/web/fundamentals/web-components/shadowdom</a:t>
+            </a:r>
+            <a:endParaRPr lang="en-US" dirty="0"/>
+          </a:p>
+          <a:p>
+            <a:pPr marL="171450" marR="0" lvl="0" indent="-171450" algn="l" defTabSz="914400" rtl="0" eaLnBrk="1" fontAlgn="auto" latinLnBrk="0" hangingPunct="1">
+              <a:lnSpc>
+                <a:spcPct val="100000"/>
+              </a:lnSpc>
+              <a:spcBef>
+                <a:spcPts val="0"/>
+              </a:spcBef>
+              <a:spcAft>
+                <a:spcPts val="0"/>
+              </a:spcAft>
+              <a:buClrTx/>
+              <a:buSzTx/>
+              <a:buFontTx/>
+              <a:buChar char="-"/>
+              <a:tabLst/>
+              <a:defRPr/>
+            </a:pPr>
+            <a:r>
+              <a:rPr lang="en-US" dirty="0">
+                <a:hlinkClick r:id="rId6"/>
+              </a:rPr>
+              <a:t>https://blog.logrocket.com/understanding-shadow-dom-v1-fa9b81ebe3ac/</a:t>
+            </a:r>
+            <a:endParaRPr lang="en-US" sz="1200" kern="1200" dirty="0">
+              <a:solidFill>
+                <a:schemeClr val="tx1"/>
+              </a:solidFill>
+              <a:effectLst/>
+              <a:latin typeface="+mn-lt"/>
+              <a:ea typeface="+mn-ea"/>
+              <a:cs typeface="+mn-cs"/>
+            </a:endParaRPr>
+          </a:p>
         </p:txBody>
       </p:sp>
       <p:sp>
@@ -2906,7 +4544,7 @@
     </p:spTree>
     <p:extLst>
       <p:ext uri="{BB962C8B-B14F-4D97-AF65-F5344CB8AC3E}">
-        <p14:creationId xmlns:p14="http://schemas.microsoft.com/office/powerpoint/2010/main" val="994558375"/>
+        <p14:creationId xmlns:p14="http://schemas.microsoft.com/office/powerpoint/2010/main" val="2012891520"/>
       </p:ext>
     </p:extLst>
   </p:cSld>
@@ -2978,36 +4616,13 @@
               <a:defRPr/>
             </a:pPr>
             <a:r>
-              <a:rPr lang="en-US" sz="1200" kern="1200" dirty="0">
-                <a:solidFill>
-                  <a:schemeClr val="tx1"/>
-                </a:solidFill>
-                <a:effectLst/>
-                <a:latin typeface="+mn-lt"/>
-                <a:ea typeface="+mn-ea"/>
-                <a:cs typeface="+mn-cs"/>
-              </a:rPr>
-              <a:t>What is CSS encapsulation</a:t>
-            </a:r>
-          </a:p>
-          <a:p>
-            <a:pPr marL="0" marR="0" lvl="0" indent="0" algn="l" defTabSz="914400" rtl="0" eaLnBrk="1" fontAlgn="auto" latinLnBrk="0" hangingPunct="1">
-              <a:lnSpc>
-                <a:spcPct val="100000"/>
-              </a:lnSpc>
-              <a:spcBef>
-                <a:spcPts val="0"/>
-              </a:spcBef>
-              <a:spcAft>
-                <a:spcPts val="0"/>
-              </a:spcAft>
-              <a:buClrTx/>
-              <a:buSzTx/>
-              <a:buFontTx/>
-              <a:buNone/>
-              <a:tabLst/>
-              <a:defRPr/>
-            </a:pPr>
+              <a:rPr lang="en-US" sz="1200" dirty="0">
+                <a:solidFill>
+                  <a:schemeClr val="bg1"/>
+                </a:solidFill>
+              </a:rPr>
+              <a:t>Refactor layout to components</a:t>
+            </a:r>
             <a:endParaRPr lang="en-US" sz="1200" kern="1200" dirty="0">
               <a:solidFill>
                 <a:schemeClr val="tx1"/>
@@ -3018,1042 +4633,6 @@
               <a:cs typeface="+mn-cs"/>
             </a:endParaRPr>
           </a:p>
-          <a:p>
-            <a:pPr marL="0" marR="0" lvl="0" indent="0" algn="l" defTabSz="914400" rtl="0" eaLnBrk="1" fontAlgn="auto" latinLnBrk="0" hangingPunct="1">
-              <a:lnSpc>
-                <a:spcPct val="100000"/>
-              </a:lnSpc>
-              <a:spcBef>
-                <a:spcPts val="0"/>
-              </a:spcBef>
-              <a:spcAft>
-                <a:spcPts val="0"/>
-              </a:spcAft>
-              <a:buClrTx/>
-              <a:buSzTx/>
-              <a:buFontTx/>
-              <a:buNone/>
-              <a:tabLst/>
-              <a:defRPr/>
-            </a:pPr>
-            <a:r>
-              <a:rPr lang="en-US" sz="1200" kern="1200" dirty="0">
-                <a:solidFill>
-                  <a:schemeClr val="tx1"/>
-                </a:solidFill>
-                <a:effectLst/>
-                <a:latin typeface="+mn-lt"/>
-                <a:ea typeface="+mn-ea"/>
-                <a:cs typeface="+mn-cs"/>
-              </a:rPr>
-              <a:t>In CSS we have the following issues:</a:t>
-            </a:r>
-          </a:p>
-          <a:p>
-            <a:pPr marL="0" marR="0" lvl="0" indent="0" algn="l" defTabSz="914400" rtl="0" eaLnBrk="1" fontAlgn="auto" latinLnBrk="0" hangingPunct="1">
-              <a:lnSpc>
-                <a:spcPct val="100000"/>
-              </a:lnSpc>
-              <a:spcBef>
-                <a:spcPts val="0"/>
-              </a:spcBef>
-              <a:spcAft>
-                <a:spcPts val="0"/>
-              </a:spcAft>
-              <a:buClrTx/>
-              <a:buSzTx/>
-              <a:buFontTx/>
-              <a:buNone/>
-              <a:tabLst/>
-              <a:defRPr/>
-            </a:pPr>
-            <a:r>
-              <a:rPr lang="en-US" sz="1200" kern="1200" dirty="0">
-                <a:solidFill>
-                  <a:schemeClr val="tx1"/>
-                </a:solidFill>
-                <a:effectLst/>
-                <a:latin typeface="+mn-lt"/>
-                <a:ea typeface="+mn-ea"/>
-                <a:cs typeface="+mn-cs"/>
-              </a:rPr>
-              <a:t>CSS is a global scope – when we defined a class it might apply to any element in the DOM, this might cause applying styles to undesired element.</a:t>
-            </a:r>
-          </a:p>
-          <a:p>
-            <a:pPr marL="0" marR="0" lvl="0" indent="0" algn="l" defTabSz="914400" rtl="0" eaLnBrk="1" fontAlgn="auto" latinLnBrk="0" hangingPunct="1">
-              <a:lnSpc>
-                <a:spcPct val="100000"/>
-              </a:lnSpc>
-              <a:spcBef>
-                <a:spcPts val="0"/>
-              </a:spcBef>
-              <a:spcAft>
-                <a:spcPts val="0"/>
-              </a:spcAft>
-              <a:buClrTx/>
-              <a:buSzTx/>
-              <a:buFontTx/>
-              <a:buNone/>
-              <a:tabLst/>
-              <a:defRPr/>
-            </a:pPr>
-            <a:r>
-              <a:rPr lang="en-US" sz="1200" kern="1200" dirty="0">
-                <a:solidFill>
-                  <a:schemeClr val="tx1"/>
-                </a:solidFill>
-                <a:effectLst/>
-                <a:latin typeface="+mn-lt"/>
-                <a:ea typeface="+mn-ea"/>
-                <a:cs typeface="+mn-cs"/>
-              </a:rPr>
-              <a:t>Specificity War, Inheritance issues – CSS become so complex so we need to start calculating style specificity level  (id is 100, class is 10, tag is 1 etc.) to override existing/inherit style</a:t>
-            </a:r>
-          </a:p>
-          <a:p>
-            <a:pPr marL="0" marR="0" lvl="0" indent="0" algn="l" defTabSz="914400" rtl="0" eaLnBrk="1" fontAlgn="auto" latinLnBrk="0" hangingPunct="1">
-              <a:lnSpc>
-                <a:spcPct val="100000"/>
-              </a:lnSpc>
-              <a:spcBef>
-                <a:spcPts val="0"/>
-              </a:spcBef>
-              <a:spcAft>
-                <a:spcPts val="0"/>
-              </a:spcAft>
-              <a:buClrTx/>
-              <a:buSzTx/>
-              <a:buFontTx/>
-              <a:buNone/>
-              <a:tabLst/>
-              <a:defRPr/>
-            </a:pPr>
-            <a:r>
-              <a:rPr lang="en-US" sz="1200" kern="1200" dirty="0">
-                <a:solidFill>
-                  <a:schemeClr val="tx1"/>
-                </a:solidFill>
-                <a:effectLst/>
-                <a:latin typeface="+mn-lt"/>
-                <a:ea typeface="+mn-ea"/>
-                <a:cs typeface="+mn-cs"/>
-              </a:rPr>
-              <a:t>Name clashing – will but same class name like our third party (everyone wants to call button as button class)</a:t>
-            </a:r>
-          </a:p>
-          <a:p>
-            <a:pPr marL="0" marR="0" lvl="0" indent="0" algn="l" defTabSz="914400" rtl="0" eaLnBrk="1" fontAlgn="auto" latinLnBrk="0" hangingPunct="1">
-              <a:lnSpc>
-                <a:spcPct val="100000"/>
-              </a:lnSpc>
-              <a:spcBef>
-                <a:spcPts val="0"/>
-              </a:spcBef>
-              <a:spcAft>
-                <a:spcPts val="0"/>
-              </a:spcAft>
-              <a:buClrTx/>
-              <a:buSzTx/>
-              <a:buFontTx/>
-              <a:buNone/>
-              <a:tabLst/>
-              <a:defRPr/>
-            </a:pPr>
-            <a:endParaRPr lang="en-US" sz="1200" kern="1200" dirty="0">
-              <a:solidFill>
-                <a:schemeClr val="tx1"/>
-              </a:solidFill>
-              <a:effectLst/>
-              <a:latin typeface="+mn-lt"/>
-              <a:ea typeface="+mn-ea"/>
-              <a:cs typeface="+mn-cs"/>
-            </a:endParaRPr>
-          </a:p>
-          <a:p>
-            <a:pPr marL="0" marR="0" lvl="0" indent="0" algn="l" defTabSz="914400" rtl="0" eaLnBrk="1" fontAlgn="auto" latinLnBrk="0" hangingPunct="1">
-              <a:lnSpc>
-                <a:spcPct val="100000"/>
-              </a:lnSpc>
-              <a:spcBef>
-                <a:spcPts val="0"/>
-              </a:spcBef>
-              <a:spcAft>
-                <a:spcPts val="0"/>
-              </a:spcAft>
-              <a:buClrTx/>
-              <a:buSzTx/>
-              <a:buFontTx/>
-              <a:buNone/>
-              <a:tabLst/>
-              <a:defRPr/>
-            </a:pPr>
-            <a:r>
-              <a:rPr lang="en-US" sz="1200" kern="1200" dirty="0">
-                <a:solidFill>
-                  <a:schemeClr val="tx1"/>
-                </a:solidFill>
-                <a:effectLst/>
-                <a:latin typeface="+mn-lt"/>
-                <a:ea typeface="+mn-ea"/>
-                <a:cs typeface="+mn-cs"/>
-              </a:rPr>
-              <a:t>The first solution is to create best practices to our project:</a:t>
-            </a:r>
-          </a:p>
-          <a:p>
-            <a:pPr marL="171450" marR="0" lvl="0" indent="-171450" algn="l" defTabSz="914400" rtl="0" eaLnBrk="1" fontAlgn="auto" latinLnBrk="0" hangingPunct="1">
-              <a:lnSpc>
-                <a:spcPct val="100000"/>
-              </a:lnSpc>
-              <a:spcBef>
-                <a:spcPts val="0"/>
-              </a:spcBef>
-              <a:spcAft>
-                <a:spcPts val="0"/>
-              </a:spcAft>
-              <a:buClrTx/>
-              <a:buSzTx/>
-              <a:buFontTx/>
-              <a:buChar char="-"/>
-              <a:tabLst/>
-              <a:defRPr/>
-            </a:pPr>
-            <a:r>
-              <a:rPr lang="en-US" sz="1200" kern="1200" dirty="0">
-                <a:solidFill>
-                  <a:schemeClr val="tx1"/>
-                </a:solidFill>
-                <a:effectLst/>
-                <a:latin typeface="+mn-lt"/>
-                <a:ea typeface="+mn-ea"/>
-                <a:cs typeface="+mn-cs"/>
-              </a:rPr>
-              <a:t>No more ID's in selectors - solve Specificity War</a:t>
-            </a:r>
-          </a:p>
-          <a:p>
-            <a:pPr marL="171450" marR="0" lvl="0" indent="-171450" algn="l" defTabSz="914400" rtl="0" eaLnBrk="1" fontAlgn="auto" latinLnBrk="0" hangingPunct="1">
-              <a:lnSpc>
-                <a:spcPct val="100000"/>
-              </a:lnSpc>
-              <a:spcBef>
-                <a:spcPts val="0"/>
-              </a:spcBef>
-              <a:spcAft>
-                <a:spcPts val="0"/>
-              </a:spcAft>
-              <a:buClrTx/>
-              <a:buSzTx/>
-              <a:buFontTx/>
-              <a:buChar char="-"/>
-              <a:tabLst/>
-              <a:defRPr/>
-            </a:pPr>
-            <a:r>
-              <a:rPr lang="en-US" sz="1200" kern="1200" dirty="0">
-                <a:solidFill>
-                  <a:schemeClr val="tx1"/>
-                </a:solidFill>
-                <a:effectLst/>
-                <a:latin typeface="+mn-lt"/>
-                <a:ea typeface="+mn-ea"/>
-                <a:cs typeface="+mn-cs"/>
-              </a:rPr>
-              <a:t>No "brute-force" values (as that z-index) – solve override issues</a:t>
-            </a:r>
-          </a:p>
-          <a:p>
-            <a:pPr marL="171450" marR="0" lvl="0" indent="-171450" algn="l" defTabSz="914400" rtl="0" eaLnBrk="1" fontAlgn="auto" latinLnBrk="0" hangingPunct="1">
-              <a:lnSpc>
-                <a:spcPct val="100000"/>
-              </a:lnSpc>
-              <a:spcBef>
-                <a:spcPts val="0"/>
-              </a:spcBef>
-              <a:spcAft>
-                <a:spcPts val="0"/>
-              </a:spcAft>
-              <a:buClrTx/>
-              <a:buSzTx/>
-              <a:buFontTx/>
-              <a:buChar char="-"/>
-              <a:tabLst/>
-              <a:defRPr/>
-            </a:pPr>
-            <a:r>
-              <a:rPr lang="en-US" sz="1200" kern="1200" dirty="0">
-                <a:solidFill>
-                  <a:schemeClr val="tx1"/>
-                </a:solidFill>
-                <a:effectLst/>
-                <a:latin typeface="+mn-lt"/>
-                <a:ea typeface="+mn-ea"/>
-                <a:cs typeface="+mn-cs"/>
-              </a:rPr>
-              <a:t>No more !important or exotic CSS properties – don’t ever use important only for rare cases</a:t>
-            </a:r>
-          </a:p>
-          <a:p>
-            <a:pPr marL="171450" marR="0" lvl="0" indent="-171450" algn="l" defTabSz="914400" rtl="0" eaLnBrk="1" fontAlgn="auto" latinLnBrk="0" hangingPunct="1">
-              <a:lnSpc>
-                <a:spcPct val="100000"/>
-              </a:lnSpc>
-              <a:spcBef>
-                <a:spcPts val="0"/>
-              </a:spcBef>
-              <a:spcAft>
-                <a:spcPts val="0"/>
-              </a:spcAft>
-              <a:buClrTx/>
-              <a:buSzTx/>
-              <a:buFontTx/>
-              <a:buChar char="-"/>
-              <a:tabLst/>
-              <a:defRPr/>
-            </a:pPr>
-            <a:r>
-              <a:rPr lang="en-US" sz="1200" kern="1200" dirty="0">
-                <a:solidFill>
-                  <a:schemeClr val="tx1"/>
-                </a:solidFill>
-                <a:effectLst/>
-                <a:latin typeface="+mn-lt"/>
-                <a:ea typeface="+mn-ea"/>
-                <a:cs typeface="+mn-cs"/>
-              </a:rPr>
-              <a:t>No strict bindings between CSS and the DOM structure – don’t describe the DOM in CSS (selector using html tag), why? Because structure might be changed &amp; less readable when looking at it (class with descripted name will explain us more about this element)</a:t>
-            </a:r>
-          </a:p>
-          <a:p>
-            <a:pPr marL="171450" marR="0" lvl="0" indent="-171450" algn="l" defTabSz="914400" rtl="0" eaLnBrk="1" fontAlgn="auto" latinLnBrk="0" hangingPunct="1">
-              <a:lnSpc>
-                <a:spcPct val="100000"/>
-              </a:lnSpc>
-              <a:spcBef>
-                <a:spcPts val="0"/>
-              </a:spcBef>
-              <a:spcAft>
-                <a:spcPts val="0"/>
-              </a:spcAft>
-              <a:buClrTx/>
-              <a:buSzTx/>
-              <a:buFontTx/>
-              <a:buChar char="-"/>
-              <a:tabLst/>
-              <a:defRPr/>
-            </a:pPr>
-            <a:r>
-              <a:rPr lang="en-US" sz="1200" kern="1200" dirty="0">
-                <a:solidFill>
-                  <a:schemeClr val="tx1"/>
-                </a:solidFill>
-                <a:effectLst/>
-                <a:latin typeface="+mn-lt"/>
-                <a:ea typeface="+mn-ea"/>
-                <a:cs typeface="+mn-cs"/>
-              </a:rPr>
-              <a:t>Keep the </a:t>
-            </a:r>
-            <a:r>
-              <a:rPr lang="en-US" sz="1200" kern="1200" dirty="0" err="1">
-                <a:solidFill>
-                  <a:schemeClr val="tx1"/>
-                </a:solidFill>
-                <a:effectLst/>
-                <a:latin typeface="+mn-lt"/>
-                <a:ea typeface="+mn-ea"/>
-                <a:cs typeface="+mn-cs"/>
-              </a:rPr>
-              <a:t>specifity</a:t>
-            </a:r>
-            <a:r>
-              <a:rPr lang="en-US" sz="1200" kern="1200" dirty="0">
-                <a:solidFill>
-                  <a:schemeClr val="tx1"/>
-                </a:solidFill>
-                <a:effectLst/>
-                <a:latin typeface="+mn-lt"/>
-                <a:ea typeface="+mn-ea"/>
-                <a:cs typeface="+mn-cs"/>
-              </a:rPr>
-              <a:t> as low as possible, ideally 0.1.0 – to prevent overrides issues</a:t>
-            </a:r>
-          </a:p>
-          <a:p>
-            <a:pPr marL="171450" marR="0" lvl="0" indent="-171450" algn="l" defTabSz="914400" rtl="0" eaLnBrk="1" fontAlgn="auto" latinLnBrk="0" hangingPunct="1">
-              <a:lnSpc>
-                <a:spcPct val="100000"/>
-              </a:lnSpc>
-              <a:spcBef>
-                <a:spcPts val="0"/>
-              </a:spcBef>
-              <a:spcAft>
-                <a:spcPts val="0"/>
-              </a:spcAft>
-              <a:buClrTx/>
-              <a:buSzTx/>
-              <a:buFontTx/>
-              <a:buChar char="-"/>
-              <a:tabLst/>
-              <a:defRPr/>
-            </a:pPr>
-            <a:r>
-              <a:rPr lang="en-US" sz="1200" kern="1200" dirty="0">
-                <a:solidFill>
-                  <a:schemeClr val="tx1"/>
-                </a:solidFill>
-                <a:effectLst/>
-                <a:latin typeface="+mn-lt"/>
-                <a:ea typeface="+mn-ea"/>
-                <a:cs typeface="+mn-cs"/>
-              </a:rPr>
-              <a:t>Use namespaces for your classes. – like project prefix to solve side effect</a:t>
-            </a:r>
-          </a:p>
-          <a:p>
-            <a:pPr marL="0" marR="0" lvl="0" indent="0" algn="l" defTabSz="914400" rtl="0" eaLnBrk="1" fontAlgn="auto" latinLnBrk="0" hangingPunct="1">
-              <a:lnSpc>
-                <a:spcPct val="100000"/>
-              </a:lnSpc>
-              <a:spcBef>
-                <a:spcPts val="0"/>
-              </a:spcBef>
-              <a:spcAft>
-                <a:spcPts val="0"/>
-              </a:spcAft>
-              <a:buClrTx/>
-              <a:buSzTx/>
-              <a:buFontTx/>
-              <a:buNone/>
-              <a:tabLst/>
-              <a:defRPr/>
-            </a:pPr>
-            <a:endParaRPr lang="en-US" sz="1200" kern="1200" dirty="0">
-              <a:solidFill>
-                <a:schemeClr val="tx1"/>
-              </a:solidFill>
-              <a:effectLst/>
-              <a:latin typeface="+mn-lt"/>
-              <a:ea typeface="+mn-ea"/>
-              <a:cs typeface="+mn-cs"/>
-            </a:endParaRPr>
-          </a:p>
-          <a:p>
-            <a:pPr marL="0" marR="0" lvl="0" indent="0" algn="l" defTabSz="914400" rtl="0" eaLnBrk="1" fontAlgn="auto" latinLnBrk="0" hangingPunct="1">
-              <a:lnSpc>
-                <a:spcPct val="100000"/>
-              </a:lnSpc>
-              <a:spcBef>
-                <a:spcPts val="0"/>
-              </a:spcBef>
-              <a:spcAft>
-                <a:spcPts val="0"/>
-              </a:spcAft>
-              <a:buClrTx/>
-              <a:buSzTx/>
-              <a:buFontTx/>
-              <a:buNone/>
-              <a:tabLst/>
-              <a:defRPr/>
-            </a:pPr>
-            <a:r>
-              <a:rPr lang="en-US" sz="1200" kern="1200" dirty="0">
-                <a:solidFill>
-                  <a:schemeClr val="tx1"/>
-                </a:solidFill>
-                <a:effectLst/>
-                <a:latin typeface="+mn-lt"/>
-                <a:ea typeface="+mn-ea"/>
-                <a:cs typeface="+mn-cs"/>
-              </a:rPr>
-              <a:t>To solve this issue, The idea is to create a private scope for styles so all styles create in a component will apply only to this component and will not affect outside elements.</a:t>
-            </a:r>
-          </a:p>
-          <a:p>
-            <a:pPr marL="0" marR="0" lvl="0" indent="0" algn="l" defTabSz="914400" rtl="0" eaLnBrk="1" fontAlgn="auto" latinLnBrk="0" hangingPunct="1">
-              <a:lnSpc>
-                <a:spcPct val="100000"/>
-              </a:lnSpc>
-              <a:spcBef>
-                <a:spcPts val="0"/>
-              </a:spcBef>
-              <a:spcAft>
-                <a:spcPts val="0"/>
-              </a:spcAft>
-              <a:buClrTx/>
-              <a:buSzTx/>
-              <a:buFontTx/>
-              <a:buNone/>
-              <a:tabLst/>
-              <a:defRPr/>
-            </a:pPr>
-            <a:r>
-              <a:rPr lang="en-US" sz="1200" kern="1200" dirty="0">
-                <a:solidFill>
-                  <a:schemeClr val="tx1"/>
-                </a:solidFill>
-                <a:effectLst/>
-                <a:latin typeface="+mn-lt"/>
-                <a:ea typeface="+mn-ea"/>
-                <a:cs typeface="+mn-cs"/>
-              </a:rPr>
-              <a:t>This strategy will solve us a lot if side effect like one style effecting other element.</a:t>
-            </a:r>
-          </a:p>
-          <a:p>
-            <a:pPr marL="0" marR="0" lvl="0" indent="0" algn="l" defTabSz="914400" rtl="0" eaLnBrk="1" fontAlgn="auto" latinLnBrk="0" hangingPunct="1">
-              <a:lnSpc>
-                <a:spcPct val="100000"/>
-              </a:lnSpc>
-              <a:spcBef>
-                <a:spcPts val="0"/>
-              </a:spcBef>
-              <a:spcAft>
-                <a:spcPts val="0"/>
-              </a:spcAft>
-              <a:buClrTx/>
-              <a:buSzTx/>
-              <a:buFontTx/>
-              <a:buNone/>
-              <a:tabLst/>
-              <a:defRPr/>
-            </a:pPr>
-            <a:endParaRPr lang="en-US" sz="1200" kern="1200" dirty="0">
-              <a:solidFill>
-                <a:schemeClr val="tx1"/>
-              </a:solidFill>
-              <a:effectLst/>
-              <a:latin typeface="+mn-lt"/>
-              <a:ea typeface="+mn-ea"/>
-              <a:cs typeface="+mn-cs"/>
-            </a:endParaRPr>
-          </a:p>
-          <a:p>
-            <a:pPr marL="0" marR="0" lvl="0" indent="0" algn="l" defTabSz="914400" rtl="0" eaLnBrk="1" fontAlgn="auto" latinLnBrk="0" hangingPunct="1">
-              <a:lnSpc>
-                <a:spcPct val="100000"/>
-              </a:lnSpc>
-              <a:spcBef>
-                <a:spcPts val="0"/>
-              </a:spcBef>
-              <a:spcAft>
-                <a:spcPts val="0"/>
-              </a:spcAft>
-              <a:buClrTx/>
-              <a:buSzTx/>
-              <a:buFontTx/>
-              <a:buNone/>
-              <a:tabLst/>
-              <a:defRPr/>
-            </a:pPr>
-            <a:r>
-              <a:rPr lang="en-US" sz="1200" kern="1200" dirty="0">
-                <a:solidFill>
-                  <a:schemeClr val="tx1"/>
-                </a:solidFill>
-                <a:effectLst/>
-                <a:latin typeface="+mn-lt"/>
-                <a:ea typeface="+mn-ea"/>
-                <a:cs typeface="+mn-cs"/>
-              </a:rPr>
-              <a:t>Let see an example using it (by creating the scope by yourself):</a:t>
-            </a:r>
-          </a:p>
-          <a:p>
-            <a:pPr marL="0" marR="0" lvl="0" indent="0" algn="l" defTabSz="914400" rtl="0" eaLnBrk="1" fontAlgn="auto" latinLnBrk="0" hangingPunct="1">
-              <a:lnSpc>
-                <a:spcPct val="100000"/>
-              </a:lnSpc>
-              <a:spcBef>
-                <a:spcPts val="0"/>
-              </a:spcBef>
-              <a:spcAft>
-                <a:spcPts val="0"/>
-              </a:spcAft>
-              <a:buClrTx/>
-              <a:buSzTx/>
-              <a:buFontTx/>
-              <a:buNone/>
-              <a:tabLst/>
-              <a:defRPr/>
-            </a:pPr>
-            <a:r>
-              <a:rPr lang="en-US" sz="1200" kern="1200" dirty="0">
-                <a:solidFill>
-                  <a:schemeClr val="tx1"/>
-                </a:solidFill>
-                <a:effectLst/>
-                <a:latin typeface="+mn-lt"/>
-                <a:ea typeface="+mn-ea"/>
-                <a:cs typeface="+mn-cs"/>
-              </a:rPr>
-              <a:t>Scoping the style – here we can see an example how we can create a scope with BEM, in this example the prefix is </a:t>
-            </a:r>
-            <a:r>
-              <a:rPr lang="en-US" sz="1200" b="0" i="0" kern="1200" dirty="0">
-                <a:solidFill>
-                  <a:schemeClr val="tx1"/>
-                </a:solidFill>
-                <a:effectLst/>
-                <a:latin typeface="+mn-lt"/>
-                <a:ea typeface="+mn-ea"/>
-                <a:cs typeface="+mn-cs"/>
-              </a:rPr>
-              <a:t>content-card.</a:t>
-            </a:r>
-            <a:endParaRPr lang="en-US" sz="1200" kern="1200" dirty="0">
-              <a:solidFill>
-                <a:schemeClr val="tx1"/>
-              </a:solidFill>
-              <a:effectLst/>
-              <a:latin typeface="+mn-lt"/>
-              <a:ea typeface="+mn-ea"/>
-              <a:cs typeface="+mn-cs"/>
-            </a:endParaRPr>
-          </a:p>
-          <a:p>
-            <a:pPr marL="0" marR="0" lvl="0" indent="0" algn="l" defTabSz="914400" rtl="0" eaLnBrk="1" fontAlgn="auto" latinLnBrk="0" hangingPunct="1">
-              <a:lnSpc>
-                <a:spcPct val="100000"/>
-              </a:lnSpc>
-              <a:spcBef>
-                <a:spcPts val="0"/>
-              </a:spcBef>
-              <a:spcAft>
-                <a:spcPts val="0"/>
-              </a:spcAft>
-              <a:buClrTx/>
-              <a:buSzTx/>
-              <a:buFontTx/>
-              <a:buNone/>
-              <a:tabLst/>
-              <a:defRPr/>
-            </a:pPr>
-            <a:endParaRPr lang="en-US" sz="1200" kern="1200" dirty="0">
-              <a:solidFill>
-                <a:schemeClr val="tx1"/>
-              </a:solidFill>
-              <a:effectLst/>
-              <a:latin typeface="+mn-lt"/>
-              <a:ea typeface="+mn-ea"/>
-              <a:cs typeface="+mn-cs"/>
-            </a:endParaRPr>
-          </a:p>
-          <a:p>
-            <a:pPr marL="0" marR="0" lvl="0" indent="0" algn="l" defTabSz="914400" rtl="0" eaLnBrk="1" fontAlgn="auto" latinLnBrk="0" hangingPunct="1">
-              <a:lnSpc>
-                <a:spcPct val="100000"/>
-              </a:lnSpc>
-              <a:spcBef>
-                <a:spcPts val="0"/>
-              </a:spcBef>
-              <a:spcAft>
-                <a:spcPts val="0"/>
-              </a:spcAft>
-              <a:buClrTx/>
-              <a:buSzTx/>
-              <a:buFontTx/>
-              <a:buNone/>
-              <a:tabLst/>
-              <a:defRPr/>
-            </a:pPr>
-            <a:r>
-              <a:rPr lang="en-US" sz="1200" kern="1200" dirty="0">
-                <a:solidFill>
-                  <a:schemeClr val="tx1"/>
-                </a:solidFill>
-                <a:effectLst/>
-                <a:latin typeface="+mn-lt"/>
-                <a:ea typeface="+mn-ea"/>
-                <a:cs typeface="+mn-cs"/>
-              </a:rPr>
-              <a:t>Second option is </a:t>
-            </a:r>
-            <a:r>
-              <a:rPr lang="en-US" sz="1200" b="0" i="0" kern="1200" dirty="0">
-                <a:solidFill>
-                  <a:schemeClr val="tx1"/>
-                </a:solidFill>
-                <a:effectLst/>
-                <a:latin typeface="+mn-lt"/>
-                <a:ea typeface="+mn-ea"/>
-                <a:cs typeface="+mn-cs"/>
-              </a:rPr>
-              <a:t>Emulated the scope </a:t>
-            </a:r>
-            <a:r>
-              <a:rPr lang="en-US" sz="1200" b="0" i="0" kern="1200" dirty="0" err="1">
-                <a:solidFill>
-                  <a:schemeClr val="tx1"/>
-                </a:solidFill>
-                <a:effectLst/>
-                <a:latin typeface="+mn-lt"/>
-                <a:ea typeface="+mn-ea"/>
-                <a:cs typeface="+mn-cs"/>
-              </a:rPr>
-              <a:t>dynamicly</a:t>
-            </a:r>
-            <a:r>
-              <a:rPr lang="en-US" sz="1200" b="0" i="0" kern="1200" dirty="0">
-                <a:solidFill>
-                  <a:schemeClr val="tx1"/>
-                </a:solidFill>
-                <a:effectLst/>
-                <a:latin typeface="+mn-lt"/>
-                <a:ea typeface="+mn-ea"/>
-                <a:cs typeface="+mn-cs"/>
-              </a:rPr>
-              <a:t> like angular is doing (each framework hove is own name and technic but all solving the same issue in different generate way)</a:t>
-            </a:r>
-          </a:p>
-          <a:p>
-            <a:pPr marL="0" marR="0" lvl="0" indent="0" algn="l" defTabSz="914400" rtl="0" eaLnBrk="1" fontAlgn="auto" latinLnBrk="0" hangingPunct="1">
-              <a:lnSpc>
-                <a:spcPct val="100000"/>
-              </a:lnSpc>
-              <a:spcBef>
-                <a:spcPts val="0"/>
-              </a:spcBef>
-              <a:spcAft>
-                <a:spcPts val="0"/>
-              </a:spcAft>
-              <a:buClrTx/>
-              <a:buSzTx/>
-              <a:buFontTx/>
-              <a:buNone/>
-              <a:tabLst/>
-              <a:defRPr/>
-            </a:pPr>
-            <a:endParaRPr lang="en-US" sz="1200" b="0" i="0" kern="1200" dirty="0">
-              <a:solidFill>
-                <a:schemeClr val="tx1"/>
-              </a:solidFill>
-              <a:effectLst/>
-              <a:latin typeface="+mn-lt"/>
-              <a:ea typeface="+mn-ea"/>
-              <a:cs typeface="+mn-cs"/>
-            </a:endParaRPr>
-          </a:p>
-          <a:p>
-            <a:pPr marL="0" marR="0" lvl="0" indent="0" algn="l" defTabSz="914400" rtl="0" eaLnBrk="1" fontAlgn="auto" latinLnBrk="0" hangingPunct="1">
-              <a:lnSpc>
-                <a:spcPct val="100000"/>
-              </a:lnSpc>
-              <a:spcBef>
-                <a:spcPts val="0"/>
-              </a:spcBef>
-              <a:spcAft>
-                <a:spcPts val="0"/>
-              </a:spcAft>
-              <a:buClrTx/>
-              <a:buSzTx/>
-              <a:buFontTx/>
-              <a:buNone/>
-              <a:tabLst/>
-              <a:defRPr/>
-            </a:pPr>
-            <a:r>
-              <a:rPr lang="en-US" sz="1200" b="0" i="0" kern="1200" dirty="0">
-                <a:solidFill>
-                  <a:schemeClr val="tx1"/>
-                </a:solidFill>
-                <a:effectLst/>
-                <a:latin typeface="+mn-lt"/>
-                <a:ea typeface="+mn-ea"/>
-                <a:cs typeface="+mn-cs"/>
-              </a:rPr>
-              <a:t>Third option is to use shadow DOM - Shadow DOM is API providing a way to attach a hidden separated DOM (we Can put styles, JS etc.) to an element. You can think of shadow DOM as a </a:t>
-            </a:r>
-            <a:r>
-              <a:rPr lang="en-US" sz="1200" b="1" i="0" kern="1200" dirty="0">
-                <a:solidFill>
-                  <a:schemeClr val="tx1"/>
-                </a:solidFill>
-                <a:effectLst/>
-                <a:latin typeface="+mn-lt"/>
-                <a:ea typeface="+mn-ea"/>
-                <a:cs typeface="+mn-cs"/>
-              </a:rPr>
-              <a:t>scoped subtree</a:t>
-            </a:r>
-            <a:r>
-              <a:rPr lang="en-US" sz="1200" b="0" i="0" kern="1200" dirty="0">
-                <a:solidFill>
-                  <a:schemeClr val="tx1"/>
-                </a:solidFill>
-                <a:effectLst/>
-                <a:latin typeface="+mn-lt"/>
-                <a:ea typeface="+mn-ea"/>
-                <a:cs typeface="+mn-cs"/>
-              </a:rPr>
-              <a:t> inside your element.</a:t>
-            </a:r>
-          </a:p>
-          <a:p>
-            <a:pPr marL="0" marR="0" lvl="0" indent="0" algn="l" defTabSz="914400" rtl="0" eaLnBrk="1" fontAlgn="auto" latinLnBrk="0" hangingPunct="1">
-              <a:lnSpc>
-                <a:spcPct val="100000"/>
-              </a:lnSpc>
-              <a:spcBef>
-                <a:spcPts val="0"/>
-              </a:spcBef>
-              <a:spcAft>
-                <a:spcPts val="0"/>
-              </a:spcAft>
-              <a:buClrTx/>
-              <a:buSzTx/>
-              <a:buFontTx/>
-              <a:buNone/>
-              <a:tabLst/>
-              <a:defRPr/>
-            </a:pPr>
-            <a:r>
-              <a:rPr lang="en-US" sz="1200" b="0" i="0" kern="1200" dirty="0">
-                <a:solidFill>
-                  <a:schemeClr val="tx1"/>
-                </a:solidFill>
-                <a:effectLst/>
-                <a:latin typeface="+mn-lt"/>
-                <a:ea typeface="+mn-ea"/>
-                <a:cs typeface="+mn-cs"/>
-              </a:rPr>
-              <a:t>All the styles will be leaving only in this component</a:t>
-            </a:r>
-            <a:endParaRPr lang="en-US" sz="1200" kern="1200" dirty="0">
-              <a:solidFill>
-                <a:schemeClr val="tx1"/>
-              </a:solidFill>
-              <a:effectLst/>
-              <a:latin typeface="+mn-lt"/>
-              <a:ea typeface="+mn-ea"/>
-              <a:cs typeface="+mn-cs"/>
-            </a:endParaRPr>
-          </a:p>
-          <a:p>
-            <a:pPr marL="0" marR="0" lvl="0" indent="0" algn="l" defTabSz="914400" rtl="0" eaLnBrk="1" fontAlgn="auto" latinLnBrk="0" hangingPunct="1">
-              <a:lnSpc>
-                <a:spcPct val="100000"/>
-              </a:lnSpc>
-              <a:spcBef>
-                <a:spcPts val="0"/>
-              </a:spcBef>
-              <a:spcAft>
-                <a:spcPts val="0"/>
-              </a:spcAft>
-              <a:buClrTx/>
-              <a:buSzTx/>
-              <a:buFontTx/>
-              <a:buNone/>
-              <a:tabLst/>
-              <a:defRPr/>
-            </a:pPr>
-            <a:endParaRPr lang="en-US" sz="1200" kern="1200" dirty="0">
-              <a:solidFill>
-                <a:schemeClr val="tx1"/>
-              </a:solidFill>
-              <a:effectLst/>
-              <a:latin typeface="+mn-lt"/>
-              <a:ea typeface="+mn-ea"/>
-              <a:cs typeface="+mn-cs"/>
-            </a:endParaRPr>
-          </a:p>
-          <a:p>
-            <a:pPr marL="0" marR="0" lvl="0" indent="0" algn="l" defTabSz="914400" rtl="0" eaLnBrk="1" fontAlgn="auto" latinLnBrk="0" hangingPunct="1">
-              <a:lnSpc>
-                <a:spcPct val="100000"/>
-              </a:lnSpc>
-              <a:spcBef>
-                <a:spcPts val="0"/>
-              </a:spcBef>
-              <a:spcAft>
-                <a:spcPts val="0"/>
-              </a:spcAft>
-              <a:buClrTx/>
-              <a:buSzTx/>
-              <a:buFontTx/>
-              <a:buNone/>
-              <a:tabLst/>
-              <a:defRPr/>
-            </a:pPr>
-            <a:endParaRPr lang="en-US" sz="1200" kern="1200" dirty="0">
-              <a:solidFill>
-                <a:schemeClr val="tx1"/>
-              </a:solidFill>
-              <a:effectLst/>
-              <a:latin typeface="+mn-lt"/>
-              <a:ea typeface="+mn-ea"/>
-              <a:cs typeface="+mn-cs"/>
-            </a:endParaRPr>
-          </a:p>
-          <a:p>
-            <a:pPr marL="0" marR="0" lvl="0" indent="0" algn="l" defTabSz="914400" rtl="0" eaLnBrk="1" fontAlgn="auto" latinLnBrk="0" hangingPunct="1">
-              <a:lnSpc>
-                <a:spcPct val="100000"/>
-              </a:lnSpc>
-              <a:spcBef>
-                <a:spcPts val="0"/>
-              </a:spcBef>
-              <a:spcAft>
-                <a:spcPts val="0"/>
-              </a:spcAft>
-              <a:buClrTx/>
-              <a:buSzTx/>
-              <a:buFontTx/>
-              <a:buNone/>
-              <a:tabLst/>
-              <a:defRPr/>
-            </a:pPr>
-            <a:endParaRPr lang="en-US" sz="1200" kern="1200" dirty="0">
-              <a:solidFill>
-                <a:schemeClr val="tx1"/>
-              </a:solidFill>
-              <a:effectLst/>
-              <a:latin typeface="+mn-lt"/>
-              <a:ea typeface="+mn-ea"/>
-              <a:cs typeface="+mn-cs"/>
-            </a:endParaRPr>
-          </a:p>
-          <a:p>
-            <a:pPr marL="0" marR="0" lvl="0" indent="0" algn="l" defTabSz="914400" rtl="0" eaLnBrk="1" fontAlgn="auto" latinLnBrk="0" hangingPunct="1">
-              <a:lnSpc>
-                <a:spcPct val="100000"/>
-              </a:lnSpc>
-              <a:spcBef>
-                <a:spcPts val="0"/>
-              </a:spcBef>
-              <a:spcAft>
-                <a:spcPts val="0"/>
-              </a:spcAft>
-              <a:buClrTx/>
-              <a:buSzTx/>
-              <a:buFontTx/>
-              <a:buNone/>
-              <a:tabLst/>
-              <a:defRPr/>
-            </a:pPr>
-            <a:endParaRPr lang="en-US" sz="1200" kern="1200" dirty="0">
-              <a:solidFill>
-                <a:schemeClr val="tx1"/>
-              </a:solidFill>
-              <a:effectLst/>
-              <a:latin typeface="+mn-lt"/>
-              <a:ea typeface="+mn-ea"/>
-              <a:cs typeface="+mn-cs"/>
-            </a:endParaRPr>
-          </a:p>
-          <a:p>
-            <a:pPr marL="171450" marR="0" lvl="0" indent="-171450" algn="l" defTabSz="914400" rtl="0" eaLnBrk="1" fontAlgn="auto" latinLnBrk="0" hangingPunct="1">
-              <a:lnSpc>
-                <a:spcPct val="100000"/>
-              </a:lnSpc>
-              <a:spcBef>
-                <a:spcPts val="0"/>
-              </a:spcBef>
-              <a:spcAft>
-                <a:spcPts val="0"/>
-              </a:spcAft>
-              <a:buClrTx/>
-              <a:buSzTx/>
-              <a:buFontTx/>
-              <a:buChar char="-"/>
-              <a:tabLst/>
-              <a:defRPr/>
-            </a:pPr>
-            <a:r>
-              <a:rPr lang="en-US" dirty="0">
-                <a:hlinkClick r:id="rId3"/>
-              </a:rPr>
-              <a:t>https://dev.to/maxart2501/css-for-an-encapsulated-web-7fo</a:t>
-            </a:r>
-            <a:endParaRPr lang="en-US" dirty="0"/>
-          </a:p>
-          <a:p>
-            <a:pPr marL="171450" marR="0" lvl="0" indent="-171450" algn="l" defTabSz="914400" rtl="0" eaLnBrk="1" fontAlgn="auto" latinLnBrk="0" hangingPunct="1">
-              <a:lnSpc>
-                <a:spcPct val="100000"/>
-              </a:lnSpc>
-              <a:spcBef>
-                <a:spcPts val="0"/>
-              </a:spcBef>
-              <a:spcAft>
-                <a:spcPts val="0"/>
-              </a:spcAft>
-              <a:buClrTx/>
-              <a:buSzTx/>
-              <a:buFontTx/>
-              <a:buChar char="-"/>
-              <a:tabLst/>
-              <a:defRPr/>
-            </a:pPr>
-            <a:r>
-              <a:rPr lang="en-US" dirty="0">
-                <a:hlinkClick r:id="rId4"/>
-              </a:rPr>
-              <a:t>https://medium.com/@hammadtariq65/style-encapsulation-in-reactjs-ba4e3212a9f</a:t>
-            </a:r>
-            <a:endParaRPr lang="en-US" dirty="0"/>
-          </a:p>
-          <a:p>
-            <a:pPr marL="171450" marR="0" lvl="0" indent="-171450" algn="l" defTabSz="914400" rtl="0" eaLnBrk="1" fontAlgn="auto" latinLnBrk="0" hangingPunct="1">
-              <a:lnSpc>
-                <a:spcPct val="100000"/>
-              </a:lnSpc>
-              <a:spcBef>
-                <a:spcPts val="0"/>
-              </a:spcBef>
-              <a:spcAft>
-                <a:spcPts val="0"/>
-              </a:spcAft>
-              <a:buClrTx/>
-              <a:buSzTx/>
-              <a:buFontTx/>
-              <a:buChar char="-"/>
-              <a:tabLst/>
-              <a:defRPr/>
-            </a:pPr>
-            <a:r>
-              <a:rPr lang="en-US" dirty="0">
-                <a:hlinkClick r:id="rId5"/>
-              </a:rPr>
-              <a:t>https://developers.google.com/web/fundamentals/web-components/shadowdom</a:t>
-            </a:r>
-            <a:endParaRPr lang="en-US" dirty="0"/>
-          </a:p>
-          <a:p>
-            <a:pPr marL="171450" marR="0" lvl="0" indent="-171450" algn="l" defTabSz="914400" rtl="0" eaLnBrk="1" fontAlgn="auto" latinLnBrk="0" hangingPunct="1">
-              <a:lnSpc>
-                <a:spcPct val="100000"/>
-              </a:lnSpc>
-              <a:spcBef>
-                <a:spcPts val="0"/>
-              </a:spcBef>
-              <a:spcAft>
-                <a:spcPts val="0"/>
-              </a:spcAft>
-              <a:buClrTx/>
-              <a:buSzTx/>
-              <a:buFontTx/>
-              <a:buChar char="-"/>
-              <a:tabLst/>
-              <a:defRPr/>
-            </a:pPr>
-            <a:r>
-              <a:rPr lang="en-US" dirty="0">
-                <a:hlinkClick r:id="rId6"/>
-              </a:rPr>
-              <a:t>https://blog.logrocket.com/understanding-shadow-dom-v1-fa9b81ebe3ac/</a:t>
-            </a:r>
-            <a:endParaRPr lang="en-US" sz="1200" kern="1200" dirty="0">
-              <a:solidFill>
-                <a:schemeClr val="tx1"/>
-              </a:solidFill>
-              <a:effectLst/>
-              <a:latin typeface="+mn-lt"/>
-              <a:ea typeface="+mn-ea"/>
-              <a:cs typeface="+mn-cs"/>
-            </a:endParaRPr>
-          </a:p>
         </p:txBody>
       </p:sp>
       <p:sp>
@@ -4082,7 +4661,7 @@
     </p:spTree>
     <p:extLst>
       <p:ext uri="{BB962C8B-B14F-4D97-AF65-F5344CB8AC3E}">
-        <p14:creationId xmlns:p14="http://schemas.microsoft.com/office/powerpoint/2010/main" val="2012891520"/>
+        <p14:creationId xmlns:p14="http://schemas.microsoft.com/office/powerpoint/2010/main" val="1181794488"/>
       </p:ext>
     </p:extLst>
   </p:cSld>
@@ -4159,7 +4738,66 @@
                   <a:schemeClr val="bg1"/>
                 </a:solidFill>
               </a:rPr>
-              <a:t>Refactor layout to components</a:t>
+              <a:t>Change empty card to real card with data and UI</a:t>
+            </a:r>
+          </a:p>
+          <a:p>
+            <a:pPr marL="0" marR="0" lvl="0" indent="0" algn="l" defTabSz="914400" rtl="0" eaLnBrk="1" fontAlgn="auto" latinLnBrk="0" hangingPunct="1">
+              <a:lnSpc>
+                <a:spcPct val="100000"/>
+              </a:lnSpc>
+              <a:spcBef>
+                <a:spcPts val="0"/>
+              </a:spcBef>
+              <a:spcAft>
+                <a:spcPts val="0"/>
+              </a:spcAft>
+              <a:buClrTx/>
+              <a:buSzTx/>
+              <a:buFontTx/>
+              <a:buNone/>
+              <a:tabLst/>
+              <a:defRPr/>
+            </a:pPr>
+            <a:endParaRPr lang="en-US" sz="1200" kern="1200" dirty="0">
+              <a:solidFill>
+                <a:schemeClr val="bg1"/>
+              </a:solidFill>
+              <a:effectLst/>
+              <a:latin typeface="+mn-lt"/>
+              <a:ea typeface="+mn-ea"/>
+              <a:cs typeface="+mn-cs"/>
+            </a:endParaRPr>
+          </a:p>
+          <a:p>
+            <a:pPr marL="0" marR="0" lvl="0" indent="0" algn="l" defTabSz="914400" rtl="0" eaLnBrk="1" fontAlgn="auto" latinLnBrk="0" hangingPunct="1">
+              <a:lnSpc>
+                <a:spcPct val="100000"/>
+              </a:lnSpc>
+              <a:spcBef>
+                <a:spcPts val="0"/>
+              </a:spcBef>
+              <a:spcAft>
+                <a:spcPts val="0"/>
+              </a:spcAft>
+              <a:buClrTx/>
+              <a:buSzTx/>
+              <a:buFontTx/>
+              <a:buNone/>
+              <a:tabLst/>
+              <a:defRPr/>
+            </a:pPr>
+            <a:r>
+              <a:rPr lang="en-US" sz="1200" kern="1200">
+                <a:solidFill>
+                  <a:schemeClr val="bg1"/>
+                </a:solidFill>
+                <a:effectLst/>
+                <a:latin typeface="+mn-lt"/>
+                <a:ea typeface="+mn-ea"/>
+                <a:cs typeface="+mn-cs"/>
+              </a:rPr>
+              <a:t>After that connect the hooks for click events</a:t>
             </a:r>
             <a:endParaRPr lang="en-US" sz="1200" kern="1200" dirty="0">
               <a:solidFill>
@@ -4199,7 +4837,7 @@
     </p:spTree>
     <p:extLst>
       <p:ext uri="{BB962C8B-B14F-4D97-AF65-F5344CB8AC3E}">
-        <p14:creationId xmlns:p14="http://schemas.microsoft.com/office/powerpoint/2010/main" val="1181794488"/>
+        <p14:creationId xmlns:p14="http://schemas.microsoft.com/office/powerpoint/2010/main" val="705909408"/>
       </p:ext>
     </p:extLst>
   </p:cSld>
@@ -7167,136 +7805,6 @@
 </p:sld>
 </file>
 
-<file path=ppt/slides/slide10.xml><?xml version="1.0" encoding="utf-8"?>
-<p:sld xmlns:a="http://schemas.openxmlformats.org/drawingml/2006/main" xmlns:r="http://schemas.openxmlformats.org/officeDocument/2006/relationships" xmlns:p="http://schemas.openxmlformats.org/presentationml/2006/main">
-  <p:cSld>
-    <p:spTree>
-      <p:nvGrpSpPr>
-        <p:cNvPr id="1" name=""/>
-        <p:cNvGrpSpPr/>
-        <p:nvPr/>
-      </p:nvGrpSpPr>
-      <p:grpSpPr>
-        <a:xfrm>
-          <a:off x="0" y="0"/>
-          <a:ext cx="0" cy="0"/>
-          <a:chOff x="0" y="0"/>
-          <a:chExt cx="0" cy="0"/>
-        </a:xfrm>
-      </p:grpSpPr>
-      <p:sp>
-        <p:nvSpPr>
-          <p:cNvPr id="6" name="Rectangle 5"/>
-          <p:cNvSpPr/>
-          <p:nvPr/>
-        </p:nvSpPr>
-        <p:spPr>
-          <a:xfrm>
-            <a:off x="-215115" y="0"/>
-            <a:ext cx="12407115" cy="6858000"/>
-          </a:xfrm>
-          <a:prstGeom prst="rect">
-            <a:avLst/>
-          </a:prstGeom>
-          <a:solidFill>
-            <a:schemeClr val="accent6"/>
-          </a:solidFill>
-          <a:ln>
-            <a:noFill/>
-          </a:ln>
-        </p:spPr>
-        <p:style>
-          <a:lnRef idx="1">
-            <a:schemeClr val="accent1"/>
-          </a:lnRef>
-          <a:fillRef idx="3">
-            <a:schemeClr val="accent1"/>
-          </a:fillRef>
-          <a:effectRef idx="2">
-            <a:schemeClr val="accent1"/>
-          </a:effectRef>
-          <a:fontRef idx="minor">
-            <a:schemeClr val="lt1"/>
-          </a:fontRef>
-        </p:style>
-        <p:txBody>
-          <a:bodyPr rtlCol="0" anchor="ctr"/>
-          <a:lstStyle/>
-          <a:p>
-            <a:pPr algn="ctr"/>
-            <a:endParaRPr lang="en-US" sz="2400"/>
-          </a:p>
-        </p:txBody>
-      </p:sp>
-      <p:sp>
-        <p:nvSpPr>
-          <p:cNvPr id="24" name="Title 1"/>
-          <p:cNvSpPr>
-            <a:spLocks noGrp="1"/>
-          </p:cNvSpPr>
-          <p:nvPr>
-            <p:ph type="title"/>
-          </p:nvPr>
-        </p:nvSpPr>
-        <p:spPr>
-          <a:xfrm>
-            <a:off x="502042" y="1936377"/>
-            <a:ext cx="10972800" cy="2985246"/>
-          </a:xfrm>
-        </p:spPr>
-        <p:txBody>
-          <a:bodyPr>
-            <a:noAutofit/>
-          </a:bodyPr>
-          <a:lstStyle/>
-          <a:p>
-            <a:pPr algn="ctr" rtl="0" eaLnBrk="0" fontAlgn="base" hangingPunct="0">
-              <a:spcAft>
-                <a:spcPct val="0"/>
-              </a:spcAft>
-            </a:pPr>
-            <a:r>
-              <a:rPr lang="en-US" sz="6000" dirty="0">
-                <a:solidFill>
-                  <a:schemeClr val="bg1"/>
-                </a:solidFill>
-              </a:rPr>
-              <a:t>Hands-on populate card data</a:t>
-            </a:r>
-            <a:endParaRPr lang="en-US" altLang="en-US" sz="6000" b="1" dirty="0">
-              <a:solidFill>
-                <a:schemeClr val="bg1"/>
-              </a:solidFill>
-              <a:latin typeface="Calibri (Body)"/>
-            </a:endParaRPr>
-          </a:p>
-        </p:txBody>
-      </p:sp>
-    </p:spTree>
-    <p:extLst>
-      <p:ext uri="{BB962C8B-B14F-4D97-AF65-F5344CB8AC3E}">
-        <p14:creationId xmlns:p14="http://schemas.microsoft.com/office/powerpoint/2010/main" val="1965231410"/>
-      </p:ext>
-    </p:extLst>
-  </p:cSld>
-  <p:clrMapOvr>
-    <a:masterClrMapping/>
-  </p:clrMapOvr>
-  <mc:AlternateContent xmlns:mc="http://schemas.openxmlformats.org/markup-compatibility/2006" xmlns:p14="http://schemas.microsoft.com/office/powerpoint/2010/main">
-    <mc:Choice Requires="p14">
-      <p:transition spd="med" p14:dur="700">
-        <p:fade/>
-      </p:transition>
-    </mc:Choice>
-    <mc:Fallback xmlns="">
-      <p:transition xmlns:p14="http://schemas.microsoft.com/office/powerpoint/2010/main" spd="med">
-        <p:fade/>
-      </p:transition>
-    </mc:Fallback>
-  </mc:AlternateContent>
-</p:sld>
-</file>
-
 <file path=ppt/slides/slide2.xml><?xml version="1.0" encoding="utf-8"?>
 <p:sld xmlns:a="http://schemas.openxmlformats.org/drawingml/2006/main" xmlns:r="http://schemas.openxmlformats.org/officeDocument/2006/relationships" xmlns:p="http://schemas.openxmlformats.org/presentationml/2006/main">
   <p:cSld>
@@ -7857,7 +8365,9 @@
             <a:avLst/>
           </a:prstGeom>
           <a:solidFill>
-            <a:schemeClr val="accent2"/>
+            <a:schemeClr val="accent1">
+              <a:lumMod val="75000"/>
+            </a:schemeClr>
           </a:solidFill>
           <a:ln>
             <a:noFill/>
@@ -7919,7 +8429,7 @@
                   <a:schemeClr val="bg1"/>
                 </a:solidFill>
               </a:rPr>
-              <a:t>Single Source of Truth</a:t>
+              <a:t>State Management</a:t>
             </a:r>
             <a:endParaRPr lang="en-US" altLang="en-US" sz="6000" b="1" dirty="0">
               <a:solidFill>
@@ -7933,7 +8443,7 @@
     </p:spTree>
     <p:extLst>
       <p:ext uri="{BB962C8B-B14F-4D97-AF65-F5344CB8AC3E}">
-        <p14:creationId xmlns:p14="http://schemas.microsoft.com/office/powerpoint/2010/main" val="43336469"/>
+        <p14:creationId xmlns:p14="http://schemas.microsoft.com/office/powerpoint/2010/main" val="1725664935"/>
       </p:ext>
     </p:extLst>
   </p:cSld>
@@ -7987,7 +8497,9 @@
             <a:avLst/>
           </a:prstGeom>
           <a:solidFill>
-            <a:schemeClr val="accent2"/>
+            <a:schemeClr val="accent1">
+              <a:lumMod val="75000"/>
+            </a:schemeClr>
           </a:solidFill>
           <a:ln>
             <a:noFill/>
@@ -8049,7 +8561,7 @@
                   <a:schemeClr val="bg1"/>
                 </a:solidFill>
               </a:rPr>
-              <a:t>State Management</a:t>
+              <a:t>CSS Encapsulation</a:t>
             </a:r>
             <a:endParaRPr lang="en-US" altLang="en-US" sz="6000" b="1" dirty="0">
               <a:solidFill>
@@ -8063,7 +8575,7 @@
     </p:spTree>
     <p:extLst>
       <p:ext uri="{BB962C8B-B14F-4D97-AF65-F5344CB8AC3E}">
-        <p14:creationId xmlns:p14="http://schemas.microsoft.com/office/powerpoint/2010/main" val="1725664935"/>
+        <p14:creationId xmlns:p14="http://schemas.microsoft.com/office/powerpoint/2010/main" val="3716987637"/>
       </p:ext>
     </p:extLst>
   </p:cSld>
@@ -8117,9 +8629,7 @@
             <a:avLst/>
           </a:prstGeom>
           <a:solidFill>
-            <a:schemeClr val="accent1">
-              <a:lumMod val="75000"/>
-            </a:schemeClr>
+            <a:schemeClr val="accent6"/>
           </a:solidFill>
           <a:ln>
             <a:noFill/>
@@ -8181,7 +8691,7 @@
                   <a:schemeClr val="bg1"/>
                 </a:solidFill>
               </a:rPr>
-              <a:t>CSS Encapsulation</a:t>
+              <a:t>Hands-on Refactor layout</a:t>
             </a:r>
             <a:endParaRPr lang="en-US" altLang="en-US" sz="6000" b="1" dirty="0">
               <a:solidFill>
@@ -8195,7 +8705,7 @@
     </p:spTree>
     <p:extLst>
       <p:ext uri="{BB962C8B-B14F-4D97-AF65-F5344CB8AC3E}">
-        <p14:creationId xmlns:p14="http://schemas.microsoft.com/office/powerpoint/2010/main" val="3716987637"/>
+        <p14:creationId xmlns:p14="http://schemas.microsoft.com/office/powerpoint/2010/main" val="1389066535"/>
       </p:ext>
     </p:extLst>
   </p:cSld>
@@ -8311,7 +8821,7 @@
                   <a:schemeClr val="bg1"/>
                 </a:solidFill>
               </a:rPr>
-              <a:t>Hands-on Refactor layout</a:t>
+              <a:t>Hands-on populate card data</a:t>
             </a:r>
             <a:endParaRPr lang="en-US" altLang="en-US" sz="6000" b="1" dirty="0">
               <a:solidFill>
@@ -8325,7 +8835,7 @@
     </p:spTree>
     <p:extLst>
       <p:ext uri="{BB962C8B-B14F-4D97-AF65-F5344CB8AC3E}">
-        <p14:creationId xmlns:p14="http://schemas.microsoft.com/office/powerpoint/2010/main" val="1389066535"/>
+        <p14:creationId xmlns:p14="http://schemas.microsoft.com/office/powerpoint/2010/main" val="1965231410"/>
       </p:ext>
     </p:extLst>
   </p:cSld>

</xml_diff>

<commit_message>
Add service worker to presentation
</commit_message>
<xml_diff>
--- a/presentations/chapter-4/Practical Web Dev.pptx
+++ b/presentations/chapter-4/Practical Web Dev.pptx
@@ -5,7 +5,7 @@
     <p:sldMasterId id="2147483648" r:id="rId1"/>
   </p:sldMasterIdLst>
   <p:notesMasterIdLst>
-    <p:notesMasterId r:id="rId11"/>
+    <p:notesMasterId r:id="rId12"/>
   </p:notesMasterIdLst>
   <p:sldIdLst>
     <p:sldId id="408" r:id="rId2"/>
@@ -14,9 +14,10 @@
     <p:sldId id="411" r:id="rId5"/>
     <p:sldId id="412" r:id="rId6"/>
     <p:sldId id="413" r:id="rId7"/>
-    <p:sldId id="414" r:id="rId8"/>
-    <p:sldId id="416" r:id="rId9"/>
-    <p:sldId id="417" r:id="rId10"/>
+    <p:sldId id="418" r:id="rId8"/>
+    <p:sldId id="414" r:id="rId9"/>
+    <p:sldId id="416" r:id="rId10"/>
+    <p:sldId id="417" r:id="rId11"/>
   </p:sldIdLst>
   <p:sldSz cx="12192000" cy="6858000"/>
   <p:notesSz cx="6858000" cy="9144000"/>
@@ -129,6 +130,7 @@
             <p14:sldId id="411"/>
             <p14:sldId id="412"/>
             <p14:sldId id="413"/>
+            <p14:sldId id="418"/>
             <p14:sldId id="414"/>
             <p14:sldId id="416"/>
             <p14:sldId id="417"/>
@@ -236,7 +238,7 @@
           <a:p>
             <a:fld id="{B53C1D94-E0DD-4250-8C1B-3D8C3DA9B2B6}" type="datetimeFigureOut">
               <a:rPr lang="he-IL" smtClean="0"/>
-              <a:t>כ"א/תמוז/תשע"ט</a:t>
+              <a:t>כ"ב/תמוז/תשע"ט</a:t>
             </a:fld>
             <a:endParaRPr lang="he-IL"/>
           </a:p>
@@ -604,6 +606,182 @@
 </p:notes>
 </file>
 
+<file path=ppt/notesSlides/notesSlide10.xml><?xml version="1.0" encoding="utf-8"?>
+<p:notes xmlns:a="http://schemas.openxmlformats.org/drawingml/2006/main" xmlns:r="http://schemas.openxmlformats.org/officeDocument/2006/relationships" xmlns:p="http://schemas.openxmlformats.org/presentationml/2006/main">
+  <p:cSld>
+    <p:spTree>
+      <p:nvGrpSpPr>
+        <p:cNvPr id="1" name=""/>
+        <p:cNvGrpSpPr/>
+        <p:nvPr/>
+      </p:nvGrpSpPr>
+      <p:grpSpPr>
+        <a:xfrm>
+          <a:off x="0" y="0"/>
+          <a:ext cx="0" cy="0"/>
+          <a:chOff x="0" y="0"/>
+          <a:chExt cx="0" cy="0"/>
+        </a:xfrm>
+      </p:grpSpPr>
+      <p:sp>
+        <p:nvSpPr>
+          <p:cNvPr id="2" name="Slide Image Placeholder 1"/>
+          <p:cNvSpPr>
+            <a:spLocks noGrp="1" noRot="1" noChangeAspect="1"/>
+          </p:cNvSpPr>
+          <p:nvPr>
+            <p:ph type="sldImg"/>
+          </p:nvPr>
+        </p:nvSpPr>
+        <p:spPr/>
+      </p:sp>
+      <p:sp>
+        <p:nvSpPr>
+          <p:cNvPr id="3" name="Notes Placeholder 2"/>
+          <p:cNvSpPr>
+            <a:spLocks noGrp="1"/>
+          </p:cNvSpPr>
+          <p:nvPr>
+            <p:ph type="body" idx="1"/>
+          </p:nvPr>
+        </p:nvSpPr>
+        <p:spPr/>
+        <p:txBody>
+          <a:bodyPr/>
+          <a:lstStyle/>
+          <a:p>
+            <a:pPr marL="0" marR="0" lvl="0" indent="0" algn="l" defTabSz="914400" rtl="0" eaLnBrk="1" fontAlgn="auto" latinLnBrk="0" hangingPunct="1">
+              <a:lnSpc>
+                <a:spcPct val="100000"/>
+              </a:lnSpc>
+              <a:spcBef>
+                <a:spcPts val="0"/>
+              </a:spcBef>
+              <a:spcAft>
+                <a:spcPts val="0"/>
+              </a:spcAft>
+              <a:buClrTx/>
+              <a:buSzTx/>
+              <a:buFontTx/>
+              <a:buNone/>
+              <a:tabLst/>
+              <a:defRPr/>
+            </a:pPr>
+            <a:r>
+              <a:rPr lang="en-US" sz="1200" dirty="0">
+                <a:solidFill>
+                  <a:schemeClr val="bg1"/>
+                </a:solidFill>
+              </a:rPr>
+              <a:t>Change empty card to real card with data and UI</a:t>
+            </a:r>
+          </a:p>
+          <a:p>
+            <a:pPr marL="0" marR="0" lvl="0" indent="0" algn="l" defTabSz="914400" rtl="0" eaLnBrk="1" fontAlgn="auto" latinLnBrk="0" hangingPunct="1">
+              <a:lnSpc>
+                <a:spcPct val="100000"/>
+              </a:lnSpc>
+              <a:spcBef>
+                <a:spcPts val="0"/>
+              </a:spcBef>
+              <a:spcAft>
+                <a:spcPts val="0"/>
+              </a:spcAft>
+              <a:buClrTx/>
+              <a:buSzTx/>
+              <a:buFontTx/>
+              <a:buNone/>
+              <a:tabLst/>
+              <a:defRPr/>
+            </a:pPr>
+            <a:endParaRPr lang="en-US" sz="1200" kern="1200" dirty="0">
+              <a:solidFill>
+                <a:schemeClr val="bg1"/>
+              </a:solidFill>
+              <a:effectLst/>
+              <a:latin typeface="+mn-lt"/>
+              <a:ea typeface="+mn-ea"/>
+              <a:cs typeface="+mn-cs"/>
+            </a:endParaRPr>
+          </a:p>
+          <a:p>
+            <a:pPr marL="0" marR="0" lvl="0" indent="0" algn="l" defTabSz="914400" rtl="0" eaLnBrk="1" fontAlgn="auto" latinLnBrk="0" hangingPunct="1">
+              <a:lnSpc>
+                <a:spcPct val="100000"/>
+              </a:lnSpc>
+              <a:spcBef>
+                <a:spcPts val="0"/>
+              </a:spcBef>
+              <a:spcAft>
+                <a:spcPts val="0"/>
+              </a:spcAft>
+              <a:buClrTx/>
+              <a:buSzTx/>
+              <a:buFontTx/>
+              <a:buNone/>
+              <a:tabLst/>
+              <a:defRPr/>
+            </a:pPr>
+            <a:r>
+              <a:rPr lang="en-US" sz="1200" kern="1200">
+                <a:solidFill>
+                  <a:schemeClr val="bg1"/>
+                </a:solidFill>
+                <a:effectLst/>
+                <a:latin typeface="+mn-lt"/>
+                <a:ea typeface="+mn-ea"/>
+                <a:cs typeface="+mn-cs"/>
+              </a:rPr>
+              <a:t>After that connect the hooks for click events</a:t>
+            </a:r>
+            <a:endParaRPr lang="en-US" sz="1200" kern="1200" dirty="0">
+              <a:solidFill>
+                <a:schemeClr val="tx1"/>
+              </a:solidFill>
+              <a:effectLst/>
+              <a:latin typeface="+mn-lt"/>
+              <a:ea typeface="+mn-ea"/>
+              <a:cs typeface="+mn-cs"/>
+            </a:endParaRPr>
+          </a:p>
+        </p:txBody>
+      </p:sp>
+      <p:sp>
+        <p:nvSpPr>
+          <p:cNvPr id="4" name="Slide Number Placeholder 3"/>
+          <p:cNvSpPr>
+            <a:spLocks noGrp="1"/>
+          </p:cNvSpPr>
+          <p:nvPr>
+            <p:ph type="sldNum" sz="quarter" idx="10"/>
+          </p:nvPr>
+        </p:nvSpPr>
+        <p:spPr/>
+        <p:txBody>
+          <a:bodyPr/>
+          <a:lstStyle/>
+          <a:p>
+            <a:fld id="{595D0871-5AD0-4670-BDA8-FBE649F625DD}" type="slidenum">
+              <a:rPr lang="he-IL" smtClean="0"/>
+              <a:t>10</a:t>
+            </a:fld>
+            <a:endParaRPr lang="he-IL"/>
+          </a:p>
+        </p:txBody>
+      </p:sp>
+    </p:spTree>
+    <p:extLst>
+      <p:ext uri="{BB962C8B-B14F-4D97-AF65-F5344CB8AC3E}">
+        <p14:creationId xmlns:p14="http://schemas.microsoft.com/office/powerpoint/2010/main" val="705909408"/>
+      </p:ext>
+    </p:extLst>
+  </p:cSld>
+  <p:clrMapOvr>
+    <a:masterClrMapping/>
+  </p:clrMapOvr>
+</p:notes>
+</file>
+
 <file path=ppt/notesSlides/notesSlide2.xml><?xml version="1.0" encoding="utf-8"?>
 <p:notes xmlns:a="http://schemas.openxmlformats.org/drawingml/2006/main" xmlns:r="http://schemas.openxmlformats.org/officeDocument/2006/relationships" xmlns:p="http://schemas.openxmlformats.org/presentationml/2006/main">
   <p:cSld>
@@ -3439,37 +3617,6 @@
               <a:tabLst/>
               <a:defRPr/>
             </a:pPr>
-            <a:r>
-              <a:rPr lang="en-US" sz="1200" kern="1200" dirty="0">
-                <a:solidFill>
-                  <a:schemeClr val="tx1"/>
-                </a:solidFill>
-                <a:effectLst/>
-                <a:latin typeface="+mn-lt"/>
-                <a:ea typeface="+mn-ea"/>
-                <a:cs typeface="+mn-cs"/>
-              </a:rPr>
-              <a:t>What is CSS encapsulation</a:t>
-            </a:r>
-          </a:p>
-          <a:p>
-            <a:pPr marL="0" marR="0" lvl="0" indent="0" algn="l" defTabSz="914400" rtl="0" eaLnBrk="1" fontAlgn="auto" latinLnBrk="0" hangingPunct="1">
-              <a:lnSpc>
-                <a:spcPct val="100000"/>
-              </a:lnSpc>
-              <a:spcBef>
-                <a:spcPts val="0"/>
-              </a:spcBef>
-              <a:spcAft>
-                <a:spcPts val="0"/>
-              </a:spcAft>
-              <a:buClrTx/>
-              <a:buSzTx/>
-              <a:buFontTx/>
-              <a:buNone/>
-              <a:tabLst/>
-              <a:defRPr/>
-            </a:pPr>
             <a:endParaRPr lang="en-US" sz="1200" kern="1200" dirty="0">
               <a:solidFill>
                 <a:schemeClr val="tx1"/>
@@ -3480,1042 +3627,6 @@
               <a:cs typeface="+mn-cs"/>
             </a:endParaRPr>
           </a:p>
-          <a:p>
-            <a:pPr marL="0" marR="0" lvl="0" indent="0" algn="l" defTabSz="914400" rtl="0" eaLnBrk="1" fontAlgn="auto" latinLnBrk="0" hangingPunct="1">
-              <a:lnSpc>
-                <a:spcPct val="100000"/>
-              </a:lnSpc>
-              <a:spcBef>
-                <a:spcPts val="0"/>
-              </a:spcBef>
-              <a:spcAft>
-                <a:spcPts val="0"/>
-              </a:spcAft>
-              <a:buClrTx/>
-              <a:buSzTx/>
-              <a:buFontTx/>
-              <a:buNone/>
-              <a:tabLst/>
-              <a:defRPr/>
-            </a:pPr>
-            <a:r>
-              <a:rPr lang="en-US" sz="1200" kern="1200" dirty="0">
-                <a:solidFill>
-                  <a:schemeClr val="tx1"/>
-                </a:solidFill>
-                <a:effectLst/>
-                <a:latin typeface="+mn-lt"/>
-                <a:ea typeface="+mn-ea"/>
-                <a:cs typeface="+mn-cs"/>
-              </a:rPr>
-              <a:t>In CSS we have the following issues:</a:t>
-            </a:r>
-          </a:p>
-          <a:p>
-            <a:pPr marL="0" marR="0" lvl="0" indent="0" algn="l" defTabSz="914400" rtl="0" eaLnBrk="1" fontAlgn="auto" latinLnBrk="0" hangingPunct="1">
-              <a:lnSpc>
-                <a:spcPct val="100000"/>
-              </a:lnSpc>
-              <a:spcBef>
-                <a:spcPts val="0"/>
-              </a:spcBef>
-              <a:spcAft>
-                <a:spcPts val="0"/>
-              </a:spcAft>
-              <a:buClrTx/>
-              <a:buSzTx/>
-              <a:buFontTx/>
-              <a:buNone/>
-              <a:tabLst/>
-              <a:defRPr/>
-            </a:pPr>
-            <a:r>
-              <a:rPr lang="en-US" sz="1200" kern="1200" dirty="0">
-                <a:solidFill>
-                  <a:schemeClr val="tx1"/>
-                </a:solidFill>
-                <a:effectLst/>
-                <a:latin typeface="+mn-lt"/>
-                <a:ea typeface="+mn-ea"/>
-                <a:cs typeface="+mn-cs"/>
-              </a:rPr>
-              <a:t>CSS is a global scope – when we defined a class it might apply to any element in the DOM, this might cause applying styles to undesired element.</a:t>
-            </a:r>
-          </a:p>
-          <a:p>
-            <a:pPr marL="0" marR="0" lvl="0" indent="0" algn="l" defTabSz="914400" rtl="0" eaLnBrk="1" fontAlgn="auto" latinLnBrk="0" hangingPunct="1">
-              <a:lnSpc>
-                <a:spcPct val="100000"/>
-              </a:lnSpc>
-              <a:spcBef>
-                <a:spcPts val="0"/>
-              </a:spcBef>
-              <a:spcAft>
-                <a:spcPts val="0"/>
-              </a:spcAft>
-              <a:buClrTx/>
-              <a:buSzTx/>
-              <a:buFontTx/>
-              <a:buNone/>
-              <a:tabLst/>
-              <a:defRPr/>
-            </a:pPr>
-            <a:r>
-              <a:rPr lang="en-US" sz="1200" kern="1200" dirty="0">
-                <a:solidFill>
-                  <a:schemeClr val="tx1"/>
-                </a:solidFill>
-                <a:effectLst/>
-                <a:latin typeface="+mn-lt"/>
-                <a:ea typeface="+mn-ea"/>
-                <a:cs typeface="+mn-cs"/>
-              </a:rPr>
-              <a:t>Specificity War, Inheritance issues – CSS become so complex so we need to start calculating style specificity level  (id is 100, class is 10, tag is 1 etc.) to override existing/inherit style</a:t>
-            </a:r>
-          </a:p>
-          <a:p>
-            <a:pPr marL="0" marR="0" lvl="0" indent="0" algn="l" defTabSz="914400" rtl="0" eaLnBrk="1" fontAlgn="auto" latinLnBrk="0" hangingPunct="1">
-              <a:lnSpc>
-                <a:spcPct val="100000"/>
-              </a:lnSpc>
-              <a:spcBef>
-                <a:spcPts val="0"/>
-              </a:spcBef>
-              <a:spcAft>
-                <a:spcPts val="0"/>
-              </a:spcAft>
-              <a:buClrTx/>
-              <a:buSzTx/>
-              <a:buFontTx/>
-              <a:buNone/>
-              <a:tabLst/>
-              <a:defRPr/>
-            </a:pPr>
-            <a:r>
-              <a:rPr lang="en-US" sz="1200" kern="1200" dirty="0">
-                <a:solidFill>
-                  <a:schemeClr val="tx1"/>
-                </a:solidFill>
-                <a:effectLst/>
-                <a:latin typeface="+mn-lt"/>
-                <a:ea typeface="+mn-ea"/>
-                <a:cs typeface="+mn-cs"/>
-              </a:rPr>
-              <a:t>Name clashing – will but same class name like our third party (everyone wants to call button as button class)</a:t>
-            </a:r>
-          </a:p>
-          <a:p>
-            <a:pPr marL="0" marR="0" lvl="0" indent="0" algn="l" defTabSz="914400" rtl="0" eaLnBrk="1" fontAlgn="auto" latinLnBrk="0" hangingPunct="1">
-              <a:lnSpc>
-                <a:spcPct val="100000"/>
-              </a:lnSpc>
-              <a:spcBef>
-                <a:spcPts val="0"/>
-              </a:spcBef>
-              <a:spcAft>
-                <a:spcPts val="0"/>
-              </a:spcAft>
-              <a:buClrTx/>
-              <a:buSzTx/>
-              <a:buFontTx/>
-              <a:buNone/>
-              <a:tabLst/>
-              <a:defRPr/>
-            </a:pPr>
-            <a:endParaRPr lang="en-US" sz="1200" kern="1200" dirty="0">
-              <a:solidFill>
-                <a:schemeClr val="tx1"/>
-              </a:solidFill>
-              <a:effectLst/>
-              <a:latin typeface="+mn-lt"/>
-              <a:ea typeface="+mn-ea"/>
-              <a:cs typeface="+mn-cs"/>
-            </a:endParaRPr>
-          </a:p>
-          <a:p>
-            <a:pPr marL="0" marR="0" lvl="0" indent="0" algn="l" defTabSz="914400" rtl="0" eaLnBrk="1" fontAlgn="auto" latinLnBrk="0" hangingPunct="1">
-              <a:lnSpc>
-                <a:spcPct val="100000"/>
-              </a:lnSpc>
-              <a:spcBef>
-                <a:spcPts val="0"/>
-              </a:spcBef>
-              <a:spcAft>
-                <a:spcPts val="0"/>
-              </a:spcAft>
-              <a:buClrTx/>
-              <a:buSzTx/>
-              <a:buFontTx/>
-              <a:buNone/>
-              <a:tabLst/>
-              <a:defRPr/>
-            </a:pPr>
-            <a:r>
-              <a:rPr lang="en-US" sz="1200" kern="1200" dirty="0">
-                <a:solidFill>
-                  <a:schemeClr val="tx1"/>
-                </a:solidFill>
-                <a:effectLst/>
-                <a:latin typeface="+mn-lt"/>
-                <a:ea typeface="+mn-ea"/>
-                <a:cs typeface="+mn-cs"/>
-              </a:rPr>
-              <a:t>The first solution is to create best practices to our project:</a:t>
-            </a:r>
-          </a:p>
-          <a:p>
-            <a:pPr marL="171450" marR="0" lvl="0" indent="-171450" algn="l" defTabSz="914400" rtl="0" eaLnBrk="1" fontAlgn="auto" latinLnBrk="0" hangingPunct="1">
-              <a:lnSpc>
-                <a:spcPct val="100000"/>
-              </a:lnSpc>
-              <a:spcBef>
-                <a:spcPts val="0"/>
-              </a:spcBef>
-              <a:spcAft>
-                <a:spcPts val="0"/>
-              </a:spcAft>
-              <a:buClrTx/>
-              <a:buSzTx/>
-              <a:buFontTx/>
-              <a:buChar char="-"/>
-              <a:tabLst/>
-              <a:defRPr/>
-            </a:pPr>
-            <a:r>
-              <a:rPr lang="en-US" sz="1200" kern="1200" dirty="0">
-                <a:solidFill>
-                  <a:schemeClr val="tx1"/>
-                </a:solidFill>
-                <a:effectLst/>
-                <a:latin typeface="+mn-lt"/>
-                <a:ea typeface="+mn-ea"/>
-                <a:cs typeface="+mn-cs"/>
-              </a:rPr>
-              <a:t>No more ID's in selectors - solve Specificity War</a:t>
-            </a:r>
-          </a:p>
-          <a:p>
-            <a:pPr marL="171450" marR="0" lvl="0" indent="-171450" algn="l" defTabSz="914400" rtl="0" eaLnBrk="1" fontAlgn="auto" latinLnBrk="0" hangingPunct="1">
-              <a:lnSpc>
-                <a:spcPct val="100000"/>
-              </a:lnSpc>
-              <a:spcBef>
-                <a:spcPts val="0"/>
-              </a:spcBef>
-              <a:spcAft>
-                <a:spcPts val="0"/>
-              </a:spcAft>
-              <a:buClrTx/>
-              <a:buSzTx/>
-              <a:buFontTx/>
-              <a:buChar char="-"/>
-              <a:tabLst/>
-              <a:defRPr/>
-            </a:pPr>
-            <a:r>
-              <a:rPr lang="en-US" sz="1200" kern="1200" dirty="0">
-                <a:solidFill>
-                  <a:schemeClr val="tx1"/>
-                </a:solidFill>
-                <a:effectLst/>
-                <a:latin typeface="+mn-lt"/>
-                <a:ea typeface="+mn-ea"/>
-                <a:cs typeface="+mn-cs"/>
-              </a:rPr>
-              <a:t>No "brute-force" values (as that z-index) – solve override issues</a:t>
-            </a:r>
-          </a:p>
-          <a:p>
-            <a:pPr marL="171450" marR="0" lvl="0" indent="-171450" algn="l" defTabSz="914400" rtl="0" eaLnBrk="1" fontAlgn="auto" latinLnBrk="0" hangingPunct="1">
-              <a:lnSpc>
-                <a:spcPct val="100000"/>
-              </a:lnSpc>
-              <a:spcBef>
-                <a:spcPts val="0"/>
-              </a:spcBef>
-              <a:spcAft>
-                <a:spcPts val="0"/>
-              </a:spcAft>
-              <a:buClrTx/>
-              <a:buSzTx/>
-              <a:buFontTx/>
-              <a:buChar char="-"/>
-              <a:tabLst/>
-              <a:defRPr/>
-            </a:pPr>
-            <a:r>
-              <a:rPr lang="en-US" sz="1200" kern="1200" dirty="0">
-                <a:solidFill>
-                  <a:schemeClr val="tx1"/>
-                </a:solidFill>
-                <a:effectLst/>
-                <a:latin typeface="+mn-lt"/>
-                <a:ea typeface="+mn-ea"/>
-                <a:cs typeface="+mn-cs"/>
-              </a:rPr>
-              <a:t>No more !important or exotic CSS properties – don’t ever use important only for rare cases</a:t>
-            </a:r>
-          </a:p>
-          <a:p>
-            <a:pPr marL="171450" marR="0" lvl="0" indent="-171450" algn="l" defTabSz="914400" rtl="0" eaLnBrk="1" fontAlgn="auto" latinLnBrk="0" hangingPunct="1">
-              <a:lnSpc>
-                <a:spcPct val="100000"/>
-              </a:lnSpc>
-              <a:spcBef>
-                <a:spcPts val="0"/>
-              </a:spcBef>
-              <a:spcAft>
-                <a:spcPts val="0"/>
-              </a:spcAft>
-              <a:buClrTx/>
-              <a:buSzTx/>
-              <a:buFontTx/>
-              <a:buChar char="-"/>
-              <a:tabLst/>
-              <a:defRPr/>
-            </a:pPr>
-            <a:r>
-              <a:rPr lang="en-US" sz="1200" kern="1200" dirty="0">
-                <a:solidFill>
-                  <a:schemeClr val="tx1"/>
-                </a:solidFill>
-                <a:effectLst/>
-                <a:latin typeface="+mn-lt"/>
-                <a:ea typeface="+mn-ea"/>
-                <a:cs typeface="+mn-cs"/>
-              </a:rPr>
-              <a:t>No strict bindings between CSS and the DOM structure – don’t describe the DOM in CSS (selector using html tag), why? Because structure might be changed &amp; less readable when looking at it (class with descripted name will explain us more about this element)</a:t>
-            </a:r>
-          </a:p>
-          <a:p>
-            <a:pPr marL="171450" marR="0" lvl="0" indent="-171450" algn="l" defTabSz="914400" rtl="0" eaLnBrk="1" fontAlgn="auto" latinLnBrk="0" hangingPunct="1">
-              <a:lnSpc>
-                <a:spcPct val="100000"/>
-              </a:lnSpc>
-              <a:spcBef>
-                <a:spcPts val="0"/>
-              </a:spcBef>
-              <a:spcAft>
-                <a:spcPts val="0"/>
-              </a:spcAft>
-              <a:buClrTx/>
-              <a:buSzTx/>
-              <a:buFontTx/>
-              <a:buChar char="-"/>
-              <a:tabLst/>
-              <a:defRPr/>
-            </a:pPr>
-            <a:r>
-              <a:rPr lang="en-US" sz="1200" kern="1200" dirty="0">
-                <a:solidFill>
-                  <a:schemeClr val="tx1"/>
-                </a:solidFill>
-                <a:effectLst/>
-                <a:latin typeface="+mn-lt"/>
-                <a:ea typeface="+mn-ea"/>
-                <a:cs typeface="+mn-cs"/>
-              </a:rPr>
-              <a:t>Keep the </a:t>
-            </a:r>
-            <a:r>
-              <a:rPr lang="en-US" sz="1200" kern="1200" dirty="0" err="1">
-                <a:solidFill>
-                  <a:schemeClr val="tx1"/>
-                </a:solidFill>
-                <a:effectLst/>
-                <a:latin typeface="+mn-lt"/>
-                <a:ea typeface="+mn-ea"/>
-                <a:cs typeface="+mn-cs"/>
-              </a:rPr>
-              <a:t>specifity</a:t>
-            </a:r>
-            <a:r>
-              <a:rPr lang="en-US" sz="1200" kern="1200" dirty="0">
-                <a:solidFill>
-                  <a:schemeClr val="tx1"/>
-                </a:solidFill>
-                <a:effectLst/>
-                <a:latin typeface="+mn-lt"/>
-                <a:ea typeface="+mn-ea"/>
-                <a:cs typeface="+mn-cs"/>
-              </a:rPr>
-              <a:t> as low as possible, ideally 0.1.0 – to prevent overrides issues</a:t>
-            </a:r>
-          </a:p>
-          <a:p>
-            <a:pPr marL="171450" marR="0" lvl="0" indent="-171450" algn="l" defTabSz="914400" rtl="0" eaLnBrk="1" fontAlgn="auto" latinLnBrk="0" hangingPunct="1">
-              <a:lnSpc>
-                <a:spcPct val="100000"/>
-              </a:lnSpc>
-              <a:spcBef>
-                <a:spcPts val="0"/>
-              </a:spcBef>
-              <a:spcAft>
-                <a:spcPts val="0"/>
-              </a:spcAft>
-              <a:buClrTx/>
-              <a:buSzTx/>
-              <a:buFontTx/>
-              <a:buChar char="-"/>
-              <a:tabLst/>
-              <a:defRPr/>
-            </a:pPr>
-            <a:r>
-              <a:rPr lang="en-US" sz="1200" kern="1200" dirty="0">
-                <a:solidFill>
-                  <a:schemeClr val="tx1"/>
-                </a:solidFill>
-                <a:effectLst/>
-                <a:latin typeface="+mn-lt"/>
-                <a:ea typeface="+mn-ea"/>
-                <a:cs typeface="+mn-cs"/>
-              </a:rPr>
-              <a:t>Use namespaces for your classes. – like project prefix to solve side effect</a:t>
-            </a:r>
-          </a:p>
-          <a:p>
-            <a:pPr marL="0" marR="0" lvl="0" indent="0" algn="l" defTabSz="914400" rtl="0" eaLnBrk="1" fontAlgn="auto" latinLnBrk="0" hangingPunct="1">
-              <a:lnSpc>
-                <a:spcPct val="100000"/>
-              </a:lnSpc>
-              <a:spcBef>
-                <a:spcPts val="0"/>
-              </a:spcBef>
-              <a:spcAft>
-                <a:spcPts val="0"/>
-              </a:spcAft>
-              <a:buClrTx/>
-              <a:buSzTx/>
-              <a:buFontTx/>
-              <a:buNone/>
-              <a:tabLst/>
-              <a:defRPr/>
-            </a:pPr>
-            <a:endParaRPr lang="en-US" sz="1200" kern="1200" dirty="0">
-              <a:solidFill>
-                <a:schemeClr val="tx1"/>
-              </a:solidFill>
-              <a:effectLst/>
-              <a:latin typeface="+mn-lt"/>
-              <a:ea typeface="+mn-ea"/>
-              <a:cs typeface="+mn-cs"/>
-            </a:endParaRPr>
-          </a:p>
-          <a:p>
-            <a:pPr marL="0" marR="0" lvl="0" indent="0" algn="l" defTabSz="914400" rtl="0" eaLnBrk="1" fontAlgn="auto" latinLnBrk="0" hangingPunct="1">
-              <a:lnSpc>
-                <a:spcPct val="100000"/>
-              </a:lnSpc>
-              <a:spcBef>
-                <a:spcPts val="0"/>
-              </a:spcBef>
-              <a:spcAft>
-                <a:spcPts val="0"/>
-              </a:spcAft>
-              <a:buClrTx/>
-              <a:buSzTx/>
-              <a:buFontTx/>
-              <a:buNone/>
-              <a:tabLst/>
-              <a:defRPr/>
-            </a:pPr>
-            <a:r>
-              <a:rPr lang="en-US" sz="1200" kern="1200" dirty="0">
-                <a:solidFill>
-                  <a:schemeClr val="tx1"/>
-                </a:solidFill>
-                <a:effectLst/>
-                <a:latin typeface="+mn-lt"/>
-                <a:ea typeface="+mn-ea"/>
-                <a:cs typeface="+mn-cs"/>
-              </a:rPr>
-              <a:t>To solve this issue, The idea is to create a private scope for styles so all styles create in a component will apply only to this component and will not affect outside elements.</a:t>
-            </a:r>
-          </a:p>
-          <a:p>
-            <a:pPr marL="0" marR="0" lvl="0" indent="0" algn="l" defTabSz="914400" rtl="0" eaLnBrk="1" fontAlgn="auto" latinLnBrk="0" hangingPunct="1">
-              <a:lnSpc>
-                <a:spcPct val="100000"/>
-              </a:lnSpc>
-              <a:spcBef>
-                <a:spcPts val="0"/>
-              </a:spcBef>
-              <a:spcAft>
-                <a:spcPts val="0"/>
-              </a:spcAft>
-              <a:buClrTx/>
-              <a:buSzTx/>
-              <a:buFontTx/>
-              <a:buNone/>
-              <a:tabLst/>
-              <a:defRPr/>
-            </a:pPr>
-            <a:r>
-              <a:rPr lang="en-US" sz="1200" kern="1200" dirty="0">
-                <a:solidFill>
-                  <a:schemeClr val="tx1"/>
-                </a:solidFill>
-                <a:effectLst/>
-                <a:latin typeface="+mn-lt"/>
-                <a:ea typeface="+mn-ea"/>
-                <a:cs typeface="+mn-cs"/>
-              </a:rPr>
-              <a:t>This strategy will solve us a lot if side effect like one style effecting other element.</a:t>
-            </a:r>
-          </a:p>
-          <a:p>
-            <a:pPr marL="0" marR="0" lvl="0" indent="0" algn="l" defTabSz="914400" rtl="0" eaLnBrk="1" fontAlgn="auto" latinLnBrk="0" hangingPunct="1">
-              <a:lnSpc>
-                <a:spcPct val="100000"/>
-              </a:lnSpc>
-              <a:spcBef>
-                <a:spcPts val="0"/>
-              </a:spcBef>
-              <a:spcAft>
-                <a:spcPts val="0"/>
-              </a:spcAft>
-              <a:buClrTx/>
-              <a:buSzTx/>
-              <a:buFontTx/>
-              <a:buNone/>
-              <a:tabLst/>
-              <a:defRPr/>
-            </a:pPr>
-            <a:endParaRPr lang="en-US" sz="1200" kern="1200" dirty="0">
-              <a:solidFill>
-                <a:schemeClr val="tx1"/>
-              </a:solidFill>
-              <a:effectLst/>
-              <a:latin typeface="+mn-lt"/>
-              <a:ea typeface="+mn-ea"/>
-              <a:cs typeface="+mn-cs"/>
-            </a:endParaRPr>
-          </a:p>
-          <a:p>
-            <a:pPr marL="0" marR="0" lvl="0" indent="0" algn="l" defTabSz="914400" rtl="0" eaLnBrk="1" fontAlgn="auto" latinLnBrk="0" hangingPunct="1">
-              <a:lnSpc>
-                <a:spcPct val="100000"/>
-              </a:lnSpc>
-              <a:spcBef>
-                <a:spcPts val="0"/>
-              </a:spcBef>
-              <a:spcAft>
-                <a:spcPts val="0"/>
-              </a:spcAft>
-              <a:buClrTx/>
-              <a:buSzTx/>
-              <a:buFontTx/>
-              <a:buNone/>
-              <a:tabLst/>
-              <a:defRPr/>
-            </a:pPr>
-            <a:r>
-              <a:rPr lang="en-US" sz="1200" kern="1200" dirty="0">
-                <a:solidFill>
-                  <a:schemeClr val="tx1"/>
-                </a:solidFill>
-                <a:effectLst/>
-                <a:latin typeface="+mn-lt"/>
-                <a:ea typeface="+mn-ea"/>
-                <a:cs typeface="+mn-cs"/>
-              </a:rPr>
-              <a:t>Let see an example using it (by creating the scope by yourself):</a:t>
-            </a:r>
-          </a:p>
-          <a:p>
-            <a:pPr marL="0" marR="0" lvl="0" indent="0" algn="l" defTabSz="914400" rtl="0" eaLnBrk="1" fontAlgn="auto" latinLnBrk="0" hangingPunct="1">
-              <a:lnSpc>
-                <a:spcPct val="100000"/>
-              </a:lnSpc>
-              <a:spcBef>
-                <a:spcPts val="0"/>
-              </a:spcBef>
-              <a:spcAft>
-                <a:spcPts val="0"/>
-              </a:spcAft>
-              <a:buClrTx/>
-              <a:buSzTx/>
-              <a:buFontTx/>
-              <a:buNone/>
-              <a:tabLst/>
-              <a:defRPr/>
-            </a:pPr>
-            <a:r>
-              <a:rPr lang="en-US" sz="1200" kern="1200" dirty="0">
-                <a:solidFill>
-                  <a:schemeClr val="tx1"/>
-                </a:solidFill>
-                <a:effectLst/>
-                <a:latin typeface="+mn-lt"/>
-                <a:ea typeface="+mn-ea"/>
-                <a:cs typeface="+mn-cs"/>
-              </a:rPr>
-              <a:t>Scoping the style – here we can see an example how we can create a scope with BEM, in this example the prefix is </a:t>
-            </a:r>
-            <a:r>
-              <a:rPr lang="en-US" sz="1200" b="0" i="0" kern="1200" dirty="0">
-                <a:solidFill>
-                  <a:schemeClr val="tx1"/>
-                </a:solidFill>
-                <a:effectLst/>
-                <a:latin typeface="+mn-lt"/>
-                <a:ea typeface="+mn-ea"/>
-                <a:cs typeface="+mn-cs"/>
-              </a:rPr>
-              <a:t>content-card.</a:t>
-            </a:r>
-            <a:endParaRPr lang="en-US" sz="1200" kern="1200" dirty="0">
-              <a:solidFill>
-                <a:schemeClr val="tx1"/>
-              </a:solidFill>
-              <a:effectLst/>
-              <a:latin typeface="+mn-lt"/>
-              <a:ea typeface="+mn-ea"/>
-              <a:cs typeface="+mn-cs"/>
-            </a:endParaRPr>
-          </a:p>
-          <a:p>
-            <a:pPr marL="0" marR="0" lvl="0" indent="0" algn="l" defTabSz="914400" rtl="0" eaLnBrk="1" fontAlgn="auto" latinLnBrk="0" hangingPunct="1">
-              <a:lnSpc>
-                <a:spcPct val="100000"/>
-              </a:lnSpc>
-              <a:spcBef>
-                <a:spcPts val="0"/>
-              </a:spcBef>
-              <a:spcAft>
-                <a:spcPts val="0"/>
-              </a:spcAft>
-              <a:buClrTx/>
-              <a:buSzTx/>
-              <a:buFontTx/>
-              <a:buNone/>
-              <a:tabLst/>
-              <a:defRPr/>
-            </a:pPr>
-            <a:endParaRPr lang="en-US" sz="1200" kern="1200" dirty="0">
-              <a:solidFill>
-                <a:schemeClr val="tx1"/>
-              </a:solidFill>
-              <a:effectLst/>
-              <a:latin typeface="+mn-lt"/>
-              <a:ea typeface="+mn-ea"/>
-              <a:cs typeface="+mn-cs"/>
-            </a:endParaRPr>
-          </a:p>
-          <a:p>
-            <a:pPr marL="0" marR="0" lvl="0" indent="0" algn="l" defTabSz="914400" rtl="0" eaLnBrk="1" fontAlgn="auto" latinLnBrk="0" hangingPunct="1">
-              <a:lnSpc>
-                <a:spcPct val="100000"/>
-              </a:lnSpc>
-              <a:spcBef>
-                <a:spcPts val="0"/>
-              </a:spcBef>
-              <a:spcAft>
-                <a:spcPts val="0"/>
-              </a:spcAft>
-              <a:buClrTx/>
-              <a:buSzTx/>
-              <a:buFontTx/>
-              <a:buNone/>
-              <a:tabLst/>
-              <a:defRPr/>
-            </a:pPr>
-            <a:r>
-              <a:rPr lang="en-US" sz="1200" kern="1200" dirty="0">
-                <a:solidFill>
-                  <a:schemeClr val="tx1"/>
-                </a:solidFill>
-                <a:effectLst/>
-                <a:latin typeface="+mn-lt"/>
-                <a:ea typeface="+mn-ea"/>
-                <a:cs typeface="+mn-cs"/>
-              </a:rPr>
-              <a:t>Second option is </a:t>
-            </a:r>
-            <a:r>
-              <a:rPr lang="en-US" sz="1200" b="0" i="0" kern="1200" dirty="0">
-                <a:solidFill>
-                  <a:schemeClr val="tx1"/>
-                </a:solidFill>
-                <a:effectLst/>
-                <a:latin typeface="+mn-lt"/>
-                <a:ea typeface="+mn-ea"/>
-                <a:cs typeface="+mn-cs"/>
-              </a:rPr>
-              <a:t>Emulated the scope </a:t>
-            </a:r>
-            <a:r>
-              <a:rPr lang="en-US" sz="1200" b="0" i="0" kern="1200" dirty="0" err="1">
-                <a:solidFill>
-                  <a:schemeClr val="tx1"/>
-                </a:solidFill>
-                <a:effectLst/>
-                <a:latin typeface="+mn-lt"/>
-                <a:ea typeface="+mn-ea"/>
-                <a:cs typeface="+mn-cs"/>
-              </a:rPr>
-              <a:t>dynamicly</a:t>
-            </a:r>
-            <a:r>
-              <a:rPr lang="en-US" sz="1200" b="0" i="0" kern="1200" dirty="0">
-                <a:solidFill>
-                  <a:schemeClr val="tx1"/>
-                </a:solidFill>
-                <a:effectLst/>
-                <a:latin typeface="+mn-lt"/>
-                <a:ea typeface="+mn-ea"/>
-                <a:cs typeface="+mn-cs"/>
-              </a:rPr>
-              <a:t> like angular is doing (each framework hove is own name and technic but all solving the same issue in different generate way)</a:t>
-            </a:r>
-          </a:p>
-          <a:p>
-            <a:pPr marL="0" marR="0" lvl="0" indent="0" algn="l" defTabSz="914400" rtl="0" eaLnBrk="1" fontAlgn="auto" latinLnBrk="0" hangingPunct="1">
-              <a:lnSpc>
-                <a:spcPct val="100000"/>
-              </a:lnSpc>
-              <a:spcBef>
-                <a:spcPts val="0"/>
-              </a:spcBef>
-              <a:spcAft>
-                <a:spcPts val="0"/>
-              </a:spcAft>
-              <a:buClrTx/>
-              <a:buSzTx/>
-              <a:buFontTx/>
-              <a:buNone/>
-              <a:tabLst/>
-              <a:defRPr/>
-            </a:pPr>
-            <a:endParaRPr lang="en-US" sz="1200" b="0" i="0" kern="1200" dirty="0">
-              <a:solidFill>
-                <a:schemeClr val="tx1"/>
-              </a:solidFill>
-              <a:effectLst/>
-              <a:latin typeface="+mn-lt"/>
-              <a:ea typeface="+mn-ea"/>
-              <a:cs typeface="+mn-cs"/>
-            </a:endParaRPr>
-          </a:p>
-          <a:p>
-            <a:pPr marL="0" marR="0" lvl="0" indent="0" algn="l" defTabSz="914400" rtl="0" eaLnBrk="1" fontAlgn="auto" latinLnBrk="0" hangingPunct="1">
-              <a:lnSpc>
-                <a:spcPct val="100000"/>
-              </a:lnSpc>
-              <a:spcBef>
-                <a:spcPts val="0"/>
-              </a:spcBef>
-              <a:spcAft>
-                <a:spcPts val="0"/>
-              </a:spcAft>
-              <a:buClrTx/>
-              <a:buSzTx/>
-              <a:buFontTx/>
-              <a:buNone/>
-              <a:tabLst/>
-              <a:defRPr/>
-            </a:pPr>
-            <a:r>
-              <a:rPr lang="en-US" sz="1200" b="0" i="0" kern="1200" dirty="0">
-                <a:solidFill>
-                  <a:schemeClr val="tx1"/>
-                </a:solidFill>
-                <a:effectLst/>
-                <a:latin typeface="+mn-lt"/>
-                <a:ea typeface="+mn-ea"/>
-                <a:cs typeface="+mn-cs"/>
-              </a:rPr>
-              <a:t>Third option is to use shadow DOM - Shadow DOM is API providing a way to attach a hidden separated DOM (we Can put styles, JS etc.) to an element. You can think of shadow DOM as a </a:t>
-            </a:r>
-            <a:r>
-              <a:rPr lang="en-US" sz="1200" b="1" i="0" kern="1200" dirty="0">
-                <a:solidFill>
-                  <a:schemeClr val="tx1"/>
-                </a:solidFill>
-                <a:effectLst/>
-                <a:latin typeface="+mn-lt"/>
-                <a:ea typeface="+mn-ea"/>
-                <a:cs typeface="+mn-cs"/>
-              </a:rPr>
-              <a:t>scoped subtree</a:t>
-            </a:r>
-            <a:r>
-              <a:rPr lang="en-US" sz="1200" b="0" i="0" kern="1200" dirty="0">
-                <a:solidFill>
-                  <a:schemeClr val="tx1"/>
-                </a:solidFill>
-                <a:effectLst/>
-                <a:latin typeface="+mn-lt"/>
-                <a:ea typeface="+mn-ea"/>
-                <a:cs typeface="+mn-cs"/>
-              </a:rPr>
-              <a:t> inside your element.</a:t>
-            </a:r>
-          </a:p>
-          <a:p>
-            <a:pPr marL="0" marR="0" lvl="0" indent="0" algn="l" defTabSz="914400" rtl="0" eaLnBrk="1" fontAlgn="auto" latinLnBrk="0" hangingPunct="1">
-              <a:lnSpc>
-                <a:spcPct val="100000"/>
-              </a:lnSpc>
-              <a:spcBef>
-                <a:spcPts val="0"/>
-              </a:spcBef>
-              <a:spcAft>
-                <a:spcPts val="0"/>
-              </a:spcAft>
-              <a:buClrTx/>
-              <a:buSzTx/>
-              <a:buFontTx/>
-              <a:buNone/>
-              <a:tabLst/>
-              <a:defRPr/>
-            </a:pPr>
-            <a:r>
-              <a:rPr lang="en-US" sz="1200" b="0" i="0" kern="1200" dirty="0">
-                <a:solidFill>
-                  <a:schemeClr val="tx1"/>
-                </a:solidFill>
-                <a:effectLst/>
-                <a:latin typeface="+mn-lt"/>
-                <a:ea typeface="+mn-ea"/>
-                <a:cs typeface="+mn-cs"/>
-              </a:rPr>
-              <a:t>All the styles will be leaving only in this component</a:t>
-            </a:r>
-            <a:endParaRPr lang="en-US" sz="1200" kern="1200" dirty="0">
-              <a:solidFill>
-                <a:schemeClr val="tx1"/>
-              </a:solidFill>
-              <a:effectLst/>
-              <a:latin typeface="+mn-lt"/>
-              <a:ea typeface="+mn-ea"/>
-              <a:cs typeface="+mn-cs"/>
-            </a:endParaRPr>
-          </a:p>
-          <a:p>
-            <a:pPr marL="0" marR="0" lvl="0" indent="0" algn="l" defTabSz="914400" rtl="0" eaLnBrk="1" fontAlgn="auto" latinLnBrk="0" hangingPunct="1">
-              <a:lnSpc>
-                <a:spcPct val="100000"/>
-              </a:lnSpc>
-              <a:spcBef>
-                <a:spcPts val="0"/>
-              </a:spcBef>
-              <a:spcAft>
-                <a:spcPts val="0"/>
-              </a:spcAft>
-              <a:buClrTx/>
-              <a:buSzTx/>
-              <a:buFontTx/>
-              <a:buNone/>
-              <a:tabLst/>
-              <a:defRPr/>
-            </a:pPr>
-            <a:endParaRPr lang="en-US" sz="1200" kern="1200" dirty="0">
-              <a:solidFill>
-                <a:schemeClr val="tx1"/>
-              </a:solidFill>
-              <a:effectLst/>
-              <a:latin typeface="+mn-lt"/>
-              <a:ea typeface="+mn-ea"/>
-              <a:cs typeface="+mn-cs"/>
-            </a:endParaRPr>
-          </a:p>
-          <a:p>
-            <a:pPr marL="0" marR="0" lvl="0" indent="0" algn="l" defTabSz="914400" rtl="0" eaLnBrk="1" fontAlgn="auto" latinLnBrk="0" hangingPunct="1">
-              <a:lnSpc>
-                <a:spcPct val="100000"/>
-              </a:lnSpc>
-              <a:spcBef>
-                <a:spcPts val="0"/>
-              </a:spcBef>
-              <a:spcAft>
-                <a:spcPts val="0"/>
-              </a:spcAft>
-              <a:buClrTx/>
-              <a:buSzTx/>
-              <a:buFontTx/>
-              <a:buNone/>
-              <a:tabLst/>
-              <a:defRPr/>
-            </a:pPr>
-            <a:endParaRPr lang="en-US" sz="1200" kern="1200" dirty="0">
-              <a:solidFill>
-                <a:schemeClr val="tx1"/>
-              </a:solidFill>
-              <a:effectLst/>
-              <a:latin typeface="+mn-lt"/>
-              <a:ea typeface="+mn-ea"/>
-              <a:cs typeface="+mn-cs"/>
-            </a:endParaRPr>
-          </a:p>
-          <a:p>
-            <a:pPr marL="0" marR="0" lvl="0" indent="0" algn="l" defTabSz="914400" rtl="0" eaLnBrk="1" fontAlgn="auto" latinLnBrk="0" hangingPunct="1">
-              <a:lnSpc>
-                <a:spcPct val="100000"/>
-              </a:lnSpc>
-              <a:spcBef>
-                <a:spcPts val="0"/>
-              </a:spcBef>
-              <a:spcAft>
-                <a:spcPts val="0"/>
-              </a:spcAft>
-              <a:buClrTx/>
-              <a:buSzTx/>
-              <a:buFontTx/>
-              <a:buNone/>
-              <a:tabLst/>
-              <a:defRPr/>
-            </a:pPr>
-            <a:endParaRPr lang="en-US" sz="1200" kern="1200" dirty="0">
-              <a:solidFill>
-                <a:schemeClr val="tx1"/>
-              </a:solidFill>
-              <a:effectLst/>
-              <a:latin typeface="+mn-lt"/>
-              <a:ea typeface="+mn-ea"/>
-              <a:cs typeface="+mn-cs"/>
-            </a:endParaRPr>
-          </a:p>
-          <a:p>
-            <a:pPr marL="0" marR="0" lvl="0" indent="0" algn="l" defTabSz="914400" rtl="0" eaLnBrk="1" fontAlgn="auto" latinLnBrk="0" hangingPunct="1">
-              <a:lnSpc>
-                <a:spcPct val="100000"/>
-              </a:lnSpc>
-              <a:spcBef>
-                <a:spcPts val="0"/>
-              </a:spcBef>
-              <a:spcAft>
-                <a:spcPts val="0"/>
-              </a:spcAft>
-              <a:buClrTx/>
-              <a:buSzTx/>
-              <a:buFontTx/>
-              <a:buNone/>
-              <a:tabLst/>
-              <a:defRPr/>
-            </a:pPr>
-            <a:endParaRPr lang="en-US" sz="1200" kern="1200" dirty="0">
-              <a:solidFill>
-                <a:schemeClr val="tx1"/>
-              </a:solidFill>
-              <a:effectLst/>
-              <a:latin typeface="+mn-lt"/>
-              <a:ea typeface="+mn-ea"/>
-              <a:cs typeface="+mn-cs"/>
-            </a:endParaRPr>
-          </a:p>
-          <a:p>
-            <a:pPr marL="171450" marR="0" lvl="0" indent="-171450" algn="l" defTabSz="914400" rtl="0" eaLnBrk="1" fontAlgn="auto" latinLnBrk="0" hangingPunct="1">
-              <a:lnSpc>
-                <a:spcPct val="100000"/>
-              </a:lnSpc>
-              <a:spcBef>
-                <a:spcPts val="0"/>
-              </a:spcBef>
-              <a:spcAft>
-                <a:spcPts val="0"/>
-              </a:spcAft>
-              <a:buClrTx/>
-              <a:buSzTx/>
-              <a:buFontTx/>
-              <a:buChar char="-"/>
-              <a:tabLst/>
-              <a:defRPr/>
-            </a:pPr>
-            <a:r>
-              <a:rPr lang="en-US" dirty="0">
-                <a:hlinkClick r:id="rId3"/>
-              </a:rPr>
-              <a:t>https://dev.to/maxart2501/css-for-an-encapsulated-web-7fo</a:t>
-            </a:r>
-            <a:endParaRPr lang="en-US" dirty="0"/>
-          </a:p>
-          <a:p>
-            <a:pPr marL="171450" marR="0" lvl="0" indent="-171450" algn="l" defTabSz="914400" rtl="0" eaLnBrk="1" fontAlgn="auto" latinLnBrk="0" hangingPunct="1">
-              <a:lnSpc>
-                <a:spcPct val="100000"/>
-              </a:lnSpc>
-              <a:spcBef>
-                <a:spcPts val="0"/>
-              </a:spcBef>
-              <a:spcAft>
-                <a:spcPts val="0"/>
-              </a:spcAft>
-              <a:buClrTx/>
-              <a:buSzTx/>
-              <a:buFontTx/>
-              <a:buChar char="-"/>
-              <a:tabLst/>
-              <a:defRPr/>
-            </a:pPr>
-            <a:r>
-              <a:rPr lang="en-US" dirty="0">
-                <a:hlinkClick r:id="rId4"/>
-              </a:rPr>
-              <a:t>https://medium.com/@hammadtariq65/style-encapsulation-in-reactjs-ba4e3212a9f</a:t>
-            </a:r>
-            <a:endParaRPr lang="en-US" dirty="0"/>
-          </a:p>
-          <a:p>
-            <a:pPr marL="171450" marR="0" lvl="0" indent="-171450" algn="l" defTabSz="914400" rtl="0" eaLnBrk="1" fontAlgn="auto" latinLnBrk="0" hangingPunct="1">
-              <a:lnSpc>
-                <a:spcPct val="100000"/>
-              </a:lnSpc>
-              <a:spcBef>
-                <a:spcPts val="0"/>
-              </a:spcBef>
-              <a:spcAft>
-                <a:spcPts val="0"/>
-              </a:spcAft>
-              <a:buClrTx/>
-              <a:buSzTx/>
-              <a:buFontTx/>
-              <a:buChar char="-"/>
-              <a:tabLst/>
-              <a:defRPr/>
-            </a:pPr>
-            <a:r>
-              <a:rPr lang="en-US" dirty="0">
-                <a:hlinkClick r:id="rId5"/>
-              </a:rPr>
-              <a:t>https://developers.google.com/web/fundamentals/web-components/shadowdom</a:t>
-            </a:r>
-            <a:endParaRPr lang="en-US" dirty="0"/>
-          </a:p>
-          <a:p>
-            <a:pPr marL="171450" marR="0" lvl="0" indent="-171450" algn="l" defTabSz="914400" rtl="0" eaLnBrk="1" fontAlgn="auto" latinLnBrk="0" hangingPunct="1">
-              <a:lnSpc>
-                <a:spcPct val="100000"/>
-              </a:lnSpc>
-              <a:spcBef>
-                <a:spcPts val="0"/>
-              </a:spcBef>
-              <a:spcAft>
-                <a:spcPts val="0"/>
-              </a:spcAft>
-              <a:buClrTx/>
-              <a:buSzTx/>
-              <a:buFontTx/>
-              <a:buChar char="-"/>
-              <a:tabLst/>
-              <a:defRPr/>
-            </a:pPr>
-            <a:r>
-              <a:rPr lang="en-US" dirty="0">
-                <a:hlinkClick r:id="rId6"/>
-              </a:rPr>
-              <a:t>https://blog.logrocket.com/understanding-shadow-dom-v1-fa9b81ebe3ac/</a:t>
-            </a:r>
-            <a:endParaRPr lang="en-US" sz="1200" kern="1200" dirty="0">
-              <a:solidFill>
-                <a:schemeClr val="tx1"/>
-              </a:solidFill>
-              <a:effectLst/>
-              <a:latin typeface="+mn-lt"/>
-              <a:ea typeface="+mn-ea"/>
-              <a:cs typeface="+mn-cs"/>
-            </a:endParaRPr>
-          </a:p>
         </p:txBody>
       </p:sp>
       <p:sp>
@@ -4544,7 +3655,7 @@
     </p:spTree>
     <p:extLst>
       <p:ext uri="{BB962C8B-B14F-4D97-AF65-F5344CB8AC3E}">
-        <p14:creationId xmlns:p14="http://schemas.microsoft.com/office/powerpoint/2010/main" val="2012891520"/>
+        <p14:creationId xmlns:p14="http://schemas.microsoft.com/office/powerpoint/2010/main" val="3793061263"/>
       </p:ext>
     </p:extLst>
   </p:cSld>
@@ -4616,13 +3727,36 @@
               <a:defRPr/>
             </a:pPr>
             <a:r>
-              <a:rPr lang="en-US" sz="1200" dirty="0">
-                <a:solidFill>
-                  <a:schemeClr val="bg1"/>
-                </a:solidFill>
-              </a:rPr>
-              <a:t>Refactor layout to components</a:t>
-            </a:r>
+              <a:rPr lang="en-US" sz="1200" kern="1200" dirty="0">
+                <a:solidFill>
+                  <a:schemeClr val="tx1"/>
+                </a:solidFill>
+                <a:effectLst/>
+                <a:latin typeface="+mn-lt"/>
+                <a:ea typeface="+mn-ea"/>
+                <a:cs typeface="+mn-cs"/>
+              </a:rPr>
+              <a:t>What is CSS encapsulation</a:t>
+            </a:r>
+          </a:p>
+          <a:p>
+            <a:pPr marL="0" marR="0" lvl="0" indent="0" algn="l" defTabSz="914400" rtl="0" eaLnBrk="1" fontAlgn="auto" latinLnBrk="0" hangingPunct="1">
+              <a:lnSpc>
+                <a:spcPct val="100000"/>
+              </a:lnSpc>
+              <a:spcBef>
+                <a:spcPts val="0"/>
+              </a:spcBef>
+              <a:spcAft>
+                <a:spcPts val="0"/>
+              </a:spcAft>
+              <a:buClrTx/>
+              <a:buSzTx/>
+              <a:buFontTx/>
+              <a:buNone/>
+              <a:tabLst/>
+              <a:defRPr/>
+            </a:pPr>
             <a:endParaRPr lang="en-US" sz="1200" kern="1200" dirty="0">
               <a:solidFill>
                 <a:schemeClr val="tx1"/>
@@ -4633,6 +3767,1042 @@
               <a:cs typeface="+mn-cs"/>
             </a:endParaRPr>
           </a:p>
+          <a:p>
+            <a:pPr marL="0" marR="0" lvl="0" indent="0" algn="l" defTabSz="914400" rtl="0" eaLnBrk="1" fontAlgn="auto" latinLnBrk="0" hangingPunct="1">
+              <a:lnSpc>
+                <a:spcPct val="100000"/>
+              </a:lnSpc>
+              <a:spcBef>
+                <a:spcPts val="0"/>
+              </a:spcBef>
+              <a:spcAft>
+                <a:spcPts val="0"/>
+              </a:spcAft>
+              <a:buClrTx/>
+              <a:buSzTx/>
+              <a:buFontTx/>
+              <a:buNone/>
+              <a:tabLst/>
+              <a:defRPr/>
+            </a:pPr>
+            <a:r>
+              <a:rPr lang="en-US" sz="1200" kern="1200" dirty="0">
+                <a:solidFill>
+                  <a:schemeClr val="tx1"/>
+                </a:solidFill>
+                <a:effectLst/>
+                <a:latin typeface="+mn-lt"/>
+                <a:ea typeface="+mn-ea"/>
+                <a:cs typeface="+mn-cs"/>
+              </a:rPr>
+              <a:t>In CSS we have the following issues:</a:t>
+            </a:r>
+          </a:p>
+          <a:p>
+            <a:pPr marL="0" marR="0" lvl="0" indent="0" algn="l" defTabSz="914400" rtl="0" eaLnBrk="1" fontAlgn="auto" latinLnBrk="0" hangingPunct="1">
+              <a:lnSpc>
+                <a:spcPct val="100000"/>
+              </a:lnSpc>
+              <a:spcBef>
+                <a:spcPts val="0"/>
+              </a:spcBef>
+              <a:spcAft>
+                <a:spcPts val="0"/>
+              </a:spcAft>
+              <a:buClrTx/>
+              <a:buSzTx/>
+              <a:buFontTx/>
+              <a:buNone/>
+              <a:tabLst/>
+              <a:defRPr/>
+            </a:pPr>
+            <a:r>
+              <a:rPr lang="en-US" sz="1200" kern="1200" dirty="0">
+                <a:solidFill>
+                  <a:schemeClr val="tx1"/>
+                </a:solidFill>
+                <a:effectLst/>
+                <a:latin typeface="+mn-lt"/>
+                <a:ea typeface="+mn-ea"/>
+                <a:cs typeface="+mn-cs"/>
+              </a:rPr>
+              <a:t>CSS is a global scope – when we defined a class it might apply to any element in the DOM, this might cause applying styles to undesired element.</a:t>
+            </a:r>
+          </a:p>
+          <a:p>
+            <a:pPr marL="0" marR="0" lvl="0" indent="0" algn="l" defTabSz="914400" rtl="0" eaLnBrk="1" fontAlgn="auto" latinLnBrk="0" hangingPunct="1">
+              <a:lnSpc>
+                <a:spcPct val="100000"/>
+              </a:lnSpc>
+              <a:spcBef>
+                <a:spcPts val="0"/>
+              </a:spcBef>
+              <a:spcAft>
+                <a:spcPts val="0"/>
+              </a:spcAft>
+              <a:buClrTx/>
+              <a:buSzTx/>
+              <a:buFontTx/>
+              <a:buNone/>
+              <a:tabLst/>
+              <a:defRPr/>
+            </a:pPr>
+            <a:r>
+              <a:rPr lang="en-US" sz="1200" kern="1200" dirty="0">
+                <a:solidFill>
+                  <a:schemeClr val="tx1"/>
+                </a:solidFill>
+                <a:effectLst/>
+                <a:latin typeface="+mn-lt"/>
+                <a:ea typeface="+mn-ea"/>
+                <a:cs typeface="+mn-cs"/>
+              </a:rPr>
+              <a:t>Specificity War, Inheritance issues – CSS become so complex so we need to start calculating style specificity level  (id is 100, class is 10, tag is 1 etc.) to override existing/inherit style</a:t>
+            </a:r>
+          </a:p>
+          <a:p>
+            <a:pPr marL="0" marR="0" lvl="0" indent="0" algn="l" defTabSz="914400" rtl="0" eaLnBrk="1" fontAlgn="auto" latinLnBrk="0" hangingPunct="1">
+              <a:lnSpc>
+                <a:spcPct val="100000"/>
+              </a:lnSpc>
+              <a:spcBef>
+                <a:spcPts val="0"/>
+              </a:spcBef>
+              <a:spcAft>
+                <a:spcPts val="0"/>
+              </a:spcAft>
+              <a:buClrTx/>
+              <a:buSzTx/>
+              <a:buFontTx/>
+              <a:buNone/>
+              <a:tabLst/>
+              <a:defRPr/>
+            </a:pPr>
+            <a:r>
+              <a:rPr lang="en-US" sz="1200" kern="1200" dirty="0">
+                <a:solidFill>
+                  <a:schemeClr val="tx1"/>
+                </a:solidFill>
+                <a:effectLst/>
+                <a:latin typeface="+mn-lt"/>
+                <a:ea typeface="+mn-ea"/>
+                <a:cs typeface="+mn-cs"/>
+              </a:rPr>
+              <a:t>Name clashing – will but same class name like our third party (everyone wants to call button as button class)</a:t>
+            </a:r>
+          </a:p>
+          <a:p>
+            <a:pPr marL="0" marR="0" lvl="0" indent="0" algn="l" defTabSz="914400" rtl="0" eaLnBrk="1" fontAlgn="auto" latinLnBrk="0" hangingPunct="1">
+              <a:lnSpc>
+                <a:spcPct val="100000"/>
+              </a:lnSpc>
+              <a:spcBef>
+                <a:spcPts val="0"/>
+              </a:spcBef>
+              <a:spcAft>
+                <a:spcPts val="0"/>
+              </a:spcAft>
+              <a:buClrTx/>
+              <a:buSzTx/>
+              <a:buFontTx/>
+              <a:buNone/>
+              <a:tabLst/>
+              <a:defRPr/>
+            </a:pPr>
+            <a:endParaRPr lang="en-US" sz="1200" kern="1200" dirty="0">
+              <a:solidFill>
+                <a:schemeClr val="tx1"/>
+              </a:solidFill>
+              <a:effectLst/>
+              <a:latin typeface="+mn-lt"/>
+              <a:ea typeface="+mn-ea"/>
+              <a:cs typeface="+mn-cs"/>
+            </a:endParaRPr>
+          </a:p>
+          <a:p>
+            <a:pPr marL="0" marR="0" lvl="0" indent="0" algn="l" defTabSz="914400" rtl="0" eaLnBrk="1" fontAlgn="auto" latinLnBrk="0" hangingPunct="1">
+              <a:lnSpc>
+                <a:spcPct val="100000"/>
+              </a:lnSpc>
+              <a:spcBef>
+                <a:spcPts val="0"/>
+              </a:spcBef>
+              <a:spcAft>
+                <a:spcPts val="0"/>
+              </a:spcAft>
+              <a:buClrTx/>
+              <a:buSzTx/>
+              <a:buFontTx/>
+              <a:buNone/>
+              <a:tabLst/>
+              <a:defRPr/>
+            </a:pPr>
+            <a:r>
+              <a:rPr lang="en-US" sz="1200" kern="1200" dirty="0">
+                <a:solidFill>
+                  <a:schemeClr val="tx1"/>
+                </a:solidFill>
+                <a:effectLst/>
+                <a:latin typeface="+mn-lt"/>
+                <a:ea typeface="+mn-ea"/>
+                <a:cs typeface="+mn-cs"/>
+              </a:rPr>
+              <a:t>The first solution is to create best practices to our project:</a:t>
+            </a:r>
+          </a:p>
+          <a:p>
+            <a:pPr marL="171450" marR="0" lvl="0" indent="-171450" algn="l" defTabSz="914400" rtl="0" eaLnBrk="1" fontAlgn="auto" latinLnBrk="0" hangingPunct="1">
+              <a:lnSpc>
+                <a:spcPct val="100000"/>
+              </a:lnSpc>
+              <a:spcBef>
+                <a:spcPts val="0"/>
+              </a:spcBef>
+              <a:spcAft>
+                <a:spcPts val="0"/>
+              </a:spcAft>
+              <a:buClrTx/>
+              <a:buSzTx/>
+              <a:buFontTx/>
+              <a:buChar char="-"/>
+              <a:tabLst/>
+              <a:defRPr/>
+            </a:pPr>
+            <a:r>
+              <a:rPr lang="en-US" sz="1200" kern="1200" dirty="0">
+                <a:solidFill>
+                  <a:schemeClr val="tx1"/>
+                </a:solidFill>
+                <a:effectLst/>
+                <a:latin typeface="+mn-lt"/>
+                <a:ea typeface="+mn-ea"/>
+                <a:cs typeface="+mn-cs"/>
+              </a:rPr>
+              <a:t>No more ID's in selectors - solve Specificity War</a:t>
+            </a:r>
+          </a:p>
+          <a:p>
+            <a:pPr marL="171450" marR="0" lvl="0" indent="-171450" algn="l" defTabSz="914400" rtl="0" eaLnBrk="1" fontAlgn="auto" latinLnBrk="0" hangingPunct="1">
+              <a:lnSpc>
+                <a:spcPct val="100000"/>
+              </a:lnSpc>
+              <a:spcBef>
+                <a:spcPts val="0"/>
+              </a:spcBef>
+              <a:spcAft>
+                <a:spcPts val="0"/>
+              </a:spcAft>
+              <a:buClrTx/>
+              <a:buSzTx/>
+              <a:buFontTx/>
+              <a:buChar char="-"/>
+              <a:tabLst/>
+              <a:defRPr/>
+            </a:pPr>
+            <a:r>
+              <a:rPr lang="en-US" sz="1200" kern="1200" dirty="0">
+                <a:solidFill>
+                  <a:schemeClr val="tx1"/>
+                </a:solidFill>
+                <a:effectLst/>
+                <a:latin typeface="+mn-lt"/>
+                <a:ea typeface="+mn-ea"/>
+                <a:cs typeface="+mn-cs"/>
+              </a:rPr>
+              <a:t>No "brute-force" values (as that z-index) – solve override issues</a:t>
+            </a:r>
+          </a:p>
+          <a:p>
+            <a:pPr marL="171450" marR="0" lvl="0" indent="-171450" algn="l" defTabSz="914400" rtl="0" eaLnBrk="1" fontAlgn="auto" latinLnBrk="0" hangingPunct="1">
+              <a:lnSpc>
+                <a:spcPct val="100000"/>
+              </a:lnSpc>
+              <a:spcBef>
+                <a:spcPts val="0"/>
+              </a:spcBef>
+              <a:spcAft>
+                <a:spcPts val="0"/>
+              </a:spcAft>
+              <a:buClrTx/>
+              <a:buSzTx/>
+              <a:buFontTx/>
+              <a:buChar char="-"/>
+              <a:tabLst/>
+              <a:defRPr/>
+            </a:pPr>
+            <a:r>
+              <a:rPr lang="en-US" sz="1200" kern="1200" dirty="0">
+                <a:solidFill>
+                  <a:schemeClr val="tx1"/>
+                </a:solidFill>
+                <a:effectLst/>
+                <a:latin typeface="+mn-lt"/>
+                <a:ea typeface="+mn-ea"/>
+                <a:cs typeface="+mn-cs"/>
+              </a:rPr>
+              <a:t>No more !important or exotic CSS properties – don’t ever use important only for rare cases</a:t>
+            </a:r>
+          </a:p>
+          <a:p>
+            <a:pPr marL="171450" marR="0" lvl="0" indent="-171450" algn="l" defTabSz="914400" rtl="0" eaLnBrk="1" fontAlgn="auto" latinLnBrk="0" hangingPunct="1">
+              <a:lnSpc>
+                <a:spcPct val="100000"/>
+              </a:lnSpc>
+              <a:spcBef>
+                <a:spcPts val="0"/>
+              </a:spcBef>
+              <a:spcAft>
+                <a:spcPts val="0"/>
+              </a:spcAft>
+              <a:buClrTx/>
+              <a:buSzTx/>
+              <a:buFontTx/>
+              <a:buChar char="-"/>
+              <a:tabLst/>
+              <a:defRPr/>
+            </a:pPr>
+            <a:r>
+              <a:rPr lang="en-US" sz="1200" kern="1200" dirty="0">
+                <a:solidFill>
+                  <a:schemeClr val="tx1"/>
+                </a:solidFill>
+                <a:effectLst/>
+                <a:latin typeface="+mn-lt"/>
+                <a:ea typeface="+mn-ea"/>
+                <a:cs typeface="+mn-cs"/>
+              </a:rPr>
+              <a:t>No strict bindings between CSS and the DOM structure – don’t describe the DOM in CSS (selector using html tag), why? Because structure might be changed &amp; less readable when looking at it (class with descripted name will explain us more about this element)</a:t>
+            </a:r>
+          </a:p>
+          <a:p>
+            <a:pPr marL="171450" marR="0" lvl="0" indent="-171450" algn="l" defTabSz="914400" rtl="0" eaLnBrk="1" fontAlgn="auto" latinLnBrk="0" hangingPunct="1">
+              <a:lnSpc>
+                <a:spcPct val="100000"/>
+              </a:lnSpc>
+              <a:spcBef>
+                <a:spcPts val="0"/>
+              </a:spcBef>
+              <a:spcAft>
+                <a:spcPts val="0"/>
+              </a:spcAft>
+              <a:buClrTx/>
+              <a:buSzTx/>
+              <a:buFontTx/>
+              <a:buChar char="-"/>
+              <a:tabLst/>
+              <a:defRPr/>
+            </a:pPr>
+            <a:r>
+              <a:rPr lang="en-US" sz="1200" kern="1200" dirty="0">
+                <a:solidFill>
+                  <a:schemeClr val="tx1"/>
+                </a:solidFill>
+                <a:effectLst/>
+                <a:latin typeface="+mn-lt"/>
+                <a:ea typeface="+mn-ea"/>
+                <a:cs typeface="+mn-cs"/>
+              </a:rPr>
+              <a:t>Keep the </a:t>
+            </a:r>
+            <a:r>
+              <a:rPr lang="en-US" sz="1200" kern="1200" dirty="0" err="1">
+                <a:solidFill>
+                  <a:schemeClr val="tx1"/>
+                </a:solidFill>
+                <a:effectLst/>
+                <a:latin typeface="+mn-lt"/>
+                <a:ea typeface="+mn-ea"/>
+                <a:cs typeface="+mn-cs"/>
+              </a:rPr>
+              <a:t>specifity</a:t>
+            </a:r>
+            <a:r>
+              <a:rPr lang="en-US" sz="1200" kern="1200" dirty="0">
+                <a:solidFill>
+                  <a:schemeClr val="tx1"/>
+                </a:solidFill>
+                <a:effectLst/>
+                <a:latin typeface="+mn-lt"/>
+                <a:ea typeface="+mn-ea"/>
+                <a:cs typeface="+mn-cs"/>
+              </a:rPr>
+              <a:t> as low as possible, ideally 0.1.0 – to prevent overrides issues</a:t>
+            </a:r>
+          </a:p>
+          <a:p>
+            <a:pPr marL="171450" marR="0" lvl="0" indent="-171450" algn="l" defTabSz="914400" rtl="0" eaLnBrk="1" fontAlgn="auto" latinLnBrk="0" hangingPunct="1">
+              <a:lnSpc>
+                <a:spcPct val="100000"/>
+              </a:lnSpc>
+              <a:spcBef>
+                <a:spcPts val="0"/>
+              </a:spcBef>
+              <a:spcAft>
+                <a:spcPts val="0"/>
+              </a:spcAft>
+              <a:buClrTx/>
+              <a:buSzTx/>
+              <a:buFontTx/>
+              <a:buChar char="-"/>
+              <a:tabLst/>
+              <a:defRPr/>
+            </a:pPr>
+            <a:r>
+              <a:rPr lang="en-US" sz="1200" kern="1200" dirty="0">
+                <a:solidFill>
+                  <a:schemeClr val="tx1"/>
+                </a:solidFill>
+                <a:effectLst/>
+                <a:latin typeface="+mn-lt"/>
+                <a:ea typeface="+mn-ea"/>
+                <a:cs typeface="+mn-cs"/>
+              </a:rPr>
+              <a:t>Use namespaces for your classes. – like project prefix to solve side effect</a:t>
+            </a:r>
+          </a:p>
+          <a:p>
+            <a:pPr marL="0" marR="0" lvl="0" indent="0" algn="l" defTabSz="914400" rtl="0" eaLnBrk="1" fontAlgn="auto" latinLnBrk="0" hangingPunct="1">
+              <a:lnSpc>
+                <a:spcPct val="100000"/>
+              </a:lnSpc>
+              <a:spcBef>
+                <a:spcPts val="0"/>
+              </a:spcBef>
+              <a:spcAft>
+                <a:spcPts val="0"/>
+              </a:spcAft>
+              <a:buClrTx/>
+              <a:buSzTx/>
+              <a:buFontTx/>
+              <a:buNone/>
+              <a:tabLst/>
+              <a:defRPr/>
+            </a:pPr>
+            <a:endParaRPr lang="en-US" sz="1200" kern="1200" dirty="0">
+              <a:solidFill>
+                <a:schemeClr val="tx1"/>
+              </a:solidFill>
+              <a:effectLst/>
+              <a:latin typeface="+mn-lt"/>
+              <a:ea typeface="+mn-ea"/>
+              <a:cs typeface="+mn-cs"/>
+            </a:endParaRPr>
+          </a:p>
+          <a:p>
+            <a:pPr marL="0" marR="0" lvl="0" indent="0" algn="l" defTabSz="914400" rtl="0" eaLnBrk="1" fontAlgn="auto" latinLnBrk="0" hangingPunct="1">
+              <a:lnSpc>
+                <a:spcPct val="100000"/>
+              </a:lnSpc>
+              <a:spcBef>
+                <a:spcPts val="0"/>
+              </a:spcBef>
+              <a:spcAft>
+                <a:spcPts val="0"/>
+              </a:spcAft>
+              <a:buClrTx/>
+              <a:buSzTx/>
+              <a:buFontTx/>
+              <a:buNone/>
+              <a:tabLst/>
+              <a:defRPr/>
+            </a:pPr>
+            <a:r>
+              <a:rPr lang="en-US" sz="1200" kern="1200" dirty="0">
+                <a:solidFill>
+                  <a:schemeClr val="tx1"/>
+                </a:solidFill>
+                <a:effectLst/>
+                <a:latin typeface="+mn-lt"/>
+                <a:ea typeface="+mn-ea"/>
+                <a:cs typeface="+mn-cs"/>
+              </a:rPr>
+              <a:t>To solve this issue, The idea is to create a private scope for styles so all styles create in a component will apply only to this component and will not affect outside elements.</a:t>
+            </a:r>
+          </a:p>
+          <a:p>
+            <a:pPr marL="0" marR="0" lvl="0" indent="0" algn="l" defTabSz="914400" rtl="0" eaLnBrk="1" fontAlgn="auto" latinLnBrk="0" hangingPunct="1">
+              <a:lnSpc>
+                <a:spcPct val="100000"/>
+              </a:lnSpc>
+              <a:spcBef>
+                <a:spcPts val="0"/>
+              </a:spcBef>
+              <a:spcAft>
+                <a:spcPts val="0"/>
+              </a:spcAft>
+              <a:buClrTx/>
+              <a:buSzTx/>
+              <a:buFontTx/>
+              <a:buNone/>
+              <a:tabLst/>
+              <a:defRPr/>
+            </a:pPr>
+            <a:r>
+              <a:rPr lang="en-US" sz="1200" kern="1200" dirty="0">
+                <a:solidFill>
+                  <a:schemeClr val="tx1"/>
+                </a:solidFill>
+                <a:effectLst/>
+                <a:latin typeface="+mn-lt"/>
+                <a:ea typeface="+mn-ea"/>
+                <a:cs typeface="+mn-cs"/>
+              </a:rPr>
+              <a:t>This strategy will solve us a lot if side effect like one style effecting other element.</a:t>
+            </a:r>
+          </a:p>
+          <a:p>
+            <a:pPr marL="0" marR="0" lvl="0" indent="0" algn="l" defTabSz="914400" rtl="0" eaLnBrk="1" fontAlgn="auto" latinLnBrk="0" hangingPunct="1">
+              <a:lnSpc>
+                <a:spcPct val="100000"/>
+              </a:lnSpc>
+              <a:spcBef>
+                <a:spcPts val="0"/>
+              </a:spcBef>
+              <a:spcAft>
+                <a:spcPts val="0"/>
+              </a:spcAft>
+              <a:buClrTx/>
+              <a:buSzTx/>
+              <a:buFontTx/>
+              <a:buNone/>
+              <a:tabLst/>
+              <a:defRPr/>
+            </a:pPr>
+            <a:endParaRPr lang="en-US" sz="1200" kern="1200" dirty="0">
+              <a:solidFill>
+                <a:schemeClr val="tx1"/>
+              </a:solidFill>
+              <a:effectLst/>
+              <a:latin typeface="+mn-lt"/>
+              <a:ea typeface="+mn-ea"/>
+              <a:cs typeface="+mn-cs"/>
+            </a:endParaRPr>
+          </a:p>
+          <a:p>
+            <a:pPr marL="0" marR="0" lvl="0" indent="0" algn="l" defTabSz="914400" rtl="0" eaLnBrk="1" fontAlgn="auto" latinLnBrk="0" hangingPunct="1">
+              <a:lnSpc>
+                <a:spcPct val="100000"/>
+              </a:lnSpc>
+              <a:spcBef>
+                <a:spcPts val="0"/>
+              </a:spcBef>
+              <a:spcAft>
+                <a:spcPts val="0"/>
+              </a:spcAft>
+              <a:buClrTx/>
+              <a:buSzTx/>
+              <a:buFontTx/>
+              <a:buNone/>
+              <a:tabLst/>
+              <a:defRPr/>
+            </a:pPr>
+            <a:r>
+              <a:rPr lang="en-US" sz="1200" kern="1200" dirty="0">
+                <a:solidFill>
+                  <a:schemeClr val="tx1"/>
+                </a:solidFill>
+                <a:effectLst/>
+                <a:latin typeface="+mn-lt"/>
+                <a:ea typeface="+mn-ea"/>
+                <a:cs typeface="+mn-cs"/>
+              </a:rPr>
+              <a:t>Let see an example using it (by creating the scope by yourself):</a:t>
+            </a:r>
+          </a:p>
+          <a:p>
+            <a:pPr marL="0" marR="0" lvl="0" indent="0" algn="l" defTabSz="914400" rtl="0" eaLnBrk="1" fontAlgn="auto" latinLnBrk="0" hangingPunct="1">
+              <a:lnSpc>
+                <a:spcPct val="100000"/>
+              </a:lnSpc>
+              <a:spcBef>
+                <a:spcPts val="0"/>
+              </a:spcBef>
+              <a:spcAft>
+                <a:spcPts val="0"/>
+              </a:spcAft>
+              <a:buClrTx/>
+              <a:buSzTx/>
+              <a:buFontTx/>
+              <a:buNone/>
+              <a:tabLst/>
+              <a:defRPr/>
+            </a:pPr>
+            <a:r>
+              <a:rPr lang="en-US" sz="1200" kern="1200" dirty="0">
+                <a:solidFill>
+                  <a:schemeClr val="tx1"/>
+                </a:solidFill>
+                <a:effectLst/>
+                <a:latin typeface="+mn-lt"/>
+                <a:ea typeface="+mn-ea"/>
+                <a:cs typeface="+mn-cs"/>
+              </a:rPr>
+              <a:t>Scoping the style – here we can see an example how we can create a scope with BEM, in this example the prefix is </a:t>
+            </a:r>
+            <a:r>
+              <a:rPr lang="en-US" sz="1200" b="0" i="0" kern="1200" dirty="0">
+                <a:solidFill>
+                  <a:schemeClr val="tx1"/>
+                </a:solidFill>
+                <a:effectLst/>
+                <a:latin typeface="+mn-lt"/>
+                <a:ea typeface="+mn-ea"/>
+                <a:cs typeface="+mn-cs"/>
+              </a:rPr>
+              <a:t>content-card.</a:t>
+            </a:r>
+            <a:endParaRPr lang="en-US" sz="1200" kern="1200" dirty="0">
+              <a:solidFill>
+                <a:schemeClr val="tx1"/>
+              </a:solidFill>
+              <a:effectLst/>
+              <a:latin typeface="+mn-lt"/>
+              <a:ea typeface="+mn-ea"/>
+              <a:cs typeface="+mn-cs"/>
+            </a:endParaRPr>
+          </a:p>
+          <a:p>
+            <a:pPr marL="0" marR="0" lvl="0" indent="0" algn="l" defTabSz="914400" rtl="0" eaLnBrk="1" fontAlgn="auto" latinLnBrk="0" hangingPunct="1">
+              <a:lnSpc>
+                <a:spcPct val="100000"/>
+              </a:lnSpc>
+              <a:spcBef>
+                <a:spcPts val="0"/>
+              </a:spcBef>
+              <a:spcAft>
+                <a:spcPts val="0"/>
+              </a:spcAft>
+              <a:buClrTx/>
+              <a:buSzTx/>
+              <a:buFontTx/>
+              <a:buNone/>
+              <a:tabLst/>
+              <a:defRPr/>
+            </a:pPr>
+            <a:endParaRPr lang="en-US" sz="1200" kern="1200" dirty="0">
+              <a:solidFill>
+                <a:schemeClr val="tx1"/>
+              </a:solidFill>
+              <a:effectLst/>
+              <a:latin typeface="+mn-lt"/>
+              <a:ea typeface="+mn-ea"/>
+              <a:cs typeface="+mn-cs"/>
+            </a:endParaRPr>
+          </a:p>
+          <a:p>
+            <a:pPr marL="0" marR="0" lvl="0" indent="0" algn="l" defTabSz="914400" rtl="0" eaLnBrk="1" fontAlgn="auto" latinLnBrk="0" hangingPunct="1">
+              <a:lnSpc>
+                <a:spcPct val="100000"/>
+              </a:lnSpc>
+              <a:spcBef>
+                <a:spcPts val="0"/>
+              </a:spcBef>
+              <a:spcAft>
+                <a:spcPts val="0"/>
+              </a:spcAft>
+              <a:buClrTx/>
+              <a:buSzTx/>
+              <a:buFontTx/>
+              <a:buNone/>
+              <a:tabLst/>
+              <a:defRPr/>
+            </a:pPr>
+            <a:r>
+              <a:rPr lang="en-US" sz="1200" kern="1200" dirty="0">
+                <a:solidFill>
+                  <a:schemeClr val="tx1"/>
+                </a:solidFill>
+                <a:effectLst/>
+                <a:latin typeface="+mn-lt"/>
+                <a:ea typeface="+mn-ea"/>
+                <a:cs typeface="+mn-cs"/>
+              </a:rPr>
+              <a:t>Second option is </a:t>
+            </a:r>
+            <a:r>
+              <a:rPr lang="en-US" sz="1200" b="0" i="0" kern="1200" dirty="0">
+                <a:solidFill>
+                  <a:schemeClr val="tx1"/>
+                </a:solidFill>
+                <a:effectLst/>
+                <a:latin typeface="+mn-lt"/>
+                <a:ea typeface="+mn-ea"/>
+                <a:cs typeface="+mn-cs"/>
+              </a:rPr>
+              <a:t>Emulated the scope </a:t>
+            </a:r>
+            <a:r>
+              <a:rPr lang="en-US" sz="1200" b="0" i="0" kern="1200" dirty="0" err="1">
+                <a:solidFill>
+                  <a:schemeClr val="tx1"/>
+                </a:solidFill>
+                <a:effectLst/>
+                <a:latin typeface="+mn-lt"/>
+                <a:ea typeface="+mn-ea"/>
+                <a:cs typeface="+mn-cs"/>
+              </a:rPr>
+              <a:t>dynamicly</a:t>
+            </a:r>
+            <a:r>
+              <a:rPr lang="en-US" sz="1200" b="0" i="0" kern="1200" dirty="0">
+                <a:solidFill>
+                  <a:schemeClr val="tx1"/>
+                </a:solidFill>
+                <a:effectLst/>
+                <a:latin typeface="+mn-lt"/>
+                <a:ea typeface="+mn-ea"/>
+                <a:cs typeface="+mn-cs"/>
+              </a:rPr>
+              <a:t> like angular is doing (each framework hove is own name and technic but all solving the same issue in different generate way)</a:t>
+            </a:r>
+          </a:p>
+          <a:p>
+            <a:pPr marL="0" marR="0" lvl="0" indent="0" algn="l" defTabSz="914400" rtl="0" eaLnBrk="1" fontAlgn="auto" latinLnBrk="0" hangingPunct="1">
+              <a:lnSpc>
+                <a:spcPct val="100000"/>
+              </a:lnSpc>
+              <a:spcBef>
+                <a:spcPts val="0"/>
+              </a:spcBef>
+              <a:spcAft>
+                <a:spcPts val="0"/>
+              </a:spcAft>
+              <a:buClrTx/>
+              <a:buSzTx/>
+              <a:buFontTx/>
+              <a:buNone/>
+              <a:tabLst/>
+              <a:defRPr/>
+            </a:pPr>
+            <a:endParaRPr lang="en-US" sz="1200" b="0" i="0" kern="1200" dirty="0">
+              <a:solidFill>
+                <a:schemeClr val="tx1"/>
+              </a:solidFill>
+              <a:effectLst/>
+              <a:latin typeface="+mn-lt"/>
+              <a:ea typeface="+mn-ea"/>
+              <a:cs typeface="+mn-cs"/>
+            </a:endParaRPr>
+          </a:p>
+          <a:p>
+            <a:pPr marL="0" marR="0" lvl="0" indent="0" algn="l" defTabSz="914400" rtl="0" eaLnBrk="1" fontAlgn="auto" latinLnBrk="0" hangingPunct="1">
+              <a:lnSpc>
+                <a:spcPct val="100000"/>
+              </a:lnSpc>
+              <a:spcBef>
+                <a:spcPts val="0"/>
+              </a:spcBef>
+              <a:spcAft>
+                <a:spcPts val="0"/>
+              </a:spcAft>
+              <a:buClrTx/>
+              <a:buSzTx/>
+              <a:buFontTx/>
+              <a:buNone/>
+              <a:tabLst/>
+              <a:defRPr/>
+            </a:pPr>
+            <a:r>
+              <a:rPr lang="en-US" sz="1200" b="0" i="0" kern="1200" dirty="0">
+                <a:solidFill>
+                  <a:schemeClr val="tx1"/>
+                </a:solidFill>
+                <a:effectLst/>
+                <a:latin typeface="+mn-lt"/>
+                <a:ea typeface="+mn-ea"/>
+                <a:cs typeface="+mn-cs"/>
+              </a:rPr>
+              <a:t>Third option is to use shadow DOM - Shadow DOM is API providing a way to attach a hidden separated DOM (we Can put styles, JS etc.) to an element. You can think of shadow DOM as a </a:t>
+            </a:r>
+            <a:r>
+              <a:rPr lang="en-US" sz="1200" b="1" i="0" kern="1200" dirty="0">
+                <a:solidFill>
+                  <a:schemeClr val="tx1"/>
+                </a:solidFill>
+                <a:effectLst/>
+                <a:latin typeface="+mn-lt"/>
+                <a:ea typeface="+mn-ea"/>
+                <a:cs typeface="+mn-cs"/>
+              </a:rPr>
+              <a:t>scoped subtree</a:t>
+            </a:r>
+            <a:r>
+              <a:rPr lang="en-US" sz="1200" b="0" i="0" kern="1200" dirty="0">
+                <a:solidFill>
+                  <a:schemeClr val="tx1"/>
+                </a:solidFill>
+                <a:effectLst/>
+                <a:latin typeface="+mn-lt"/>
+                <a:ea typeface="+mn-ea"/>
+                <a:cs typeface="+mn-cs"/>
+              </a:rPr>
+              <a:t> inside your element.</a:t>
+            </a:r>
+          </a:p>
+          <a:p>
+            <a:pPr marL="0" marR="0" lvl="0" indent="0" algn="l" defTabSz="914400" rtl="0" eaLnBrk="1" fontAlgn="auto" latinLnBrk="0" hangingPunct="1">
+              <a:lnSpc>
+                <a:spcPct val="100000"/>
+              </a:lnSpc>
+              <a:spcBef>
+                <a:spcPts val="0"/>
+              </a:spcBef>
+              <a:spcAft>
+                <a:spcPts val="0"/>
+              </a:spcAft>
+              <a:buClrTx/>
+              <a:buSzTx/>
+              <a:buFontTx/>
+              <a:buNone/>
+              <a:tabLst/>
+              <a:defRPr/>
+            </a:pPr>
+            <a:r>
+              <a:rPr lang="en-US" sz="1200" b="0" i="0" kern="1200" dirty="0">
+                <a:solidFill>
+                  <a:schemeClr val="tx1"/>
+                </a:solidFill>
+                <a:effectLst/>
+                <a:latin typeface="+mn-lt"/>
+                <a:ea typeface="+mn-ea"/>
+                <a:cs typeface="+mn-cs"/>
+              </a:rPr>
+              <a:t>All the styles will be leaving only in this component</a:t>
+            </a:r>
+            <a:endParaRPr lang="en-US" sz="1200" kern="1200" dirty="0">
+              <a:solidFill>
+                <a:schemeClr val="tx1"/>
+              </a:solidFill>
+              <a:effectLst/>
+              <a:latin typeface="+mn-lt"/>
+              <a:ea typeface="+mn-ea"/>
+              <a:cs typeface="+mn-cs"/>
+            </a:endParaRPr>
+          </a:p>
+          <a:p>
+            <a:pPr marL="0" marR="0" lvl="0" indent="0" algn="l" defTabSz="914400" rtl="0" eaLnBrk="1" fontAlgn="auto" latinLnBrk="0" hangingPunct="1">
+              <a:lnSpc>
+                <a:spcPct val="100000"/>
+              </a:lnSpc>
+              <a:spcBef>
+                <a:spcPts val="0"/>
+              </a:spcBef>
+              <a:spcAft>
+                <a:spcPts val="0"/>
+              </a:spcAft>
+              <a:buClrTx/>
+              <a:buSzTx/>
+              <a:buFontTx/>
+              <a:buNone/>
+              <a:tabLst/>
+              <a:defRPr/>
+            </a:pPr>
+            <a:endParaRPr lang="en-US" sz="1200" kern="1200" dirty="0">
+              <a:solidFill>
+                <a:schemeClr val="tx1"/>
+              </a:solidFill>
+              <a:effectLst/>
+              <a:latin typeface="+mn-lt"/>
+              <a:ea typeface="+mn-ea"/>
+              <a:cs typeface="+mn-cs"/>
+            </a:endParaRPr>
+          </a:p>
+          <a:p>
+            <a:pPr marL="0" marR="0" lvl="0" indent="0" algn="l" defTabSz="914400" rtl="0" eaLnBrk="1" fontAlgn="auto" latinLnBrk="0" hangingPunct="1">
+              <a:lnSpc>
+                <a:spcPct val="100000"/>
+              </a:lnSpc>
+              <a:spcBef>
+                <a:spcPts val="0"/>
+              </a:spcBef>
+              <a:spcAft>
+                <a:spcPts val="0"/>
+              </a:spcAft>
+              <a:buClrTx/>
+              <a:buSzTx/>
+              <a:buFontTx/>
+              <a:buNone/>
+              <a:tabLst/>
+              <a:defRPr/>
+            </a:pPr>
+            <a:endParaRPr lang="en-US" sz="1200" kern="1200" dirty="0">
+              <a:solidFill>
+                <a:schemeClr val="tx1"/>
+              </a:solidFill>
+              <a:effectLst/>
+              <a:latin typeface="+mn-lt"/>
+              <a:ea typeface="+mn-ea"/>
+              <a:cs typeface="+mn-cs"/>
+            </a:endParaRPr>
+          </a:p>
+          <a:p>
+            <a:pPr marL="0" marR="0" lvl="0" indent="0" algn="l" defTabSz="914400" rtl="0" eaLnBrk="1" fontAlgn="auto" latinLnBrk="0" hangingPunct="1">
+              <a:lnSpc>
+                <a:spcPct val="100000"/>
+              </a:lnSpc>
+              <a:spcBef>
+                <a:spcPts val="0"/>
+              </a:spcBef>
+              <a:spcAft>
+                <a:spcPts val="0"/>
+              </a:spcAft>
+              <a:buClrTx/>
+              <a:buSzTx/>
+              <a:buFontTx/>
+              <a:buNone/>
+              <a:tabLst/>
+              <a:defRPr/>
+            </a:pPr>
+            <a:endParaRPr lang="en-US" sz="1200" kern="1200" dirty="0">
+              <a:solidFill>
+                <a:schemeClr val="tx1"/>
+              </a:solidFill>
+              <a:effectLst/>
+              <a:latin typeface="+mn-lt"/>
+              <a:ea typeface="+mn-ea"/>
+              <a:cs typeface="+mn-cs"/>
+            </a:endParaRPr>
+          </a:p>
+          <a:p>
+            <a:pPr marL="0" marR="0" lvl="0" indent="0" algn="l" defTabSz="914400" rtl="0" eaLnBrk="1" fontAlgn="auto" latinLnBrk="0" hangingPunct="1">
+              <a:lnSpc>
+                <a:spcPct val="100000"/>
+              </a:lnSpc>
+              <a:spcBef>
+                <a:spcPts val="0"/>
+              </a:spcBef>
+              <a:spcAft>
+                <a:spcPts val="0"/>
+              </a:spcAft>
+              <a:buClrTx/>
+              <a:buSzTx/>
+              <a:buFontTx/>
+              <a:buNone/>
+              <a:tabLst/>
+              <a:defRPr/>
+            </a:pPr>
+            <a:endParaRPr lang="en-US" sz="1200" kern="1200" dirty="0">
+              <a:solidFill>
+                <a:schemeClr val="tx1"/>
+              </a:solidFill>
+              <a:effectLst/>
+              <a:latin typeface="+mn-lt"/>
+              <a:ea typeface="+mn-ea"/>
+              <a:cs typeface="+mn-cs"/>
+            </a:endParaRPr>
+          </a:p>
+          <a:p>
+            <a:pPr marL="171450" marR="0" lvl="0" indent="-171450" algn="l" defTabSz="914400" rtl="0" eaLnBrk="1" fontAlgn="auto" latinLnBrk="0" hangingPunct="1">
+              <a:lnSpc>
+                <a:spcPct val="100000"/>
+              </a:lnSpc>
+              <a:spcBef>
+                <a:spcPts val="0"/>
+              </a:spcBef>
+              <a:spcAft>
+                <a:spcPts val="0"/>
+              </a:spcAft>
+              <a:buClrTx/>
+              <a:buSzTx/>
+              <a:buFontTx/>
+              <a:buChar char="-"/>
+              <a:tabLst/>
+              <a:defRPr/>
+            </a:pPr>
+            <a:r>
+              <a:rPr lang="en-US" dirty="0">
+                <a:hlinkClick r:id="rId3"/>
+              </a:rPr>
+              <a:t>https://dev.to/maxart2501/css-for-an-encapsulated-web-7fo</a:t>
+            </a:r>
+            <a:endParaRPr lang="en-US" dirty="0"/>
+          </a:p>
+          <a:p>
+            <a:pPr marL="171450" marR="0" lvl="0" indent="-171450" algn="l" defTabSz="914400" rtl="0" eaLnBrk="1" fontAlgn="auto" latinLnBrk="0" hangingPunct="1">
+              <a:lnSpc>
+                <a:spcPct val="100000"/>
+              </a:lnSpc>
+              <a:spcBef>
+                <a:spcPts val="0"/>
+              </a:spcBef>
+              <a:spcAft>
+                <a:spcPts val="0"/>
+              </a:spcAft>
+              <a:buClrTx/>
+              <a:buSzTx/>
+              <a:buFontTx/>
+              <a:buChar char="-"/>
+              <a:tabLst/>
+              <a:defRPr/>
+            </a:pPr>
+            <a:r>
+              <a:rPr lang="en-US" dirty="0">
+                <a:hlinkClick r:id="rId4"/>
+              </a:rPr>
+              <a:t>https://medium.com/@hammadtariq65/style-encapsulation-in-reactjs-ba4e3212a9f</a:t>
+            </a:r>
+            <a:endParaRPr lang="en-US" dirty="0"/>
+          </a:p>
+          <a:p>
+            <a:pPr marL="171450" marR="0" lvl="0" indent="-171450" algn="l" defTabSz="914400" rtl="0" eaLnBrk="1" fontAlgn="auto" latinLnBrk="0" hangingPunct="1">
+              <a:lnSpc>
+                <a:spcPct val="100000"/>
+              </a:lnSpc>
+              <a:spcBef>
+                <a:spcPts val="0"/>
+              </a:spcBef>
+              <a:spcAft>
+                <a:spcPts val="0"/>
+              </a:spcAft>
+              <a:buClrTx/>
+              <a:buSzTx/>
+              <a:buFontTx/>
+              <a:buChar char="-"/>
+              <a:tabLst/>
+              <a:defRPr/>
+            </a:pPr>
+            <a:r>
+              <a:rPr lang="en-US" dirty="0">
+                <a:hlinkClick r:id="rId5"/>
+              </a:rPr>
+              <a:t>https://developers.google.com/web/fundamentals/web-components/shadowdom</a:t>
+            </a:r>
+            <a:endParaRPr lang="en-US" dirty="0"/>
+          </a:p>
+          <a:p>
+            <a:pPr marL="171450" marR="0" lvl="0" indent="-171450" algn="l" defTabSz="914400" rtl="0" eaLnBrk="1" fontAlgn="auto" latinLnBrk="0" hangingPunct="1">
+              <a:lnSpc>
+                <a:spcPct val="100000"/>
+              </a:lnSpc>
+              <a:spcBef>
+                <a:spcPts val="0"/>
+              </a:spcBef>
+              <a:spcAft>
+                <a:spcPts val="0"/>
+              </a:spcAft>
+              <a:buClrTx/>
+              <a:buSzTx/>
+              <a:buFontTx/>
+              <a:buChar char="-"/>
+              <a:tabLst/>
+              <a:defRPr/>
+            </a:pPr>
+            <a:r>
+              <a:rPr lang="en-US" dirty="0">
+                <a:hlinkClick r:id="rId6"/>
+              </a:rPr>
+              <a:t>https://blog.logrocket.com/understanding-shadow-dom-v1-fa9b81ebe3ac/</a:t>
+            </a:r>
+            <a:endParaRPr lang="en-US" sz="1200" kern="1200" dirty="0">
+              <a:solidFill>
+                <a:schemeClr val="tx1"/>
+              </a:solidFill>
+              <a:effectLst/>
+              <a:latin typeface="+mn-lt"/>
+              <a:ea typeface="+mn-ea"/>
+              <a:cs typeface="+mn-cs"/>
+            </a:endParaRPr>
+          </a:p>
         </p:txBody>
       </p:sp>
       <p:sp>
@@ -4661,7 +4831,7 @@
     </p:spTree>
     <p:extLst>
       <p:ext uri="{BB962C8B-B14F-4D97-AF65-F5344CB8AC3E}">
-        <p14:creationId xmlns:p14="http://schemas.microsoft.com/office/powerpoint/2010/main" val="1181794488"/>
+        <p14:creationId xmlns:p14="http://schemas.microsoft.com/office/powerpoint/2010/main" val="2012891520"/>
       </p:ext>
     </p:extLst>
   </p:cSld>
@@ -4738,66 +4908,7 @@
                   <a:schemeClr val="bg1"/>
                 </a:solidFill>
               </a:rPr>
-              <a:t>Change empty card to real card with data and UI</a:t>
-            </a:r>
-          </a:p>
-          <a:p>
-            <a:pPr marL="0" marR="0" lvl="0" indent="0" algn="l" defTabSz="914400" rtl="0" eaLnBrk="1" fontAlgn="auto" latinLnBrk="0" hangingPunct="1">
-              <a:lnSpc>
-                <a:spcPct val="100000"/>
-              </a:lnSpc>
-              <a:spcBef>
-                <a:spcPts val="0"/>
-              </a:spcBef>
-              <a:spcAft>
-                <a:spcPts val="0"/>
-              </a:spcAft>
-              <a:buClrTx/>
-              <a:buSzTx/>
-              <a:buFontTx/>
-              <a:buNone/>
-              <a:tabLst/>
-              <a:defRPr/>
-            </a:pPr>
-            <a:endParaRPr lang="en-US" sz="1200" kern="1200" dirty="0">
-              <a:solidFill>
-                <a:schemeClr val="bg1"/>
-              </a:solidFill>
-              <a:effectLst/>
-              <a:latin typeface="+mn-lt"/>
-              <a:ea typeface="+mn-ea"/>
-              <a:cs typeface="+mn-cs"/>
-            </a:endParaRPr>
-          </a:p>
-          <a:p>
-            <a:pPr marL="0" marR="0" lvl="0" indent="0" algn="l" defTabSz="914400" rtl="0" eaLnBrk="1" fontAlgn="auto" latinLnBrk="0" hangingPunct="1">
-              <a:lnSpc>
-                <a:spcPct val="100000"/>
-              </a:lnSpc>
-              <a:spcBef>
-                <a:spcPts val="0"/>
-              </a:spcBef>
-              <a:spcAft>
-                <a:spcPts val="0"/>
-              </a:spcAft>
-              <a:buClrTx/>
-              <a:buSzTx/>
-              <a:buFontTx/>
-              <a:buNone/>
-              <a:tabLst/>
-              <a:defRPr/>
-            </a:pPr>
-            <a:r>
-              <a:rPr lang="en-US" sz="1200" kern="1200">
-                <a:solidFill>
-                  <a:schemeClr val="bg1"/>
-                </a:solidFill>
-                <a:effectLst/>
-                <a:latin typeface="+mn-lt"/>
-                <a:ea typeface="+mn-ea"/>
-                <a:cs typeface="+mn-cs"/>
-              </a:rPr>
-              <a:t>After that connect the hooks for click events</a:t>
+              <a:t>Refactor layout to components</a:t>
             </a:r>
             <a:endParaRPr lang="en-US" sz="1200" kern="1200" dirty="0">
               <a:solidFill>
@@ -4837,7 +4948,7 @@
     </p:spTree>
     <p:extLst>
       <p:ext uri="{BB962C8B-B14F-4D97-AF65-F5344CB8AC3E}">
-        <p14:creationId xmlns:p14="http://schemas.microsoft.com/office/powerpoint/2010/main" val="705909408"/>
+        <p14:creationId xmlns:p14="http://schemas.microsoft.com/office/powerpoint/2010/main" val="1181794488"/>
       </p:ext>
     </p:extLst>
   </p:cSld>
@@ -4976,7 +5087,7 @@
           <a:p>
             <a:fld id="{F472E424-CC75-4448-A1B5-6FCA6BFEE599}" type="datetimeFigureOut">
               <a:rPr lang="he-IL" smtClean="0"/>
-              <a:t>כ"א/תמוז/תשע"ט</a:t>
+              <a:t>כ"ב/תמוז/תשע"ט</a:t>
             </a:fld>
             <a:endParaRPr lang="he-IL"/>
           </a:p>
@@ -5144,7 +5255,7 @@
           <a:p>
             <a:fld id="{F472E424-CC75-4448-A1B5-6FCA6BFEE599}" type="datetimeFigureOut">
               <a:rPr lang="he-IL" smtClean="0"/>
-              <a:t>כ"א/תמוז/תשע"ט</a:t>
+              <a:t>כ"ב/תמוז/תשע"ט</a:t>
             </a:fld>
             <a:endParaRPr lang="he-IL"/>
           </a:p>
@@ -5322,7 +5433,7 @@
           <a:p>
             <a:fld id="{F472E424-CC75-4448-A1B5-6FCA6BFEE599}" type="datetimeFigureOut">
               <a:rPr lang="he-IL" smtClean="0"/>
-              <a:t>כ"א/תמוז/תשע"ט</a:t>
+              <a:t>כ"ב/תמוז/תשע"ט</a:t>
             </a:fld>
             <a:endParaRPr lang="he-IL"/>
           </a:p>
@@ -5490,7 +5601,7 @@
           <a:p>
             <a:fld id="{F472E424-CC75-4448-A1B5-6FCA6BFEE599}" type="datetimeFigureOut">
               <a:rPr lang="he-IL" smtClean="0"/>
-              <a:t>כ"א/תמוז/תשע"ט</a:t>
+              <a:t>כ"ב/תמוז/תשע"ט</a:t>
             </a:fld>
             <a:endParaRPr lang="he-IL"/>
           </a:p>
@@ -5735,7 +5846,7 @@
           <a:p>
             <a:fld id="{F472E424-CC75-4448-A1B5-6FCA6BFEE599}" type="datetimeFigureOut">
               <a:rPr lang="he-IL" smtClean="0"/>
-              <a:t>כ"א/תמוז/תשע"ט</a:t>
+              <a:t>כ"ב/תמוז/תשע"ט</a:t>
             </a:fld>
             <a:endParaRPr lang="he-IL"/>
           </a:p>
@@ -5964,7 +6075,7 @@
           <a:p>
             <a:fld id="{F472E424-CC75-4448-A1B5-6FCA6BFEE599}" type="datetimeFigureOut">
               <a:rPr lang="he-IL" smtClean="0"/>
-              <a:t>כ"א/תמוז/תשע"ט</a:t>
+              <a:t>כ"ב/תמוז/תשע"ט</a:t>
             </a:fld>
             <a:endParaRPr lang="he-IL"/>
           </a:p>
@@ -6328,7 +6439,7 @@
           <a:p>
             <a:fld id="{F472E424-CC75-4448-A1B5-6FCA6BFEE599}" type="datetimeFigureOut">
               <a:rPr lang="he-IL" smtClean="0"/>
-              <a:t>כ"א/תמוז/תשע"ט</a:t>
+              <a:t>כ"ב/תמוז/תשע"ט</a:t>
             </a:fld>
             <a:endParaRPr lang="he-IL"/>
           </a:p>
@@ -6445,7 +6556,7 @@
           <a:p>
             <a:fld id="{F472E424-CC75-4448-A1B5-6FCA6BFEE599}" type="datetimeFigureOut">
               <a:rPr lang="he-IL" smtClean="0"/>
-              <a:t>כ"א/תמוז/תשע"ט</a:t>
+              <a:t>כ"ב/תמוז/תשע"ט</a:t>
             </a:fld>
             <a:endParaRPr lang="he-IL"/>
           </a:p>
@@ -6540,7 +6651,7 @@
           <a:p>
             <a:fld id="{F472E424-CC75-4448-A1B5-6FCA6BFEE599}" type="datetimeFigureOut">
               <a:rPr lang="he-IL" smtClean="0"/>
-              <a:t>כ"א/תמוז/תשע"ט</a:t>
+              <a:t>כ"ב/תמוז/תשע"ט</a:t>
             </a:fld>
             <a:endParaRPr lang="he-IL"/>
           </a:p>
@@ -6815,7 +6926,7 @@
           <a:p>
             <a:fld id="{F472E424-CC75-4448-A1B5-6FCA6BFEE599}" type="datetimeFigureOut">
               <a:rPr lang="he-IL" smtClean="0"/>
-              <a:t>כ"א/תמוז/תשע"ט</a:t>
+              <a:t>כ"ב/תמוז/תשע"ט</a:t>
             </a:fld>
             <a:endParaRPr lang="he-IL"/>
           </a:p>
@@ -7067,7 +7178,7 @@
           <a:p>
             <a:fld id="{F472E424-CC75-4448-A1B5-6FCA6BFEE599}" type="datetimeFigureOut">
               <a:rPr lang="he-IL" smtClean="0"/>
-              <a:t>כ"א/תמוז/תשע"ט</a:t>
+              <a:t>כ"ב/תמוז/תשע"ט</a:t>
             </a:fld>
             <a:endParaRPr lang="he-IL"/>
           </a:p>
@@ -7278,7 +7389,7 @@
           <a:p>
             <a:fld id="{F472E424-CC75-4448-A1B5-6FCA6BFEE599}" type="datetimeFigureOut">
               <a:rPr lang="he-IL" smtClean="0"/>
-              <a:t>כ"א/תמוז/תשע"ט</a:t>
+              <a:t>כ"ב/תמוז/תשע"ט</a:t>
             </a:fld>
             <a:endParaRPr lang="he-IL"/>
           </a:p>
@@ -7805,6 +7916,136 @@
 </p:sld>
 </file>
 
+<file path=ppt/slides/slide10.xml><?xml version="1.0" encoding="utf-8"?>
+<p:sld xmlns:a="http://schemas.openxmlformats.org/drawingml/2006/main" xmlns:r="http://schemas.openxmlformats.org/officeDocument/2006/relationships" xmlns:p="http://schemas.openxmlformats.org/presentationml/2006/main">
+  <p:cSld>
+    <p:spTree>
+      <p:nvGrpSpPr>
+        <p:cNvPr id="1" name=""/>
+        <p:cNvGrpSpPr/>
+        <p:nvPr/>
+      </p:nvGrpSpPr>
+      <p:grpSpPr>
+        <a:xfrm>
+          <a:off x="0" y="0"/>
+          <a:ext cx="0" cy="0"/>
+          <a:chOff x="0" y="0"/>
+          <a:chExt cx="0" cy="0"/>
+        </a:xfrm>
+      </p:grpSpPr>
+      <p:sp>
+        <p:nvSpPr>
+          <p:cNvPr id="6" name="Rectangle 5"/>
+          <p:cNvSpPr/>
+          <p:nvPr/>
+        </p:nvSpPr>
+        <p:spPr>
+          <a:xfrm>
+            <a:off x="-215115" y="0"/>
+            <a:ext cx="12407115" cy="6858000"/>
+          </a:xfrm>
+          <a:prstGeom prst="rect">
+            <a:avLst/>
+          </a:prstGeom>
+          <a:solidFill>
+            <a:schemeClr val="accent6"/>
+          </a:solidFill>
+          <a:ln>
+            <a:noFill/>
+          </a:ln>
+        </p:spPr>
+        <p:style>
+          <a:lnRef idx="1">
+            <a:schemeClr val="accent1"/>
+          </a:lnRef>
+          <a:fillRef idx="3">
+            <a:schemeClr val="accent1"/>
+          </a:fillRef>
+          <a:effectRef idx="2">
+            <a:schemeClr val="accent1"/>
+          </a:effectRef>
+          <a:fontRef idx="minor">
+            <a:schemeClr val="lt1"/>
+          </a:fontRef>
+        </p:style>
+        <p:txBody>
+          <a:bodyPr rtlCol="0" anchor="ctr"/>
+          <a:lstStyle/>
+          <a:p>
+            <a:pPr algn="ctr"/>
+            <a:endParaRPr lang="en-US" sz="2400"/>
+          </a:p>
+        </p:txBody>
+      </p:sp>
+      <p:sp>
+        <p:nvSpPr>
+          <p:cNvPr id="24" name="Title 1"/>
+          <p:cNvSpPr>
+            <a:spLocks noGrp="1"/>
+          </p:cNvSpPr>
+          <p:nvPr>
+            <p:ph type="title"/>
+          </p:nvPr>
+        </p:nvSpPr>
+        <p:spPr>
+          <a:xfrm>
+            <a:off x="502042" y="1936377"/>
+            <a:ext cx="10972800" cy="2985246"/>
+          </a:xfrm>
+        </p:spPr>
+        <p:txBody>
+          <a:bodyPr>
+            <a:noAutofit/>
+          </a:bodyPr>
+          <a:lstStyle/>
+          <a:p>
+            <a:pPr algn="ctr" rtl="0" eaLnBrk="0" fontAlgn="base" hangingPunct="0">
+              <a:spcAft>
+                <a:spcPct val="0"/>
+              </a:spcAft>
+            </a:pPr>
+            <a:r>
+              <a:rPr lang="en-US" sz="6000" dirty="0">
+                <a:solidFill>
+                  <a:schemeClr val="bg1"/>
+                </a:solidFill>
+              </a:rPr>
+              <a:t>Hands-on populate card data</a:t>
+            </a:r>
+            <a:endParaRPr lang="en-US" altLang="en-US" sz="6000" b="1" dirty="0">
+              <a:solidFill>
+                <a:schemeClr val="bg1"/>
+              </a:solidFill>
+              <a:latin typeface="Calibri (Body)"/>
+            </a:endParaRPr>
+          </a:p>
+        </p:txBody>
+      </p:sp>
+    </p:spTree>
+    <p:extLst>
+      <p:ext uri="{BB962C8B-B14F-4D97-AF65-F5344CB8AC3E}">
+        <p14:creationId xmlns:p14="http://schemas.microsoft.com/office/powerpoint/2010/main" val="1965231410"/>
+      </p:ext>
+    </p:extLst>
+  </p:cSld>
+  <p:clrMapOvr>
+    <a:masterClrMapping/>
+  </p:clrMapOvr>
+  <mc:AlternateContent xmlns:mc="http://schemas.openxmlformats.org/markup-compatibility/2006" xmlns:p14="http://schemas.microsoft.com/office/powerpoint/2010/main">
+    <mc:Choice Requires="p14">
+      <p:transition spd="med" p14:dur="700">
+        <p:fade/>
+      </p:transition>
+    </mc:Choice>
+    <mc:Fallback xmlns="">
+      <p:transition xmlns:p14="http://schemas.microsoft.com/office/powerpoint/2010/main" spd="med">
+        <p:fade/>
+      </p:transition>
+    </mc:Fallback>
+  </mc:AlternateContent>
+</p:sld>
+</file>
+
 <file path=ppt/slides/slide2.xml><?xml version="1.0" encoding="utf-8"?>
 <p:sld xmlns:a="http://schemas.openxmlformats.org/drawingml/2006/main" xmlns:r="http://schemas.openxmlformats.org/officeDocument/2006/relationships" xmlns:p="http://schemas.openxmlformats.org/presentationml/2006/main">
   <p:cSld>
@@ -8497,9 +8738,7 @@
             <a:avLst/>
           </a:prstGeom>
           <a:solidFill>
-            <a:schemeClr val="accent1">
-              <a:lumMod val="75000"/>
-            </a:schemeClr>
+            <a:schemeClr val="accent2"/>
           </a:solidFill>
           <a:ln>
             <a:noFill/>
@@ -8561,7 +8800,7 @@
                   <a:schemeClr val="bg1"/>
                 </a:solidFill>
               </a:rPr>
-              <a:t>CSS Encapsulation</a:t>
+              <a:t>Dependency Injection</a:t>
             </a:r>
             <a:endParaRPr lang="en-US" altLang="en-US" sz="6000" b="1" dirty="0">
               <a:solidFill>
@@ -8575,7 +8814,7 @@
     </p:spTree>
     <p:extLst>
       <p:ext uri="{BB962C8B-B14F-4D97-AF65-F5344CB8AC3E}">
-        <p14:creationId xmlns:p14="http://schemas.microsoft.com/office/powerpoint/2010/main" val="3716987637"/>
+        <p14:creationId xmlns:p14="http://schemas.microsoft.com/office/powerpoint/2010/main" val="62507760"/>
       </p:ext>
     </p:extLst>
   </p:cSld>
@@ -8629,7 +8868,9 @@
             <a:avLst/>
           </a:prstGeom>
           <a:solidFill>
-            <a:schemeClr val="accent6"/>
+            <a:schemeClr val="accent1">
+              <a:lumMod val="75000"/>
+            </a:schemeClr>
           </a:solidFill>
           <a:ln>
             <a:noFill/>
@@ -8691,7 +8932,7 @@
                   <a:schemeClr val="bg1"/>
                 </a:solidFill>
               </a:rPr>
-              <a:t>Hands-on Refactor layout</a:t>
+              <a:t>CSS Encapsulation</a:t>
             </a:r>
             <a:endParaRPr lang="en-US" altLang="en-US" sz="6000" b="1" dirty="0">
               <a:solidFill>
@@ -8705,7 +8946,7 @@
     </p:spTree>
     <p:extLst>
       <p:ext uri="{BB962C8B-B14F-4D97-AF65-F5344CB8AC3E}">
-        <p14:creationId xmlns:p14="http://schemas.microsoft.com/office/powerpoint/2010/main" val="1389066535"/>
+        <p14:creationId xmlns:p14="http://schemas.microsoft.com/office/powerpoint/2010/main" val="3716987637"/>
       </p:ext>
     </p:extLst>
   </p:cSld>
@@ -8821,7 +9062,7 @@
                   <a:schemeClr val="bg1"/>
                 </a:solidFill>
               </a:rPr>
-              <a:t>Hands-on populate card data</a:t>
+              <a:t>Hands-on Refactor layout</a:t>
             </a:r>
             <a:endParaRPr lang="en-US" altLang="en-US" sz="6000" b="1" dirty="0">
               <a:solidFill>
@@ -8835,7 +9076,7 @@
     </p:spTree>
     <p:extLst>
       <p:ext uri="{BB962C8B-B14F-4D97-AF65-F5344CB8AC3E}">
-        <p14:creationId xmlns:p14="http://schemas.microsoft.com/office/powerpoint/2010/main" val="1965231410"/>
+        <p14:creationId xmlns:p14="http://schemas.microsoft.com/office/powerpoint/2010/main" val="1389066535"/>
       </p:ext>
     </p:extLst>
   </p:cSld>

</xml_diff>